<commit_message>
Improved the figures of the CONUS domain, orography,  and soil moisture for the data chapter.
</commit_message>
<xml_diff>
--- a/chapter_03/figures/conus_domain_orography.pptx
+++ b/chapter_03/figures/conus_domain_orography.pptx
@@ -2,12 +2,12 @@
 <file path=ppt/presentation.xml><?xml version="1.0" encoding="utf-8"?>
 <p:presentation xmlns:a="http://schemas.openxmlformats.org/drawingml/2006/main" xmlns:r="http://schemas.openxmlformats.org/officeDocument/2006/relationships" xmlns:p="http://schemas.openxmlformats.org/presentationml/2006/main" saveSubsetFonts="1">
   <p:sldMasterIdLst>
-    <p:sldMasterId id="2147483720" r:id="rId1"/>
+    <p:sldMasterId id="2147483744" r:id="rId1"/>
   </p:sldMasterIdLst>
   <p:sldIdLst>
     <p:sldId id="256" r:id="rId2"/>
   </p:sldIdLst>
-  <p:sldSz cx="6551613" cy="3384550"/>
+  <p:sldSz cx="6551613" cy="3851275"/>
   <p:notesSz cx="6858000" cy="9144000"/>
   <p:defaultTextStyle>
     <a:defPPr>
@@ -115,7 +115,7 @@
 <file path=ppt/revisionInfo.xml><?xml version="1.0" encoding="utf-8"?>
 <p1510:revInfo xmlns:a="http://schemas.openxmlformats.org/drawingml/2006/main" xmlns:r="http://schemas.openxmlformats.org/officeDocument/2006/relationships" xmlns:p1510="http://schemas.microsoft.com/office/powerpoint/2015/10/main">
   <p1510:revLst>
-    <p1510:client id="{1093EB27-9F30-4B4D-905C-2834195C41DA}" v="2" dt="2025-05-14T13:43:38.719"/>
+    <p1510:client id="{1093EB27-9F30-4B4D-905C-2834195C41DA}" v="7" dt="2025-05-26T05:48:14.928"/>
   </p1510:revLst>
 </p1510:revInfo>
 </file>
@@ -124,13 +124,13 @@
 <pc:chgInfo xmlns:a="http://schemas.openxmlformats.org/drawingml/2006/main" xmlns:r="http://schemas.openxmlformats.org/officeDocument/2006/relationships" xmlns:ac="http://schemas.microsoft.com/office/drawing/2013/main/command" xmlns:pc="http://schemas.microsoft.com/office/powerpoint/2013/main/command">
   <pc:docChgLst>
     <pc:chgData name="Fatima Pillosu" userId="a6295d4dc9e22643" providerId="LiveId" clId="{1093EB27-9F30-4B4D-905C-2834195C41DA}"/>
-    <pc:docChg chg="custSel modSld">
-      <pc:chgData name="Fatima Pillosu" userId="a6295d4dc9e22643" providerId="LiveId" clId="{1093EB27-9F30-4B4D-905C-2834195C41DA}" dt="2025-05-14T13:43:38.718" v="41"/>
+    <pc:docChg chg="undo custSel modSld">
+      <pc:chgData name="Fatima Pillosu" userId="a6295d4dc9e22643" providerId="LiveId" clId="{1093EB27-9F30-4B4D-905C-2834195C41DA}" dt="2025-05-26T06:01:08.471" v="328" actId="207"/>
       <pc:docMkLst>
         <pc:docMk/>
       </pc:docMkLst>
       <pc:sldChg chg="addSp delSp modSp mod">
-        <pc:chgData name="Fatima Pillosu" userId="a6295d4dc9e22643" providerId="LiveId" clId="{1093EB27-9F30-4B4D-905C-2834195C41DA}" dt="2025-05-14T13:43:38.718" v="41"/>
+        <pc:chgData name="Fatima Pillosu" userId="a6295d4dc9e22643" providerId="LiveId" clId="{1093EB27-9F30-4B4D-905C-2834195C41DA}" dt="2025-05-26T06:01:08.471" v="328" actId="207"/>
         <pc:sldMkLst>
           <pc:docMk/>
           <pc:sldMk cId="2416666445" sldId="256"/>
@@ -143,340 +143,708 @@
             <ac:spMk id="2" creationId="{78813BBD-DA02-790E-6885-3D68FE8E134E}"/>
           </ac:spMkLst>
         </pc:spChg>
-        <pc:spChg chg="add mod">
-          <ac:chgData name="Fatima Pillosu" userId="a6295d4dc9e22643" providerId="LiveId" clId="{1093EB27-9F30-4B4D-905C-2834195C41DA}" dt="2025-05-14T13:43:38.718" v="41"/>
+        <pc:spChg chg="add del mod">
+          <ac:chgData name="Fatima Pillosu" userId="a6295d4dc9e22643" providerId="LiveId" clId="{1093EB27-9F30-4B4D-905C-2834195C41DA}" dt="2025-05-26T05:42:15.667" v="42" actId="21"/>
           <ac:spMkLst>
             <pc:docMk/>
             <pc:sldMk cId="2416666445" sldId="256"/>
             <ac:spMk id="5" creationId="{384D6C06-DC18-FF34-E84C-3BC146A8D3F9}"/>
           </ac:spMkLst>
         </pc:spChg>
-        <pc:spChg chg="add mod">
-          <ac:chgData name="Fatima Pillosu" userId="a6295d4dc9e22643" providerId="LiveId" clId="{1093EB27-9F30-4B4D-905C-2834195C41DA}" dt="2025-05-14T13:43:38.718" v="41"/>
+        <pc:spChg chg="add del mod">
+          <ac:chgData name="Fatima Pillosu" userId="a6295d4dc9e22643" providerId="LiveId" clId="{1093EB27-9F30-4B4D-905C-2834195C41DA}" dt="2025-05-26T05:42:15.667" v="42" actId="21"/>
           <ac:spMkLst>
             <pc:docMk/>
             <pc:sldMk cId="2416666445" sldId="256"/>
             <ac:spMk id="6" creationId="{083AEDDC-E5EB-E07A-CF91-E947C367E6C5}"/>
           </ac:spMkLst>
         </pc:spChg>
-        <pc:spChg chg="add mod">
-          <ac:chgData name="Fatima Pillosu" userId="a6295d4dc9e22643" providerId="LiveId" clId="{1093EB27-9F30-4B4D-905C-2834195C41DA}" dt="2025-05-14T13:43:38.718" v="41"/>
+        <pc:spChg chg="add del mod">
+          <ac:chgData name="Fatima Pillosu" userId="a6295d4dc9e22643" providerId="LiveId" clId="{1093EB27-9F30-4B4D-905C-2834195C41DA}" dt="2025-05-26T05:42:15.667" v="42" actId="21"/>
           <ac:spMkLst>
             <pc:docMk/>
             <pc:sldMk cId="2416666445" sldId="256"/>
             <ac:spMk id="7" creationId="{7EAFBB19-EFE8-1704-7506-55700BFD22E4}"/>
           </ac:spMkLst>
         </pc:spChg>
-        <pc:spChg chg="add mod">
-          <ac:chgData name="Fatima Pillosu" userId="a6295d4dc9e22643" providerId="LiveId" clId="{1093EB27-9F30-4B4D-905C-2834195C41DA}" dt="2025-05-14T13:43:38.718" v="41"/>
+        <pc:spChg chg="add del mod">
+          <ac:chgData name="Fatima Pillosu" userId="a6295d4dc9e22643" providerId="LiveId" clId="{1093EB27-9F30-4B4D-905C-2834195C41DA}" dt="2025-05-26T05:42:15.667" v="42" actId="21"/>
           <ac:spMkLst>
             <pc:docMk/>
             <pc:sldMk cId="2416666445" sldId="256"/>
             <ac:spMk id="8" creationId="{08E525C9-8B8B-856F-6464-CD2A9FEC19DD}"/>
           </ac:spMkLst>
         </pc:spChg>
-        <pc:spChg chg="add mod">
-          <ac:chgData name="Fatima Pillosu" userId="a6295d4dc9e22643" providerId="LiveId" clId="{1093EB27-9F30-4B4D-905C-2834195C41DA}" dt="2025-05-14T13:43:38.718" v="41"/>
+        <pc:spChg chg="add del mod">
+          <ac:chgData name="Fatima Pillosu" userId="a6295d4dc9e22643" providerId="LiveId" clId="{1093EB27-9F30-4B4D-905C-2834195C41DA}" dt="2025-05-26T05:42:15.667" v="42" actId="21"/>
           <ac:spMkLst>
             <pc:docMk/>
             <pc:sldMk cId="2416666445" sldId="256"/>
             <ac:spMk id="9" creationId="{823987BF-6FA7-EC5E-C5ED-325313D2AE59}"/>
           </ac:spMkLst>
         </pc:spChg>
-        <pc:spChg chg="add mod">
-          <ac:chgData name="Fatima Pillosu" userId="a6295d4dc9e22643" providerId="LiveId" clId="{1093EB27-9F30-4B4D-905C-2834195C41DA}" dt="2025-05-14T13:43:38.718" v="41"/>
+        <pc:spChg chg="add del mod">
+          <ac:chgData name="Fatima Pillosu" userId="a6295d4dc9e22643" providerId="LiveId" clId="{1093EB27-9F30-4B4D-905C-2834195C41DA}" dt="2025-05-26T05:42:15.667" v="42" actId="21"/>
           <ac:spMkLst>
             <pc:docMk/>
             <pc:sldMk cId="2416666445" sldId="256"/>
             <ac:spMk id="10" creationId="{26903909-39B6-BA49-59C4-AF4507DF29BF}"/>
           </ac:spMkLst>
         </pc:spChg>
-        <pc:spChg chg="add mod">
-          <ac:chgData name="Fatima Pillosu" userId="a6295d4dc9e22643" providerId="LiveId" clId="{1093EB27-9F30-4B4D-905C-2834195C41DA}" dt="2025-05-14T13:43:38.718" v="41"/>
+        <pc:spChg chg="add del mod">
+          <ac:chgData name="Fatima Pillosu" userId="a6295d4dc9e22643" providerId="LiveId" clId="{1093EB27-9F30-4B4D-905C-2834195C41DA}" dt="2025-05-26T05:42:15.667" v="42" actId="21"/>
           <ac:spMkLst>
             <pc:docMk/>
             <pc:sldMk cId="2416666445" sldId="256"/>
             <ac:spMk id="11" creationId="{0C834787-FEEB-B977-952A-288699762B58}"/>
           </ac:spMkLst>
         </pc:spChg>
-        <pc:spChg chg="add mod">
-          <ac:chgData name="Fatima Pillosu" userId="a6295d4dc9e22643" providerId="LiveId" clId="{1093EB27-9F30-4B4D-905C-2834195C41DA}" dt="2025-05-14T13:43:38.718" v="41"/>
+        <pc:spChg chg="add del mod">
+          <ac:chgData name="Fatima Pillosu" userId="a6295d4dc9e22643" providerId="LiveId" clId="{1093EB27-9F30-4B4D-905C-2834195C41DA}" dt="2025-05-26T05:42:15.667" v="42" actId="21"/>
           <ac:spMkLst>
             <pc:docMk/>
             <pc:sldMk cId="2416666445" sldId="256"/>
             <ac:spMk id="12" creationId="{61400BA6-3D3A-1190-AD65-CF1147A3BCBC}"/>
           </ac:spMkLst>
         </pc:spChg>
-        <pc:spChg chg="add mod">
-          <ac:chgData name="Fatima Pillosu" userId="a6295d4dc9e22643" providerId="LiveId" clId="{1093EB27-9F30-4B4D-905C-2834195C41DA}" dt="2025-05-14T13:43:38.718" v="41"/>
+        <pc:spChg chg="add del mod">
+          <ac:chgData name="Fatima Pillosu" userId="a6295d4dc9e22643" providerId="LiveId" clId="{1093EB27-9F30-4B4D-905C-2834195C41DA}" dt="2025-05-26T05:42:15.667" v="42" actId="21"/>
           <ac:spMkLst>
             <pc:docMk/>
             <pc:sldMk cId="2416666445" sldId="256"/>
             <ac:spMk id="13" creationId="{F77F9084-F223-ED65-669A-F6F51F897BA2}"/>
           </ac:spMkLst>
         </pc:spChg>
-        <pc:spChg chg="add mod">
-          <ac:chgData name="Fatima Pillosu" userId="a6295d4dc9e22643" providerId="LiveId" clId="{1093EB27-9F30-4B4D-905C-2834195C41DA}" dt="2025-05-14T13:43:38.718" v="41"/>
+        <pc:spChg chg="add del mod">
+          <ac:chgData name="Fatima Pillosu" userId="a6295d4dc9e22643" providerId="LiveId" clId="{1093EB27-9F30-4B4D-905C-2834195C41DA}" dt="2025-05-26T05:42:15.667" v="42" actId="21"/>
           <ac:spMkLst>
             <pc:docMk/>
             <pc:sldMk cId="2416666445" sldId="256"/>
             <ac:spMk id="14" creationId="{E58B7622-486E-AF0A-77FA-6A257F911DE9}"/>
           </ac:spMkLst>
         </pc:spChg>
-        <pc:spChg chg="add mod">
-          <ac:chgData name="Fatima Pillosu" userId="a6295d4dc9e22643" providerId="LiveId" clId="{1093EB27-9F30-4B4D-905C-2834195C41DA}" dt="2025-05-14T13:43:38.718" v="41"/>
+        <pc:spChg chg="add del mod">
+          <ac:chgData name="Fatima Pillosu" userId="a6295d4dc9e22643" providerId="LiveId" clId="{1093EB27-9F30-4B4D-905C-2834195C41DA}" dt="2025-05-26T05:42:15.667" v="42" actId="21"/>
           <ac:spMkLst>
             <pc:docMk/>
             <pc:sldMk cId="2416666445" sldId="256"/>
             <ac:spMk id="15" creationId="{53D672B0-A6EA-4276-A5B9-C5164A9A326F}"/>
           </ac:spMkLst>
         </pc:spChg>
-        <pc:spChg chg="add mod">
-          <ac:chgData name="Fatima Pillosu" userId="a6295d4dc9e22643" providerId="LiveId" clId="{1093EB27-9F30-4B4D-905C-2834195C41DA}" dt="2025-05-14T13:43:38.718" v="41"/>
+        <pc:spChg chg="add del mod">
+          <ac:chgData name="Fatima Pillosu" userId="a6295d4dc9e22643" providerId="LiveId" clId="{1093EB27-9F30-4B4D-905C-2834195C41DA}" dt="2025-05-26T05:42:15.667" v="42" actId="21"/>
           <ac:spMkLst>
             <pc:docMk/>
             <pc:sldMk cId="2416666445" sldId="256"/>
             <ac:spMk id="16" creationId="{FC073318-9596-D679-740B-BA408BA68B78}"/>
           </ac:spMkLst>
         </pc:spChg>
-        <pc:spChg chg="add mod">
-          <ac:chgData name="Fatima Pillosu" userId="a6295d4dc9e22643" providerId="LiveId" clId="{1093EB27-9F30-4B4D-905C-2834195C41DA}" dt="2025-05-14T13:43:38.718" v="41"/>
+        <pc:spChg chg="add del mod">
+          <ac:chgData name="Fatima Pillosu" userId="a6295d4dc9e22643" providerId="LiveId" clId="{1093EB27-9F30-4B4D-905C-2834195C41DA}" dt="2025-05-26T05:42:15.667" v="42" actId="21"/>
           <ac:spMkLst>
             <pc:docMk/>
             <pc:sldMk cId="2416666445" sldId="256"/>
             <ac:spMk id="17" creationId="{95D8CFCC-5F17-C4D6-6F70-8501F37736D8}"/>
           </ac:spMkLst>
         </pc:spChg>
-        <pc:spChg chg="add mod">
-          <ac:chgData name="Fatima Pillosu" userId="a6295d4dc9e22643" providerId="LiveId" clId="{1093EB27-9F30-4B4D-905C-2834195C41DA}" dt="2025-05-14T13:43:38.718" v="41"/>
+        <pc:spChg chg="add del mod">
+          <ac:chgData name="Fatima Pillosu" userId="a6295d4dc9e22643" providerId="LiveId" clId="{1093EB27-9F30-4B4D-905C-2834195C41DA}" dt="2025-05-26T05:42:15.667" v="42" actId="21"/>
           <ac:spMkLst>
             <pc:docMk/>
             <pc:sldMk cId="2416666445" sldId="256"/>
             <ac:spMk id="18" creationId="{E06CF797-8451-574D-21F0-384E8A3452B7}"/>
           </ac:spMkLst>
         </pc:spChg>
-        <pc:spChg chg="add mod">
-          <ac:chgData name="Fatima Pillosu" userId="a6295d4dc9e22643" providerId="LiveId" clId="{1093EB27-9F30-4B4D-905C-2834195C41DA}" dt="2025-05-14T13:43:38.718" v="41"/>
+        <pc:spChg chg="add del mod">
+          <ac:chgData name="Fatima Pillosu" userId="a6295d4dc9e22643" providerId="LiveId" clId="{1093EB27-9F30-4B4D-905C-2834195C41DA}" dt="2025-05-26T05:42:15.667" v="42" actId="21"/>
           <ac:spMkLst>
             <pc:docMk/>
             <pc:sldMk cId="2416666445" sldId="256"/>
             <ac:spMk id="19" creationId="{CFB3D8FA-6A39-82FF-7103-9C3B87E3F64B}"/>
           </ac:spMkLst>
         </pc:spChg>
-        <pc:spChg chg="add mod">
-          <ac:chgData name="Fatima Pillosu" userId="a6295d4dc9e22643" providerId="LiveId" clId="{1093EB27-9F30-4B4D-905C-2834195C41DA}" dt="2025-05-14T13:43:38.718" v="41"/>
+        <pc:spChg chg="add del mod">
+          <ac:chgData name="Fatima Pillosu" userId="a6295d4dc9e22643" providerId="LiveId" clId="{1093EB27-9F30-4B4D-905C-2834195C41DA}" dt="2025-05-26T05:42:15.667" v="42" actId="21"/>
           <ac:spMkLst>
             <pc:docMk/>
             <pc:sldMk cId="2416666445" sldId="256"/>
             <ac:spMk id="20" creationId="{5B2D0398-5206-B218-FB65-5E89CE52B185}"/>
           </ac:spMkLst>
         </pc:spChg>
-        <pc:spChg chg="add mod">
-          <ac:chgData name="Fatima Pillosu" userId="a6295d4dc9e22643" providerId="LiveId" clId="{1093EB27-9F30-4B4D-905C-2834195C41DA}" dt="2025-05-14T13:43:38.718" v="41"/>
+        <pc:spChg chg="add del mod">
+          <ac:chgData name="Fatima Pillosu" userId="a6295d4dc9e22643" providerId="LiveId" clId="{1093EB27-9F30-4B4D-905C-2834195C41DA}" dt="2025-05-26T05:42:15.667" v="42" actId="21"/>
           <ac:spMkLst>
             <pc:docMk/>
             <pc:sldMk cId="2416666445" sldId="256"/>
             <ac:spMk id="21" creationId="{E8F93690-0FC3-3203-F616-27D0636BD86D}"/>
           </ac:spMkLst>
         </pc:spChg>
-        <pc:spChg chg="add mod">
-          <ac:chgData name="Fatima Pillosu" userId="a6295d4dc9e22643" providerId="LiveId" clId="{1093EB27-9F30-4B4D-905C-2834195C41DA}" dt="2025-05-14T13:43:38.718" v="41"/>
+        <pc:spChg chg="add del mod">
+          <ac:chgData name="Fatima Pillosu" userId="a6295d4dc9e22643" providerId="LiveId" clId="{1093EB27-9F30-4B4D-905C-2834195C41DA}" dt="2025-05-26T05:42:15.667" v="42" actId="21"/>
           <ac:spMkLst>
             <pc:docMk/>
             <pc:sldMk cId="2416666445" sldId="256"/>
             <ac:spMk id="22" creationId="{98EE0CB6-A0DD-61DA-6B6B-D4EC8957FF3D}"/>
           </ac:spMkLst>
         </pc:spChg>
-        <pc:spChg chg="add mod">
-          <ac:chgData name="Fatima Pillosu" userId="a6295d4dc9e22643" providerId="LiveId" clId="{1093EB27-9F30-4B4D-905C-2834195C41DA}" dt="2025-05-14T13:43:38.718" v="41"/>
+        <pc:spChg chg="add del mod">
+          <ac:chgData name="Fatima Pillosu" userId="a6295d4dc9e22643" providerId="LiveId" clId="{1093EB27-9F30-4B4D-905C-2834195C41DA}" dt="2025-05-26T05:42:15.667" v="42" actId="21"/>
           <ac:spMkLst>
             <pc:docMk/>
             <pc:sldMk cId="2416666445" sldId="256"/>
             <ac:spMk id="23" creationId="{5C604597-7B68-19A8-35F6-C8E80447309D}"/>
           </ac:spMkLst>
         </pc:spChg>
-        <pc:spChg chg="add mod">
-          <ac:chgData name="Fatima Pillosu" userId="a6295d4dc9e22643" providerId="LiveId" clId="{1093EB27-9F30-4B4D-905C-2834195C41DA}" dt="2025-05-14T13:43:38.718" v="41"/>
+        <pc:spChg chg="add del mod">
+          <ac:chgData name="Fatima Pillosu" userId="a6295d4dc9e22643" providerId="LiveId" clId="{1093EB27-9F30-4B4D-905C-2834195C41DA}" dt="2025-05-26T05:42:15.667" v="42" actId="21"/>
           <ac:spMkLst>
             <pc:docMk/>
             <pc:sldMk cId="2416666445" sldId="256"/>
             <ac:spMk id="24" creationId="{37EBCA7E-9713-7AE3-638B-C84D5A1C2253}"/>
           </ac:spMkLst>
         </pc:spChg>
-        <pc:spChg chg="add mod">
-          <ac:chgData name="Fatima Pillosu" userId="a6295d4dc9e22643" providerId="LiveId" clId="{1093EB27-9F30-4B4D-905C-2834195C41DA}" dt="2025-05-14T13:43:38.718" v="41"/>
+        <pc:spChg chg="add del mod">
+          <ac:chgData name="Fatima Pillosu" userId="a6295d4dc9e22643" providerId="LiveId" clId="{1093EB27-9F30-4B4D-905C-2834195C41DA}" dt="2025-05-26T05:42:15.667" v="42" actId="21"/>
           <ac:spMkLst>
             <pc:docMk/>
             <pc:sldMk cId="2416666445" sldId="256"/>
             <ac:spMk id="25" creationId="{65B70626-067E-1AE7-11BD-EC7DA8DABC28}"/>
           </ac:spMkLst>
         </pc:spChg>
-        <pc:spChg chg="add mod">
-          <ac:chgData name="Fatima Pillosu" userId="a6295d4dc9e22643" providerId="LiveId" clId="{1093EB27-9F30-4B4D-905C-2834195C41DA}" dt="2025-05-14T13:43:38.718" v="41"/>
+        <pc:spChg chg="add del mod">
+          <ac:chgData name="Fatima Pillosu" userId="a6295d4dc9e22643" providerId="LiveId" clId="{1093EB27-9F30-4B4D-905C-2834195C41DA}" dt="2025-05-26T05:42:15.667" v="42" actId="21"/>
           <ac:spMkLst>
             <pc:docMk/>
             <pc:sldMk cId="2416666445" sldId="256"/>
             <ac:spMk id="26" creationId="{C7BCE81D-7A63-8764-295C-1A6242CC4274}"/>
           </ac:spMkLst>
         </pc:spChg>
-        <pc:spChg chg="add mod">
-          <ac:chgData name="Fatima Pillosu" userId="a6295d4dc9e22643" providerId="LiveId" clId="{1093EB27-9F30-4B4D-905C-2834195C41DA}" dt="2025-05-14T13:43:38.718" v="41"/>
+        <pc:spChg chg="add del mod">
+          <ac:chgData name="Fatima Pillosu" userId="a6295d4dc9e22643" providerId="LiveId" clId="{1093EB27-9F30-4B4D-905C-2834195C41DA}" dt="2025-05-26T05:42:15.667" v="42" actId="21"/>
           <ac:spMkLst>
             <pc:docMk/>
             <pc:sldMk cId="2416666445" sldId="256"/>
             <ac:spMk id="27" creationId="{A6515F5F-2E20-7D13-537C-F772A00535F4}"/>
           </ac:spMkLst>
         </pc:spChg>
-        <pc:spChg chg="add mod">
-          <ac:chgData name="Fatima Pillosu" userId="a6295d4dc9e22643" providerId="LiveId" clId="{1093EB27-9F30-4B4D-905C-2834195C41DA}" dt="2025-05-14T13:43:38.718" v="41"/>
+        <pc:spChg chg="add del mod">
+          <ac:chgData name="Fatima Pillosu" userId="a6295d4dc9e22643" providerId="LiveId" clId="{1093EB27-9F30-4B4D-905C-2834195C41DA}" dt="2025-05-26T05:42:15.667" v="42" actId="21"/>
           <ac:spMkLst>
             <pc:docMk/>
             <pc:sldMk cId="2416666445" sldId="256"/>
             <ac:spMk id="28" creationId="{50B578E0-62E1-B8F6-ECD2-2E7AA0CF70F9}"/>
           </ac:spMkLst>
         </pc:spChg>
-        <pc:spChg chg="add mod">
-          <ac:chgData name="Fatima Pillosu" userId="a6295d4dc9e22643" providerId="LiveId" clId="{1093EB27-9F30-4B4D-905C-2834195C41DA}" dt="2025-05-14T13:43:38.718" v="41"/>
+        <pc:spChg chg="add del mod">
+          <ac:chgData name="Fatima Pillosu" userId="a6295d4dc9e22643" providerId="LiveId" clId="{1093EB27-9F30-4B4D-905C-2834195C41DA}" dt="2025-05-26T05:42:15.667" v="42" actId="21"/>
           <ac:spMkLst>
             <pc:docMk/>
             <pc:sldMk cId="2416666445" sldId="256"/>
             <ac:spMk id="29" creationId="{F4D19594-8958-5678-A91A-D009CFEE0A3F}"/>
           </ac:spMkLst>
         </pc:spChg>
-        <pc:spChg chg="add mod">
-          <ac:chgData name="Fatima Pillosu" userId="a6295d4dc9e22643" providerId="LiveId" clId="{1093EB27-9F30-4B4D-905C-2834195C41DA}" dt="2025-05-14T13:43:38.718" v="41"/>
+        <pc:spChg chg="add del mod">
+          <ac:chgData name="Fatima Pillosu" userId="a6295d4dc9e22643" providerId="LiveId" clId="{1093EB27-9F30-4B4D-905C-2834195C41DA}" dt="2025-05-26T05:42:15.667" v="42" actId="21"/>
           <ac:spMkLst>
             <pc:docMk/>
             <pc:sldMk cId="2416666445" sldId="256"/>
             <ac:spMk id="30" creationId="{5ED4F7E3-EC48-9668-BA84-2D97CF23BD85}"/>
           </ac:spMkLst>
         </pc:spChg>
-        <pc:spChg chg="add mod">
-          <ac:chgData name="Fatima Pillosu" userId="a6295d4dc9e22643" providerId="LiveId" clId="{1093EB27-9F30-4B4D-905C-2834195C41DA}" dt="2025-05-14T13:43:38.718" v="41"/>
+        <pc:spChg chg="add del mod">
+          <ac:chgData name="Fatima Pillosu" userId="a6295d4dc9e22643" providerId="LiveId" clId="{1093EB27-9F30-4B4D-905C-2834195C41DA}" dt="2025-05-26T05:42:15.667" v="42" actId="21"/>
           <ac:spMkLst>
             <pc:docMk/>
             <pc:sldMk cId="2416666445" sldId="256"/>
             <ac:spMk id="31" creationId="{0ECA7152-99C7-A2F4-E83D-4F855AAFA37C}"/>
           </ac:spMkLst>
         </pc:spChg>
-        <pc:spChg chg="add mod">
-          <ac:chgData name="Fatima Pillosu" userId="a6295d4dc9e22643" providerId="LiveId" clId="{1093EB27-9F30-4B4D-905C-2834195C41DA}" dt="2025-05-14T13:43:38.718" v="41"/>
+        <pc:spChg chg="add del mod">
+          <ac:chgData name="Fatima Pillosu" userId="a6295d4dc9e22643" providerId="LiveId" clId="{1093EB27-9F30-4B4D-905C-2834195C41DA}" dt="2025-05-26T05:42:15.667" v="42" actId="21"/>
           <ac:spMkLst>
             <pc:docMk/>
             <pc:sldMk cId="2416666445" sldId="256"/>
             <ac:spMk id="32" creationId="{9FA7FCAD-7DCD-492E-33EA-E8EA0A4B7A03}"/>
           </ac:spMkLst>
         </pc:spChg>
-        <pc:spChg chg="add mod">
-          <ac:chgData name="Fatima Pillosu" userId="a6295d4dc9e22643" providerId="LiveId" clId="{1093EB27-9F30-4B4D-905C-2834195C41DA}" dt="2025-05-14T13:43:38.718" v="41"/>
+        <pc:spChg chg="add del mod">
+          <ac:chgData name="Fatima Pillosu" userId="a6295d4dc9e22643" providerId="LiveId" clId="{1093EB27-9F30-4B4D-905C-2834195C41DA}" dt="2025-05-26T05:42:15.667" v="42" actId="21"/>
           <ac:spMkLst>
             <pc:docMk/>
             <pc:sldMk cId="2416666445" sldId="256"/>
             <ac:spMk id="33" creationId="{27112713-98E8-0868-E1E6-C5213A18CDB4}"/>
           </ac:spMkLst>
         </pc:spChg>
-        <pc:spChg chg="add mod">
-          <ac:chgData name="Fatima Pillosu" userId="a6295d4dc9e22643" providerId="LiveId" clId="{1093EB27-9F30-4B4D-905C-2834195C41DA}" dt="2025-05-14T13:43:38.718" v="41"/>
+        <pc:spChg chg="add del mod">
+          <ac:chgData name="Fatima Pillosu" userId="a6295d4dc9e22643" providerId="LiveId" clId="{1093EB27-9F30-4B4D-905C-2834195C41DA}" dt="2025-05-26T05:42:15.667" v="42" actId="21"/>
           <ac:spMkLst>
             <pc:docMk/>
             <pc:sldMk cId="2416666445" sldId="256"/>
             <ac:spMk id="34" creationId="{A9DF4E4E-4BD6-4A43-6D8D-57FA7E5B4C8A}"/>
           </ac:spMkLst>
         </pc:spChg>
-        <pc:spChg chg="add mod">
-          <ac:chgData name="Fatima Pillosu" userId="a6295d4dc9e22643" providerId="LiveId" clId="{1093EB27-9F30-4B4D-905C-2834195C41DA}" dt="2025-05-14T13:43:38.718" v="41"/>
+        <pc:spChg chg="add del mod">
+          <ac:chgData name="Fatima Pillosu" userId="a6295d4dc9e22643" providerId="LiveId" clId="{1093EB27-9F30-4B4D-905C-2834195C41DA}" dt="2025-05-26T05:42:15.667" v="42" actId="21"/>
           <ac:spMkLst>
             <pc:docMk/>
             <pc:sldMk cId="2416666445" sldId="256"/>
             <ac:spMk id="35" creationId="{F880BE35-27AF-2DCD-5D81-D484CE796AE1}"/>
           </ac:spMkLst>
         </pc:spChg>
-        <pc:spChg chg="add mod">
-          <ac:chgData name="Fatima Pillosu" userId="a6295d4dc9e22643" providerId="LiveId" clId="{1093EB27-9F30-4B4D-905C-2834195C41DA}" dt="2025-05-14T13:43:38.718" v="41"/>
+        <pc:spChg chg="add del mod">
+          <ac:chgData name="Fatima Pillosu" userId="a6295d4dc9e22643" providerId="LiveId" clId="{1093EB27-9F30-4B4D-905C-2834195C41DA}" dt="2025-05-26T05:42:15.667" v="42" actId="21"/>
           <ac:spMkLst>
             <pc:docMk/>
             <pc:sldMk cId="2416666445" sldId="256"/>
             <ac:spMk id="36" creationId="{EA8BFD8B-1858-9531-2319-F3352B9FCE3E}"/>
           </ac:spMkLst>
         </pc:spChg>
-        <pc:spChg chg="add mod">
-          <ac:chgData name="Fatima Pillosu" userId="a6295d4dc9e22643" providerId="LiveId" clId="{1093EB27-9F30-4B4D-905C-2834195C41DA}" dt="2025-05-14T13:43:38.718" v="41"/>
+        <pc:spChg chg="add del mod">
+          <ac:chgData name="Fatima Pillosu" userId="a6295d4dc9e22643" providerId="LiveId" clId="{1093EB27-9F30-4B4D-905C-2834195C41DA}" dt="2025-05-26T05:42:15.667" v="42" actId="21"/>
           <ac:spMkLst>
             <pc:docMk/>
             <pc:sldMk cId="2416666445" sldId="256"/>
             <ac:spMk id="37" creationId="{804E7FEC-AF83-FD28-4A16-70D6430EB6E5}"/>
           </ac:spMkLst>
         </pc:spChg>
-        <pc:spChg chg="add mod">
-          <ac:chgData name="Fatima Pillosu" userId="a6295d4dc9e22643" providerId="LiveId" clId="{1093EB27-9F30-4B4D-905C-2834195C41DA}" dt="2025-05-14T13:43:38.718" v="41"/>
+        <pc:spChg chg="add del mod">
+          <ac:chgData name="Fatima Pillosu" userId="a6295d4dc9e22643" providerId="LiveId" clId="{1093EB27-9F30-4B4D-905C-2834195C41DA}" dt="2025-05-26T05:42:15.667" v="42" actId="21"/>
           <ac:spMkLst>
             <pc:docMk/>
             <pc:sldMk cId="2416666445" sldId="256"/>
             <ac:spMk id="38" creationId="{F1AE0BC5-794B-D23C-A945-2D48666A380B}"/>
           </ac:spMkLst>
         </pc:spChg>
-        <pc:spChg chg="add mod">
-          <ac:chgData name="Fatima Pillosu" userId="a6295d4dc9e22643" providerId="LiveId" clId="{1093EB27-9F30-4B4D-905C-2834195C41DA}" dt="2025-05-14T13:43:38.718" v="41"/>
+        <pc:spChg chg="add del mod">
+          <ac:chgData name="Fatima Pillosu" userId="a6295d4dc9e22643" providerId="LiveId" clId="{1093EB27-9F30-4B4D-905C-2834195C41DA}" dt="2025-05-26T05:42:15.667" v="42" actId="21"/>
           <ac:spMkLst>
             <pc:docMk/>
             <pc:sldMk cId="2416666445" sldId="256"/>
             <ac:spMk id="39" creationId="{3848180B-A357-5916-14AE-BEBA0E61C958}"/>
           </ac:spMkLst>
         </pc:spChg>
-        <pc:spChg chg="add mod">
-          <ac:chgData name="Fatima Pillosu" userId="a6295d4dc9e22643" providerId="LiveId" clId="{1093EB27-9F30-4B4D-905C-2834195C41DA}" dt="2025-05-14T13:43:38.718" v="41"/>
+        <pc:spChg chg="add del mod">
+          <ac:chgData name="Fatima Pillosu" userId="a6295d4dc9e22643" providerId="LiveId" clId="{1093EB27-9F30-4B4D-905C-2834195C41DA}" dt="2025-05-26T05:42:15.667" v="42" actId="21"/>
           <ac:spMkLst>
             <pc:docMk/>
             <pc:sldMk cId="2416666445" sldId="256"/>
             <ac:spMk id="40" creationId="{F88C8933-F6FB-E197-23C5-6A6AC1467788}"/>
           </ac:spMkLst>
         </pc:spChg>
-        <pc:spChg chg="add mod">
-          <ac:chgData name="Fatima Pillosu" userId="a6295d4dc9e22643" providerId="LiveId" clId="{1093EB27-9F30-4B4D-905C-2834195C41DA}" dt="2025-05-14T13:43:38.718" v="41"/>
+        <pc:spChg chg="add del mod">
+          <ac:chgData name="Fatima Pillosu" userId="a6295d4dc9e22643" providerId="LiveId" clId="{1093EB27-9F30-4B4D-905C-2834195C41DA}" dt="2025-05-26T05:42:15.667" v="42" actId="21"/>
           <ac:spMkLst>
             <pc:docMk/>
             <pc:sldMk cId="2416666445" sldId="256"/>
             <ac:spMk id="41" creationId="{708DFDE3-CB83-C412-EE9B-B89348B18975}"/>
           </ac:spMkLst>
         </pc:spChg>
-        <pc:spChg chg="add mod">
-          <ac:chgData name="Fatima Pillosu" userId="a6295d4dc9e22643" providerId="LiveId" clId="{1093EB27-9F30-4B4D-905C-2834195C41DA}" dt="2025-05-14T13:43:38.718" v="41"/>
+        <pc:spChg chg="add del mod">
+          <ac:chgData name="Fatima Pillosu" userId="a6295d4dc9e22643" providerId="LiveId" clId="{1093EB27-9F30-4B4D-905C-2834195C41DA}" dt="2025-05-26T05:42:15.667" v="42" actId="21"/>
           <ac:spMkLst>
             <pc:docMk/>
             <pc:sldMk cId="2416666445" sldId="256"/>
             <ac:spMk id="42" creationId="{0A4512A2-4DC0-76EB-1C78-328A3FA136E0}"/>
           </ac:spMkLst>
         </pc:spChg>
-        <pc:spChg chg="add mod">
-          <ac:chgData name="Fatima Pillosu" userId="a6295d4dc9e22643" providerId="LiveId" clId="{1093EB27-9F30-4B4D-905C-2834195C41DA}" dt="2025-05-14T13:43:38.718" v="41"/>
+        <pc:spChg chg="add del mod">
+          <ac:chgData name="Fatima Pillosu" userId="a6295d4dc9e22643" providerId="LiveId" clId="{1093EB27-9F30-4B4D-905C-2834195C41DA}" dt="2025-05-26T05:42:15.667" v="42" actId="21"/>
           <ac:spMkLst>
             <pc:docMk/>
             <pc:sldMk cId="2416666445" sldId="256"/>
             <ac:spMk id="43" creationId="{AC1F07BA-7A38-7AE9-D91C-D217054E2654}"/>
           </ac:spMkLst>
         </pc:spChg>
-        <pc:spChg chg="add mod">
-          <ac:chgData name="Fatima Pillosu" userId="a6295d4dc9e22643" providerId="LiveId" clId="{1093EB27-9F30-4B4D-905C-2834195C41DA}" dt="2025-05-14T13:43:38.718" v="41"/>
+        <pc:spChg chg="add del mod">
+          <ac:chgData name="Fatima Pillosu" userId="a6295d4dc9e22643" providerId="LiveId" clId="{1093EB27-9F30-4B4D-905C-2834195C41DA}" dt="2025-05-26T05:42:15.667" v="42" actId="21"/>
           <ac:spMkLst>
             <pc:docMk/>
             <pc:sldMk cId="2416666445" sldId="256"/>
             <ac:spMk id="44" creationId="{7DD94525-DBC6-1FC2-0B07-84FAFBA131A8}"/>
           </ac:spMkLst>
         </pc:spChg>
-        <pc:spChg chg="add mod">
-          <ac:chgData name="Fatima Pillosu" userId="a6295d4dc9e22643" providerId="LiveId" clId="{1093EB27-9F30-4B4D-905C-2834195C41DA}" dt="2025-05-14T13:43:38.718" v="41"/>
+        <pc:spChg chg="add del mod">
+          <ac:chgData name="Fatima Pillosu" userId="a6295d4dc9e22643" providerId="LiveId" clId="{1093EB27-9F30-4B4D-905C-2834195C41DA}" dt="2025-05-26T05:42:15.667" v="42" actId="21"/>
           <ac:spMkLst>
             <pc:docMk/>
             <pc:sldMk cId="2416666445" sldId="256"/>
             <ac:spMk id="45" creationId="{50D9BC42-F1FE-87AB-F083-5C2242BD4E51}"/>
           </ac:spMkLst>
         </pc:spChg>
-        <pc:spChg chg="add mod">
-          <ac:chgData name="Fatima Pillosu" userId="a6295d4dc9e22643" providerId="LiveId" clId="{1093EB27-9F30-4B4D-905C-2834195C41DA}" dt="2025-05-14T13:43:38.718" v="41"/>
+        <pc:spChg chg="add del mod">
+          <ac:chgData name="Fatima Pillosu" userId="a6295d4dc9e22643" providerId="LiveId" clId="{1093EB27-9F30-4B4D-905C-2834195C41DA}" dt="2025-05-26T05:42:15.667" v="42" actId="21"/>
           <ac:spMkLst>
             <pc:docMk/>
             <pc:sldMk cId="2416666445" sldId="256"/>
             <ac:spMk id="46" creationId="{CA271F21-2E92-827F-B5C7-9933695D1A74}"/>
+          </ac:spMkLst>
+        </pc:spChg>
+        <pc:spChg chg="add del mod">
+          <ac:chgData name="Fatima Pillosu" userId="a6295d4dc9e22643" providerId="LiveId" clId="{1093EB27-9F30-4B4D-905C-2834195C41DA}" dt="2025-05-26T05:48:03.628" v="322" actId="21"/>
+          <ac:spMkLst>
+            <pc:docMk/>
+            <pc:sldMk cId="2416666445" sldId="256"/>
+            <ac:spMk id="48" creationId="{384D6C06-DC18-FF34-E84C-3BC146A8D3F9}"/>
+          </ac:spMkLst>
+        </pc:spChg>
+        <pc:spChg chg="add del mod">
+          <ac:chgData name="Fatima Pillosu" userId="a6295d4dc9e22643" providerId="LiveId" clId="{1093EB27-9F30-4B4D-905C-2834195C41DA}" dt="2025-05-26T05:48:03.628" v="322" actId="21"/>
+          <ac:spMkLst>
+            <pc:docMk/>
+            <pc:sldMk cId="2416666445" sldId="256"/>
+            <ac:spMk id="49" creationId="{083AEDDC-E5EB-E07A-CF91-E947C367E6C5}"/>
+          </ac:spMkLst>
+        </pc:spChg>
+        <pc:spChg chg="add del mod">
+          <ac:chgData name="Fatima Pillosu" userId="a6295d4dc9e22643" providerId="LiveId" clId="{1093EB27-9F30-4B4D-905C-2834195C41DA}" dt="2025-05-26T05:48:03.628" v="322" actId="21"/>
+          <ac:spMkLst>
+            <pc:docMk/>
+            <pc:sldMk cId="2416666445" sldId="256"/>
+            <ac:spMk id="50" creationId="{7EAFBB19-EFE8-1704-7506-55700BFD22E4}"/>
+          </ac:spMkLst>
+        </pc:spChg>
+        <pc:spChg chg="add del mod">
+          <ac:chgData name="Fatima Pillosu" userId="a6295d4dc9e22643" providerId="LiveId" clId="{1093EB27-9F30-4B4D-905C-2834195C41DA}" dt="2025-05-26T05:48:03.628" v="322" actId="21"/>
+          <ac:spMkLst>
+            <pc:docMk/>
+            <pc:sldMk cId="2416666445" sldId="256"/>
+            <ac:spMk id="51" creationId="{08E525C9-8B8B-856F-6464-CD2A9FEC19DD}"/>
+          </ac:spMkLst>
+        </pc:spChg>
+        <pc:spChg chg="add del mod">
+          <ac:chgData name="Fatima Pillosu" userId="a6295d4dc9e22643" providerId="LiveId" clId="{1093EB27-9F30-4B4D-905C-2834195C41DA}" dt="2025-05-26T05:48:03.628" v="322" actId="21"/>
+          <ac:spMkLst>
+            <pc:docMk/>
+            <pc:sldMk cId="2416666445" sldId="256"/>
+            <ac:spMk id="52" creationId="{823987BF-6FA7-EC5E-C5ED-325313D2AE59}"/>
+          </ac:spMkLst>
+        </pc:spChg>
+        <pc:spChg chg="add del mod">
+          <ac:chgData name="Fatima Pillosu" userId="a6295d4dc9e22643" providerId="LiveId" clId="{1093EB27-9F30-4B4D-905C-2834195C41DA}" dt="2025-05-26T05:48:03.628" v="322" actId="21"/>
+          <ac:spMkLst>
+            <pc:docMk/>
+            <pc:sldMk cId="2416666445" sldId="256"/>
+            <ac:spMk id="53" creationId="{26903909-39B6-BA49-59C4-AF4507DF29BF}"/>
+          </ac:spMkLst>
+        </pc:spChg>
+        <pc:spChg chg="add del mod">
+          <ac:chgData name="Fatima Pillosu" userId="a6295d4dc9e22643" providerId="LiveId" clId="{1093EB27-9F30-4B4D-905C-2834195C41DA}" dt="2025-05-26T05:48:03.628" v="322" actId="21"/>
+          <ac:spMkLst>
+            <pc:docMk/>
+            <pc:sldMk cId="2416666445" sldId="256"/>
+            <ac:spMk id="54" creationId="{0C834787-FEEB-B977-952A-288699762B58}"/>
+          </ac:spMkLst>
+        </pc:spChg>
+        <pc:spChg chg="add del mod">
+          <ac:chgData name="Fatima Pillosu" userId="a6295d4dc9e22643" providerId="LiveId" clId="{1093EB27-9F30-4B4D-905C-2834195C41DA}" dt="2025-05-26T05:48:03.628" v="322" actId="21"/>
+          <ac:spMkLst>
+            <pc:docMk/>
+            <pc:sldMk cId="2416666445" sldId="256"/>
+            <ac:spMk id="55" creationId="{61400BA6-3D3A-1190-AD65-CF1147A3BCBC}"/>
+          </ac:spMkLst>
+        </pc:spChg>
+        <pc:spChg chg="add del mod">
+          <ac:chgData name="Fatima Pillosu" userId="a6295d4dc9e22643" providerId="LiveId" clId="{1093EB27-9F30-4B4D-905C-2834195C41DA}" dt="2025-05-26T05:48:03.628" v="322" actId="21"/>
+          <ac:spMkLst>
+            <pc:docMk/>
+            <pc:sldMk cId="2416666445" sldId="256"/>
+            <ac:spMk id="56" creationId="{F77F9084-F223-ED65-669A-F6F51F897BA2}"/>
+          </ac:spMkLst>
+        </pc:spChg>
+        <pc:spChg chg="add del mod">
+          <ac:chgData name="Fatima Pillosu" userId="a6295d4dc9e22643" providerId="LiveId" clId="{1093EB27-9F30-4B4D-905C-2834195C41DA}" dt="2025-05-26T05:48:03.628" v="322" actId="21"/>
+          <ac:spMkLst>
+            <pc:docMk/>
+            <pc:sldMk cId="2416666445" sldId="256"/>
+            <ac:spMk id="57" creationId="{E58B7622-486E-AF0A-77FA-6A257F911DE9}"/>
+          </ac:spMkLst>
+        </pc:spChg>
+        <pc:spChg chg="add del mod">
+          <ac:chgData name="Fatima Pillosu" userId="a6295d4dc9e22643" providerId="LiveId" clId="{1093EB27-9F30-4B4D-905C-2834195C41DA}" dt="2025-05-26T05:48:03.628" v="322" actId="21"/>
+          <ac:spMkLst>
+            <pc:docMk/>
+            <pc:sldMk cId="2416666445" sldId="256"/>
+            <ac:spMk id="58" creationId="{53D672B0-A6EA-4276-A5B9-C5164A9A326F}"/>
+          </ac:spMkLst>
+        </pc:spChg>
+        <pc:spChg chg="add del mod">
+          <ac:chgData name="Fatima Pillosu" userId="a6295d4dc9e22643" providerId="LiveId" clId="{1093EB27-9F30-4B4D-905C-2834195C41DA}" dt="2025-05-26T05:48:03.628" v="322" actId="21"/>
+          <ac:spMkLst>
+            <pc:docMk/>
+            <pc:sldMk cId="2416666445" sldId="256"/>
+            <ac:spMk id="59" creationId="{FC073318-9596-D679-740B-BA408BA68B78}"/>
+          </ac:spMkLst>
+        </pc:spChg>
+        <pc:spChg chg="add del mod">
+          <ac:chgData name="Fatima Pillosu" userId="a6295d4dc9e22643" providerId="LiveId" clId="{1093EB27-9F30-4B4D-905C-2834195C41DA}" dt="2025-05-26T05:48:03.628" v="322" actId="21"/>
+          <ac:spMkLst>
+            <pc:docMk/>
+            <pc:sldMk cId="2416666445" sldId="256"/>
+            <ac:spMk id="60" creationId="{95D8CFCC-5F17-C4D6-6F70-8501F37736D8}"/>
+          </ac:spMkLst>
+        </pc:spChg>
+        <pc:spChg chg="add del mod">
+          <ac:chgData name="Fatima Pillosu" userId="a6295d4dc9e22643" providerId="LiveId" clId="{1093EB27-9F30-4B4D-905C-2834195C41DA}" dt="2025-05-26T05:48:03.628" v="322" actId="21"/>
+          <ac:spMkLst>
+            <pc:docMk/>
+            <pc:sldMk cId="2416666445" sldId="256"/>
+            <ac:spMk id="61" creationId="{E06CF797-8451-574D-21F0-384E8A3452B7}"/>
+          </ac:spMkLst>
+        </pc:spChg>
+        <pc:spChg chg="add del mod">
+          <ac:chgData name="Fatima Pillosu" userId="a6295d4dc9e22643" providerId="LiveId" clId="{1093EB27-9F30-4B4D-905C-2834195C41DA}" dt="2025-05-26T05:48:03.628" v="322" actId="21"/>
+          <ac:spMkLst>
+            <pc:docMk/>
+            <pc:sldMk cId="2416666445" sldId="256"/>
+            <ac:spMk id="62" creationId="{CFB3D8FA-6A39-82FF-7103-9C3B87E3F64B}"/>
+          </ac:spMkLst>
+        </pc:spChg>
+        <pc:spChg chg="add del mod">
+          <ac:chgData name="Fatima Pillosu" userId="a6295d4dc9e22643" providerId="LiveId" clId="{1093EB27-9F30-4B4D-905C-2834195C41DA}" dt="2025-05-26T05:48:03.628" v="322" actId="21"/>
+          <ac:spMkLst>
+            <pc:docMk/>
+            <pc:sldMk cId="2416666445" sldId="256"/>
+            <ac:spMk id="63" creationId="{5B2D0398-5206-B218-FB65-5E89CE52B185}"/>
+          </ac:spMkLst>
+        </pc:spChg>
+        <pc:spChg chg="add del mod">
+          <ac:chgData name="Fatima Pillosu" userId="a6295d4dc9e22643" providerId="LiveId" clId="{1093EB27-9F30-4B4D-905C-2834195C41DA}" dt="2025-05-26T05:48:03.628" v="322" actId="21"/>
+          <ac:spMkLst>
+            <pc:docMk/>
+            <pc:sldMk cId="2416666445" sldId="256"/>
+            <ac:spMk id="64" creationId="{E8F93690-0FC3-3203-F616-27D0636BD86D}"/>
+          </ac:spMkLst>
+        </pc:spChg>
+        <pc:spChg chg="add del mod">
+          <ac:chgData name="Fatima Pillosu" userId="a6295d4dc9e22643" providerId="LiveId" clId="{1093EB27-9F30-4B4D-905C-2834195C41DA}" dt="2025-05-26T05:48:03.628" v="322" actId="21"/>
+          <ac:spMkLst>
+            <pc:docMk/>
+            <pc:sldMk cId="2416666445" sldId="256"/>
+            <ac:spMk id="65" creationId="{98EE0CB6-A0DD-61DA-6B6B-D4EC8957FF3D}"/>
+          </ac:spMkLst>
+        </pc:spChg>
+        <pc:spChg chg="add del mod">
+          <ac:chgData name="Fatima Pillosu" userId="a6295d4dc9e22643" providerId="LiveId" clId="{1093EB27-9F30-4B4D-905C-2834195C41DA}" dt="2025-05-26T05:48:03.628" v="322" actId="21"/>
+          <ac:spMkLst>
+            <pc:docMk/>
+            <pc:sldMk cId="2416666445" sldId="256"/>
+            <ac:spMk id="66" creationId="{5C604597-7B68-19A8-35F6-C8E80447309D}"/>
+          </ac:spMkLst>
+        </pc:spChg>
+        <pc:spChg chg="add del mod">
+          <ac:chgData name="Fatima Pillosu" userId="a6295d4dc9e22643" providerId="LiveId" clId="{1093EB27-9F30-4B4D-905C-2834195C41DA}" dt="2025-05-26T05:48:03.628" v="322" actId="21"/>
+          <ac:spMkLst>
+            <pc:docMk/>
+            <pc:sldMk cId="2416666445" sldId="256"/>
+            <ac:spMk id="67" creationId="{37EBCA7E-9713-7AE3-638B-C84D5A1C2253}"/>
+          </ac:spMkLst>
+        </pc:spChg>
+        <pc:spChg chg="add del mod">
+          <ac:chgData name="Fatima Pillosu" userId="a6295d4dc9e22643" providerId="LiveId" clId="{1093EB27-9F30-4B4D-905C-2834195C41DA}" dt="2025-05-26T05:48:03.628" v="322" actId="21"/>
+          <ac:spMkLst>
+            <pc:docMk/>
+            <pc:sldMk cId="2416666445" sldId="256"/>
+            <ac:spMk id="68" creationId="{65B70626-067E-1AE7-11BD-EC7DA8DABC28}"/>
+          </ac:spMkLst>
+        </pc:spChg>
+        <pc:spChg chg="add del mod">
+          <ac:chgData name="Fatima Pillosu" userId="a6295d4dc9e22643" providerId="LiveId" clId="{1093EB27-9F30-4B4D-905C-2834195C41DA}" dt="2025-05-26T05:48:03.628" v="322" actId="21"/>
+          <ac:spMkLst>
+            <pc:docMk/>
+            <pc:sldMk cId="2416666445" sldId="256"/>
+            <ac:spMk id="69" creationId="{C7BCE81D-7A63-8764-295C-1A6242CC4274}"/>
+          </ac:spMkLst>
+        </pc:spChg>
+        <pc:spChg chg="add del mod">
+          <ac:chgData name="Fatima Pillosu" userId="a6295d4dc9e22643" providerId="LiveId" clId="{1093EB27-9F30-4B4D-905C-2834195C41DA}" dt="2025-05-26T05:48:03.628" v="322" actId="21"/>
+          <ac:spMkLst>
+            <pc:docMk/>
+            <pc:sldMk cId="2416666445" sldId="256"/>
+            <ac:spMk id="70" creationId="{A6515F5F-2E20-7D13-537C-F772A00535F4}"/>
+          </ac:spMkLst>
+        </pc:spChg>
+        <pc:spChg chg="add del mod">
+          <ac:chgData name="Fatima Pillosu" userId="a6295d4dc9e22643" providerId="LiveId" clId="{1093EB27-9F30-4B4D-905C-2834195C41DA}" dt="2025-05-26T05:48:03.628" v="322" actId="21"/>
+          <ac:spMkLst>
+            <pc:docMk/>
+            <pc:sldMk cId="2416666445" sldId="256"/>
+            <ac:spMk id="71" creationId="{50B578E0-62E1-B8F6-ECD2-2E7AA0CF70F9}"/>
+          </ac:spMkLst>
+        </pc:spChg>
+        <pc:spChg chg="add del mod">
+          <ac:chgData name="Fatima Pillosu" userId="a6295d4dc9e22643" providerId="LiveId" clId="{1093EB27-9F30-4B4D-905C-2834195C41DA}" dt="2025-05-26T05:48:03.628" v="322" actId="21"/>
+          <ac:spMkLst>
+            <pc:docMk/>
+            <pc:sldMk cId="2416666445" sldId="256"/>
+            <ac:spMk id="72" creationId="{F4D19594-8958-5678-A91A-D009CFEE0A3F}"/>
+          </ac:spMkLst>
+        </pc:spChg>
+        <pc:spChg chg="add del mod">
+          <ac:chgData name="Fatima Pillosu" userId="a6295d4dc9e22643" providerId="LiveId" clId="{1093EB27-9F30-4B4D-905C-2834195C41DA}" dt="2025-05-26T05:48:03.628" v="322" actId="21"/>
+          <ac:spMkLst>
+            <pc:docMk/>
+            <pc:sldMk cId="2416666445" sldId="256"/>
+            <ac:spMk id="73" creationId="{5ED4F7E3-EC48-9668-BA84-2D97CF23BD85}"/>
+          </ac:spMkLst>
+        </pc:spChg>
+        <pc:spChg chg="add del mod">
+          <ac:chgData name="Fatima Pillosu" userId="a6295d4dc9e22643" providerId="LiveId" clId="{1093EB27-9F30-4B4D-905C-2834195C41DA}" dt="2025-05-26T05:48:03.628" v="322" actId="21"/>
+          <ac:spMkLst>
+            <pc:docMk/>
+            <pc:sldMk cId="2416666445" sldId="256"/>
+            <ac:spMk id="74" creationId="{0ECA7152-99C7-A2F4-E83D-4F855AAFA37C}"/>
+          </ac:spMkLst>
+        </pc:spChg>
+        <pc:spChg chg="add del mod">
+          <ac:chgData name="Fatima Pillosu" userId="a6295d4dc9e22643" providerId="LiveId" clId="{1093EB27-9F30-4B4D-905C-2834195C41DA}" dt="2025-05-26T05:48:03.628" v="322" actId="21"/>
+          <ac:spMkLst>
+            <pc:docMk/>
+            <pc:sldMk cId="2416666445" sldId="256"/>
+            <ac:spMk id="75" creationId="{9FA7FCAD-7DCD-492E-33EA-E8EA0A4B7A03}"/>
+          </ac:spMkLst>
+        </pc:spChg>
+        <pc:spChg chg="add del mod">
+          <ac:chgData name="Fatima Pillosu" userId="a6295d4dc9e22643" providerId="LiveId" clId="{1093EB27-9F30-4B4D-905C-2834195C41DA}" dt="2025-05-26T05:48:03.628" v="322" actId="21"/>
+          <ac:spMkLst>
+            <pc:docMk/>
+            <pc:sldMk cId="2416666445" sldId="256"/>
+            <ac:spMk id="76" creationId="{27112713-98E8-0868-E1E6-C5213A18CDB4}"/>
+          </ac:spMkLst>
+        </pc:spChg>
+        <pc:spChg chg="add del mod">
+          <ac:chgData name="Fatima Pillosu" userId="a6295d4dc9e22643" providerId="LiveId" clId="{1093EB27-9F30-4B4D-905C-2834195C41DA}" dt="2025-05-26T05:48:03.628" v="322" actId="21"/>
+          <ac:spMkLst>
+            <pc:docMk/>
+            <pc:sldMk cId="2416666445" sldId="256"/>
+            <ac:spMk id="77" creationId="{A9DF4E4E-4BD6-4A43-6D8D-57FA7E5B4C8A}"/>
+          </ac:spMkLst>
+        </pc:spChg>
+        <pc:spChg chg="add del mod">
+          <ac:chgData name="Fatima Pillosu" userId="a6295d4dc9e22643" providerId="LiveId" clId="{1093EB27-9F30-4B4D-905C-2834195C41DA}" dt="2025-05-26T05:48:03.628" v="322" actId="21"/>
+          <ac:spMkLst>
+            <pc:docMk/>
+            <pc:sldMk cId="2416666445" sldId="256"/>
+            <ac:spMk id="78" creationId="{F880BE35-27AF-2DCD-5D81-D484CE796AE1}"/>
+          </ac:spMkLst>
+        </pc:spChg>
+        <pc:spChg chg="add del mod">
+          <ac:chgData name="Fatima Pillosu" userId="a6295d4dc9e22643" providerId="LiveId" clId="{1093EB27-9F30-4B4D-905C-2834195C41DA}" dt="2025-05-26T05:48:03.628" v="322" actId="21"/>
+          <ac:spMkLst>
+            <pc:docMk/>
+            <pc:sldMk cId="2416666445" sldId="256"/>
+            <ac:spMk id="79" creationId="{EA8BFD8B-1858-9531-2319-F3352B9FCE3E}"/>
+          </ac:spMkLst>
+        </pc:spChg>
+        <pc:spChg chg="add del mod">
+          <ac:chgData name="Fatima Pillosu" userId="a6295d4dc9e22643" providerId="LiveId" clId="{1093EB27-9F30-4B4D-905C-2834195C41DA}" dt="2025-05-26T05:48:03.628" v="322" actId="21"/>
+          <ac:spMkLst>
+            <pc:docMk/>
+            <pc:sldMk cId="2416666445" sldId="256"/>
+            <ac:spMk id="80" creationId="{804E7FEC-AF83-FD28-4A16-70D6430EB6E5}"/>
+          </ac:spMkLst>
+        </pc:spChg>
+        <pc:spChg chg="add del mod">
+          <ac:chgData name="Fatima Pillosu" userId="a6295d4dc9e22643" providerId="LiveId" clId="{1093EB27-9F30-4B4D-905C-2834195C41DA}" dt="2025-05-26T05:48:03.628" v="322" actId="21"/>
+          <ac:spMkLst>
+            <pc:docMk/>
+            <pc:sldMk cId="2416666445" sldId="256"/>
+            <ac:spMk id="81" creationId="{F1AE0BC5-794B-D23C-A945-2D48666A380B}"/>
+          </ac:spMkLst>
+        </pc:spChg>
+        <pc:spChg chg="add del mod">
+          <ac:chgData name="Fatima Pillosu" userId="a6295d4dc9e22643" providerId="LiveId" clId="{1093EB27-9F30-4B4D-905C-2834195C41DA}" dt="2025-05-26T05:48:03.628" v="322" actId="21"/>
+          <ac:spMkLst>
+            <pc:docMk/>
+            <pc:sldMk cId="2416666445" sldId="256"/>
+            <ac:spMk id="82" creationId="{3848180B-A357-5916-14AE-BEBA0E61C958}"/>
+          </ac:spMkLst>
+        </pc:spChg>
+        <pc:spChg chg="add del mod">
+          <ac:chgData name="Fatima Pillosu" userId="a6295d4dc9e22643" providerId="LiveId" clId="{1093EB27-9F30-4B4D-905C-2834195C41DA}" dt="2025-05-26T05:48:03.628" v="322" actId="21"/>
+          <ac:spMkLst>
+            <pc:docMk/>
+            <pc:sldMk cId="2416666445" sldId="256"/>
+            <ac:spMk id="83" creationId="{F88C8933-F6FB-E197-23C5-6A6AC1467788}"/>
+          </ac:spMkLst>
+        </pc:spChg>
+        <pc:spChg chg="add del mod">
+          <ac:chgData name="Fatima Pillosu" userId="a6295d4dc9e22643" providerId="LiveId" clId="{1093EB27-9F30-4B4D-905C-2834195C41DA}" dt="2025-05-26T05:48:03.628" v="322" actId="21"/>
+          <ac:spMkLst>
+            <pc:docMk/>
+            <pc:sldMk cId="2416666445" sldId="256"/>
+            <ac:spMk id="84" creationId="{708DFDE3-CB83-C412-EE9B-B89348B18975}"/>
+          </ac:spMkLst>
+        </pc:spChg>
+        <pc:spChg chg="add del mod">
+          <ac:chgData name="Fatima Pillosu" userId="a6295d4dc9e22643" providerId="LiveId" clId="{1093EB27-9F30-4B4D-905C-2834195C41DA}" dt="2025-05-26T05:48:03.628" v="322" actId="21"/>
+          <ac:spMkLst>
+            <pc:docMk/>
+            <pc:sldMk cId="2416666445" sldId="256"/>
+            <ac:spMk id="85" creationId="{0A4512A2-4DC0-76EB-1C78-328A3FA136E0}"/>
+          </ac:spMkLst>
+        </pc:spChg>
+        <pc:spChg chg="add del mod">
+          <ac:chgData name="Fatima Pillosu" userId="a6295d4dc9e22643" providerId="LiveId" clId="{1093EB27-9F30-4B4D-905C-2834195C41DA}" dt="2025-05-26T05:48:03.628" v="322" actId="21"/>
+          <ac:spMkLst>
+            <pc:docMk/>
+            <pc:sldMk cId="2416666445" sldId="256"/>
+            <ac:spMk id="86" creationId="{AC1F07BA-7A38-7AE9-D91C-D217054E2654}"/>
+          </ac:spMkLst>
+        </pc:spChg>
+        <pc:spChg chg="add del mod">
+          <ac:chgData name="Fatima Pillosu" userId="a6295d4dc9e22643" providerId="LiveId" clId="{1093EB27-9F30-4B4D-905C-2834195C41DA}" dt="2025-05-26T05:48:03.628" v="322" actId="21"/>
+          <ac:spMkLst>
+            <pc:docMk/>
+            <pc:sldMk cId="2416666445" sldId="256"/>
+            <ac:spMk id="87" creationId="{7DD94525-DBC6-1FC2-0B07-84FAFBA131A8}"/>
+          </ac:spMkLst>
+        </pc:spChg>
+        <pc:spChg chg="add del mod">
+          <ac:chgData name="Fatima Pillosu" userId="a6295d4dc9e22643" providerId="LiveId" clId="{1093EB27-9F30-4B4D-905C-2834195C41DA}" dt="2025-05-26T05:48:03.628" v="322" actId="21"/>
+          <ac:spMkLst>
+            <pc:docMk/>
+            <pc:sldMk cId="2416666445" sldId="256"/>
+            <ac:spMk id="88" creationId="{50D9BC42-F1FE-87AB-F083-5C2242BD4E51}"/>
+          </ac:spMkLst>
+        </pc:spChg>
+        <pc:spChg chg="add del mod">
+          <ac:chgData name="Fatima Pillosu" userId="a6295d4dc9e22643" providerId="LiveId" clId="{1093EB27-9F30-4B4D-905C-2834195C41DA}" dt="2025-05-26T05:48:03.628" v="322" actId="21"/>
+          <ac:spMkLst>
+            <pc:docMk/>
+            <pc:sldMk cId="2416666445" sldId="256"/>
+            <ac:spMk id="89" creationId="{CA271F21-2E92-827F-B5C7-9933695D1A74}"/>
+          </ac:spMkLst>
+        </pc:spChg>
+        <pc:spChg chg="add del mod">
+          <ac:chgData name="Fatima Pillosu" userId="a6295d4dc9e22643" providerId="LiveId" clId="{1093EB27-9F30-4B4D-905C-2834195C41DA}" dt="2025-05-26T05:48:03.628" v="322" actId="21"/>
+          <ac:spMkLst>
+            <pc:docMk/>
+            <pc:sldMk cId="2416666445" sldId="256"/>
+            <ac:spMk id="90" creationId="{19680ED7-98A4-DB3B-A978-A16B331182BF}"/>
+          </ac:spMkLst>
+        </pc:spChg>
+        <pc:spChg chg="add del">
+          <ac:chgData name="Fatima Pillosu" userId="a6295d4dc9e22643" providerId="LiveId" clId="{1093EB27-9F30-4B4D-905C-2834195C41DA}" dt="2025-05-26T05:48:03.628" v="322" actId="21"/>
+          <ac:spMkLst>
+            <pc:docMk/>
+            <pc:sldMk cId="2416666445" sldId="256"/>
+            <ac:spMk id="91" creationId="{AC41E776-097B-03B0-753D-C66F262E1F3F}"/>
+          </ac:spMkLst>
+        </pc:spChg>
+        <pc:spChg chg="add mod">
+          <ac:chgData name="Fatima Pillosu" userId="a6295d4dc9e22643" providerId="LiveId" clId="{1093EB27-9F30-4B4D-905C-2834195C41DA}" dt="2025-05-26T06:01:08.471" v="328" actId="207"/>
+          <ac:spMkLst>
+            <pc:docMk/>
+            <pc:sldMk cId="2416666445" sldId="256"/>
+            <ac:spMk id="94" creationId="{384D6C06-DC18-FF34-E84C-3BC146A8D3F9}"/>
+          </ac:spMkLst>
+        </pc:spChg>
+        <pc:spChg chg="add mod">
+          <ac:chgData name="Fatima Pillosu" userId="a6295d4dc9e22643" providerId="LiveId" clId="{1093EB27-9F30-4B4D-905C-2834195C41DA}" dt="2025-05-26T06:01:08.471" v="328" actId="207"/>
+          <ac:spMkLst>
+            <pc:docMk/>
+            <pc:sldMk cId="2416666445" sldId="256"/>
+            <ac:spMk id="95" creationId="{083AEDDC-E5EB-E07A-CF91-E947C367E6C5}"/>
           </ac:spMkLst>
         </pc:spChg>
         <pc:spChg chg="del mod">
@@ -487,6 +855,14 @@
             <ac:spMk id="96" creationId="{384D6C06-DC18-FF34-E84C-3BC146A8D3F9}"/>
           </ac:spMkLst>
         </pc:spChg>
+        <pc:spChg chg="add mod">
+          <ac:chgData name="Fatima Pillosu" userId="a6295d4dc9e22643" providerId="LiveId" clId="{1093EB27-9F30-4B4D-905C-2834195C41DA}" dt="2025-05-26T06:01:08.471" v="328" actId="207"/>
+          <ac:spMkLst>
+            <pc:docMk/>
+            <pc:sldMk cId="2416666445" sldId="256"/>
+            <ac:spMk id="96" creationId="{7EAFBB19-EFE8-1704-7506-55700BFD22E4}"/>
+          </ac:spMkLst>
+        </pc:spChg>
         <pc:spChg chg="del mod">
           <ac:chgData name="Fatima Pillosu" userId="a6295d4dc9e22643" providerId="LiveId" clId="{1093EB27-9F30-4B4D-905C-2834195C41DA}" dt="2025-05-14T13:43:17.514" v="40" actId="21"/>
           <ac:spMkLst>
@@ -495,6 +871,14 @@
             <ac:spMk id="97" creationId="{083AEDDC-E5EB-E07A-CF91-E947C367E6C5}"/>
           </ac:spMkLst>
         </pc:spChg>
+        <pc:spChg chg="add mod">
+          <ac:chgData name="Fatima Pillosu" userId="a6295d4dc9e22643" providerId="LiveId" clId="{1093EB27-9F30-4B4D-905C-2834195C41DA}" dt="2025-05-26T06:01:08.471" v="328" actId="207"/>
+          <ac:spMkLst>
+            <pc:docMk/>
+            <pc:sldMk cId="2416666445" sldId="256"/>
+            <ac:spMk id="97" creationId="{08E525C9-8B8B-856F-6464-CD2A9FEC19DD}"/>
+          </ac:spMkLst>
+        </pc:spChg>
         <pc:spChg chg="del mod">
           <ac:chgData name="Fatima Pillosu" userId="a6295d4dc9e22643" providerId="LiveId" clId="{1093EB27-9F30-4B4D-905C-2834195C41DA}" dt="2025-05-14T13:43:17.514" v="40" actId="21"/>
           <ac:spMkLst>
@@ -503,6 +887,14 @@
             <ac:spMk id="98" creationId="{7EAFBB19-EFE8-1704-7506-55700BFD22E4}"/>
           </ac:spMkLst>
         </pc:spChg>
+        <pc:spChg chg="add mod">
+          <ac:chgData name="Fatima Pillosu" userId="a6295d4dc9e22643" providerId="LiveId" clId="{1093EB27-9F30-4B4D-905C-2834195C41DA}" dt="2025-05-26T06:01:08.471" v="328" actId="207"/>
+          <ac:spMkLst>
+            <pc:docMk/>
+            <pc:sldMk cId="2416666445" sldId="256"/>
+            <ac:spMk id="98" creationId="{823987BF-6FA7-EC5E-C5ED-325313D2AE59}"/>
+          </ac:spMkLst>
+        </pc:spChg>
         <pc:spChg chg="del mod">
           <ac:chgData name="Fatima Pillosu" userId="a6295d4dc9e22643" providerId="LiveId" clId="{1093EB27-9F30-4B4D-905C-2834195C41DA}" dt="2025-05-14T13:43:17.514" v="40" actId="21"/>
           <ac:spMkLst>
@@ -511,6 +903,22 @@
             <ac:spMk id="99" creationId="{08E525C9-8B8B-856F-6464-CD2A9FEC19DD}"/>
           </ac:spMkLst>
         </pc:spChg>
+        <pc:spChg chg="add mod">
+          <ac:chgData name="Fatima Pillosu" userId="a6295d4dc9e22643" providerId="LiveId" clId="{1093EB27-9F30-4B4D-905C-2834195C41DA}" dt="2025-05-26T06:01:08.471" v="328" actId="207"/>
+          <ac:spMkLst>
+            <pc:docMk/>
+            <pc:sldMk cId="2416666445" sldId="256"/>
+            <ac:spMk id="99" creationId="{26903909-39B6-BA49-59C4-AF4507DF29BF}"/>
+          </ac:spMkLst>
+        </pc:spChg>
+        <pc:spChg chg="add mod">
+          <ac:chgData name="Fatima Pillosu" userId="a6295d4dc9e22643" providerId="LiveId" clId="{1093EB27-9F30-4B4D-905C-2834195C41DA}" dt="2025-05-26T06:01:08.471" v="328" actId="207"/>
+          <ac:spMkLst>
+            <pc:docMk/>
+            <pc:sldMk cId="2416666445" sldId="256"/>
+            <ac:spMk id="100" creationId="{0C834787-FEEB-B977-952A-288699762B58}"/>
+          </ac:spMkLst>
+        </pc:spChg>
         <pc:spChg chg="del mod">
           <ac:chgData name="Fatima Pillosu" userId="a6295d4dc9e22643" providerId="LiveId" clId="{1093EB27-9F30-4B4D-905C-2834195C41DA}" dt="2025-05-14T13:43:17.514" v="40" actId="21"/>
           <ac:spMkLst>
@@ -527,6 +935,14 @@
             <ac:spMk id="101" creationId="{26903909-39B6-BA49-59C4-AF4507DF29BF}"/>
           </ac:spMkLst>
         </pc:spChg>
+        <pc:spChg chg="add mod">
+          <ac:chgData name="Fatima Pillosu" userId="a6295d4dc9e22643" providerId="LiveId" clId="{1093EB27-9F30-4B4D-905C-2834195C41DA}" dt="2025-05-26T06:01:08.471" v="328" actId="207"/>
+          <ac:spMkLst>
+            <pc:docMk/>
+            <pc:sldMk cId="2416666445" sldId="256"/>
+            <ac:spMk id="101" creationId="{61400BA6-3D3A-1190-AD65-CF1147A3BCBC}"/>
+          </ac:spMkLst>
+        </pc:spChg>
         <pc:spChg chg="del mod">
           <ac:chgData name="Fatima Pillosu" userId="a6295d4dc9e22643" providerId="LiveId" clId="{1093EB27-9F30-4B4D-905C-2834195C41DA}" dt="2025-05-14T13:43:17.514" v="40" actId="21"/>
           <ac:spMkLst>
@@ -535,6 +951,14 @@
             <ac:spMk id="102" creationId="{0C834787-FEEB-B977-952A-288699762B58}"/>
           </ac:spMkLst>
         </pc:spChg>
+        <pc:spChg chg="add mod">
+          <ac:chgData name="Fatima Pillosu" userId="a6295d4dc9e22643" providerId="LiveId" clId="{1093EB27-9F30-4B4D-905C-2834195C41DA}" dt="2025-05-26T06:01:08.471" v="328" actId="207"/>
+          <ac:spMkLst>
+            <pc:docMk/>
+            <pc:sldMk cId="2416666445" sldId="256"/>
+            <ac:spMk id="102" creationId="{F77F9084-F223-ED65-669A-F6F51F897BA2}"/>
+          </ac:spMkLst>
+        </pc:spChg>
         <pc:spChg chg="del mod">
           <ac:chgData name="Fatima Pillosu" userId="a6295d4dc9e22643" providerId="LiveId" clId="{1093EB27-9F30-4B4D-905C-2834195C41DA}" dt="2025-05-14T13:43:17.514" v="40" actId="21"/>
           <ac:spMkLst>
@@ -543,6 +967,22 @@
             <ac:spMk id="103" creationId="{61400BA6-3D3A-1190-AD65-CF1147A3BCBC}"/>
           </ac:spMkLst>
         </pc:spChg>
+        <pc:spChg chg="add mod">
+          <ac:chgData name="Fatima Pillosu" userId="a6295d4dc9e22643" providerId="LiveId" clId="{1093EB27-9F30-4B4D-905C-2834195C41DA}" dt="2025-05-26T06:01:08.471" v="328" actId="207"/>
+          <ac:spMkLst>
+            <pc:docMk/>
+            <pc:sldMk cId="2416666445" sldId="256"/>
+            <ac:spMk id="103" creationId="{E58B7622-486E-AF0A-77FA-6A257F911DE9}"/>
+          </ac:spMkLst>
+        </pc:spChg>
+        <pc:spChg chg="add mod">
+          <ac:chgData name="Fatima Pillosu" userId="a6295d4dc9e22643" providerId="LiveId" clId="{1093EB27-9F30-4B4D-905C-2834195C41DA}" dt="2025-05-26T06:01:08.471" v="328" actId="207"/>
+          <ac:spMkLst>
+            <pc:docMk/>
+            <pc:sldMk cId="2416666445" sldId="256"/>
+            <ac:spMk id="104" creationId="{53D672B0-A6EA-4276-A5B9-C5164A9A326F}"/>
+          </ac:spMkLst>
+        </pc:spChg>
         <pc:spChg chg="del mod">
           <ac:chgData name="Fatima Pillosu" userId="a6295d4dc9e22643" providerId="LiveId" clId="{1093EB27-9F30-4B4D-905C-2834195C41DA}" dt="2025-05-14T13:43:17.514" v="40" actId="21"/>
           <ac:spMkLst>
@@ -559,6 +999,14 @@
             <ac:spMk id="105" creationId="{E58B7622-486E-AF0A-77FA-6A257F911DE9}"/>
           </ac:spMkLst>
         </pc:spChg>
+        <pc:spChg chg="add mod">
+          <ac:chgData name="Fatima Pillosu" userId="a6295d4dc9e22643" providerId="LiveId" clId="{1093EB27-9F30-4B4D-905C-2834195C41DA}" dt="2025-05-26T06:01:08.471" v="328" actId="207"/>
+          <ac:spMkLst>
+            <pc:docMk/>
+            <pc:sldMk cId="2416666445" sldId="256"/>
+            <ac:spMk id="105" creationId="{FC073318-9596-D679-740B-BA408BA68B78}"/>
+          </ac:spMkLst>
+        </pc:spChg>
         <pc:spChg chg="del mod">
           <ac:chgData name="Fatima Pillosu" userId="a6295d4dc9e22643" providerId="LiveId" clId="{1093EB27-9F30-4B4D-905C-2834195C41DA}" dt="2025-05-14T13:43:17.514" v="40" actId="21"/>
           <ac:spMkLst>
@@ -567,6 +1015,22 @@
             <ac:spMk id="106" creationId="{53D672B0-A6EA-4276-A5B9-C5164A9A326F}"/>
           </ac:spMkLst>
         </pc:spChg>
+        <pc:spChg chg="add mod">
+          <ac:chgData name="Fatima Pillosu" userId="a6295d4dc9e22643" providerId="LiveId" clId="{1093EB27-9F30-4B4D-905C-2834195C41DA}" dt="2025-05-26T06:01:08.471" v="328" actId="207"/>
+          <ac:spMkLst>
+            <pc:docMk/>
+            <pc:sldMk cId="2416666445" sldId="256"/>
+            <ac:spMk id="106" creationId="{95D8CFCC-5F17-C4D6-6F70-8501F37736D8}"/>
+          </ac:spMkLst>
+        </pc:spChg>
+        <pc:spChg chg="add mod">
+          <ac:chgData name="Fatima Pillosu" userId="a6295d4dc9e22643" providerId="LiveId" clId="{1093EB27-9F30-4B4D-905C-2834195C41DA}" dt="2025-05-26T06:01:08.471" v="328" actId="207"/>
+          <ac:spMkLst>
+            <pc:docMk/>
+            <pc:sldMk cId="2416666445" sldId="256"/>
+            <ac:spMk id="107" creationId="{E06CF797-8451-574D-21F0-384E8A3452B7}"/>
+          </ac:spMkLst>
+        </pc:spChg>
         <pc:spChg chg="del mod">
           <ac:chgData name="Fatima Pillosu" userId="a6295d4dc9e22643" providerId="LiveId" clId="{1093EB27-9F30-4B4D-905C-2834195C41DA}" dt="2025-05-14T13:43:17.514" v="40" actId="21"/>
           <ac:spMkLst>
@@ -583,6 +1047,22 @@
             <ac:spMk id="108" creationId="{95D8CFCC-5F17-C4D6-6F70-8501F37736D8}"/>
           </ac:spMkLst>
         </pc:spChg>
+        <pc:spChg chg="add mod">
+          <ac:chgData name="Fatima Pillosu" userId="a6295d4dc9e22643" providerId="LiveId" clId="{1093EB27-9F30-4B4D-905C-2834195C41DA}" dt="2025-05-26T06:01:08.471" v="328" actId="207"/>
+          <ac:spMkLst>
+            <pc:docMk/>
+            <pc:sldMk cId="2416666445" sldId="256"/>
+            <ac:spMk id="108" creationId="{CFB3D8FA-6A39-82FF-7103-9C3B87E3F64B}"/>
+          </ac:spMkLst>
+        </pc:spChg>
+        <pc:spChg chg="add mod">
+          <ac:chgData name="Fatima Pillosu" userId="a6295d4dc9e22643" providerId="LiveId" clId="{1093EB27-9F30-4B4D-905C-2834195C41DA}" dt="2025-05-26T06:01:08.471" v="328" actId="207"/>
+          <ac:spMkLst>
+            <pc:docMk/>
+            <pc:sldMk cId="2416666445" sldId="256"/>
+            <ac:spMk id="109" creationId="{5B2D0398-5206-B218-FB65-5E89CE52B185}"/>
+          </ac:spMkLst>
+        </pc:spChg>
         <pc:spChg chg="del mod">
           <ac:chgData name="Fatima Pillosu" userId="a6295d4dc9e22643" providerId="LiveId" clId="{1093EB27-9F30-4B4D-905C-2834195C41DA}" dt="2025-05-14T13:43:17.514" v="40" actId="21"/>
           <ac:spMkLst>
@@ -599,6 +1079,14 @@
             <ac:spMk id="110" creationId="{CFB3D8FA-6A39-82FF-7103-9C3B87E3F64B}"/>
           </ac:spMkLst>
         </pc:spChg>
+        <pc:spChg chg="add mod">
+          <ac:chgData name="Fatima Pillosu" userId="a6295d4dc9e22643" providerId="LiveId" clId="{1093EB27-9F30-4B4D-905C-2834195C41DA}" dt="2025-05-26T06:01:08.471" v="328" actId="207"/>
+          <ac:spMkLst>
+            <pc:docMk/>
+            <pc:sldMk cId="2416666445" sldId="256"/>
+            <ac:spMk id="110" creationId="{E8F93690-0FC3-3203-F616-27D0636BD86D}"/>
+          </ac:spMkLst>
+        </pc:spChg>
         <pc:spChg chg="del mod">
           <ac:chgData name="Fatima Pillosu" userId="a6295d4dc9e22643" providerId="LiveId" clId="{1093EB27-9F30-4B4D-905C-2834195C41DA}" dt="2025-05-14T13:43:17.514" v="40" actId="21"/>
           <ac:spMkLst>
@@ -607,6 +1095,22 @@
             <ac:spMk id="111" creationId="{5B2D0398-5206-B218-FB65-5E89CE52B185}"/>
           </ac:spMkLst>
         </pc:spChg>
+        <pc:spChg chg="add mod">
+          <ac:chgData name="Fatima Pillosu" userId="a6295d4dc9e22643" providerId="LiveId" clId="{1093EB27-9F30-4B4D-905C-2834195C41DA}" dt="2025-05-26T06:01:08.471" v="328" actId="207"/>
+          <ac:spMkLst>
+            <pc:docMk/>
+            <pc:sldMk cId="2416666445" sldId="256"/>
+            <ac:spMk id="111" creationId="{98EE0CB6-A0DD-61DA-6B6B-D4EC8957FF3D}"/>
+          </ac:spMkLst>
+        </pc:spChg>
+        <pc:spChg chg="add mod">
+          <ac:chgData name="Fatima Pillosu" userId="a6295d4dc9e22643" providerId="LiveId" clId="{1093EB27-9F30-4B4D-905C-2834195C41DA}" dt="2025-05-26T06:01:08.471" v="328" actId="207"/>
+          <ac:spMkLst>
+            <pc:docMk/>
+            <pc:sldMk cId="2416666445" sldId="256"/>
+            <ac:spMk id="112" creationId="{5C604597-7B68-19A8-35F6-C8E80447309D}"/>
+          </ac:spMkLst>
+        </pc:spChg>
         <pc:spChg chg="del mod">
           <ac:chgData name="Fatima Pillosu" userId="a6295d4dc9e22643" providerId="LiveId" clId="{1093EB27-9F30-4B4D-905C-2834195C41DA}" dt="2025-05-14T13:43:17.514" v="40" actId="21"/>
           <ac:spMkLst>
@@ -615,6 +1119,14 @@
             <ac:spMk id="112" creationId="{E8F93690-0FC3-3203-F616-27D0636BD86D}"/>
           </ac:spMkLst>
         </pc:spChg>
+        <pc:spChg chg="add mod">
+          <ac:chgData name="Fatima Pillosu" userId="a6295d4dc9e22643" providerId="LiveId" clId="{1093EB27-9F30-4B4D-905C-2834195C41DA}" dt="2025-05-26T06:01:08.471" v="328" actId="207"/>
+          <ac:spMkLst>
+            <pc:docMk/>
+            <pc:sldMk cId="2416666445" sldId="256"/>
+            <ac:spMk id="113" creationId="{37EBCA7E-9713-7AE3-638B-C84D5A1C2253}"/>
+          </ac:spMkLst>
+        </pc:spChg>
         <pc:spChg chg="del mod">
           <ac:chgData name="Fatima Pillosu" userId="a6295d4dc9e22643" providerId="LiveId" clId="{1093EB27-9F30-4B4D-905C-2834195C41DA}" dt="2025-05-14T13:43:17.514" v="40" actId="21"/>
           <ac:spMkLst>
@@ -631,6 +1143,14 @@
             <ac:spMk id="114" creationId="{5C604597-7B68-19A8-35F6-C8E80447309D}"/>
           </ac:spMkLst>
         </pc:spChg>
+        <pc:spChg chg="add mod">
+          <ac:chgData name="Fatima Pillosu" userId="a6295d4dc9e22643" providerId="LiveId" clId="{1093EB27-9F30-4B4D-905C-2834195C41DA}" dt="2025-05-26T06:01:08.471" v="328" actId="207"/>
+          <ac:spMkLst>
+            <pc:docMk/>
+            <pc:sldMk cId="2416666445" sldId="256"/>
+            <ac:spMk id="114" creationId="{65B70626-067E-1AE7-11BD-EC7DA8DABC28}"/>
+          </ac:spMkLst>
+        </pc:spChg>
         <pc:spChg chg="del mod">
           <ac:chgData name="Fatima Pillosu" userId="a6295d4dc9e22643" providerId="LiveId" clId="{1093EB27-9F30-4B4D-905C-2834195C41DA}" dt="2025-05-14T13:43:17.514" v="40" actId="21"/>
           <ac:spMkLst>
@@ -639,6 +1159,14 @@
             <ac:spMk id="115" creationId="{37EBCA7E-9713-7AE3-638B-C84D5A1C2253}"/>
           </ac:spMkLst>
         </pc:spChg>
+        <pc:spChg chg="add mod">
+          <ac:chgData name="Fatima Pillosu" userId="a6295d4dc9e22643" providerId="LiveId" clId="{1093EB27-9F30-4B4D-905C-2834195C41DA}" dt="2025-05-26T06:01:08.471" v="328" actId="207"/>
+          <ac:spMkLst>
+            <pc:docMk/>
+            <pc:sldMk cId="2416666445" sldId="256"/>
+            <ac:spMk id="115" creationId="{C7BCE81D-7A63-8764-295C-1A6242CC4274}"/>
+          </ac:spMkLst>
+        </pc:spChg>
         <pc:spChg chg="del mod">
           <ac:chgData name="Fatima Pillosu" userId="a6295d4dc9e22643" providerId="LiveId" clId="{1093EB27-9F30-4B4D-905C-2834195C41DA}" dt="2025-05-14T13:43:17.514" v="40" actId="21"/>
           <ac:spMkLst>
@@ -647,6 +1175,22 @@
             <ac:spMk id="116" creationId="{65B70626-067E-1AE7-11BD-EC7DA8DABC28}"/>
           </ac:spMkLst>
         </pc:spChg>
+        <pc:spChg chg="add mod">
+          <ac:chgData name="Fatima Pillosu" userId="a6295d4dc9e22643" providerId="LiveId" clId="{1093EB27-9F30-4B4D-905C-2834195C41DA}" dt="2025-05-26T06:01:08.471" v="328" actId="207"/>
+          <ac:spMkLst>
+            <pc:docMk/>
+            <pc:sldMk cId="2416666445" sldId="256"/>
+            <ac:spMk id="116" creationId="{A6515F5F-2E20-7D13-537C-F772A00535F4}"/>
+          </ac:spMkLst>
+        </pc:spChg>
+        <pc:spChg chg="add mod">
+          <ac:chgData name="Fatima Pillosu" userId="a6295d4dc9e22643" providerId="LiveId" clId="{1093EB27-9F30-4B4D-905C-2834195C41DA}" dt="2025-05-26T06:01:08.471" v="328" actId="207"/>
+          <ac:spMkLst>
+            <pc:docMk/>
+            <pc:sldMk cId="2416666445" sldId="256"/>
+            <ac:spMk id="117" creationId="{50B578E0-62E1-B8F6-ECD2-2E7AA0CF70F9}"/>
+          </ac:spMkLst>
+        </pc:spChg>
         <pc:spChg chg="del mod">
           <ac:chgData name="Fatima Pillosu" userId="a6295d4dc9e22643" providerId="LiveId" clId="{1093EB27-9F30-4B4D-905C-2834195C41DA}" dt="2025-05-14T13:43:17.514" v="40" actId="21"/>
           <ac:spMkLst>
@@ -663,6 +1207,14 @@
             <ac:spMk id="118" creationId="{A6515F5F-2E20-7D13-537C-F772A00535F4}"/>
           </ac:spMkLst>
         </pc:spChg>
+        <pc:spChg chg="add mod">
+          <ac:chgData name="Fatima Pillosu" userId="a6295d4dc9e22643" providerId="LiveId" clId="{1093EB27-9F30-4B4D-905C-2834195C41DA}" dt="2025-05-26T06:01:08.471" v="328" actId="207"/>
+          <ac:spMkLst>
+            <pc:docMk/>
+            <pc:sldMk cId="2416666445" sldId="256"/>
+            <ac:spMk id="118" creationId="{F4D19594-8958-5678-A91A-D009CFEE0A3F}"/>
+          </ac:spMkLst>
+        </pc:spChg>
         <pc:spChg chg="del mod">
           <ac:chgData name="Fatima Pillosu" userId="a6295d4dc9e22643" providerId="LiveId" clId="{1093EB27-9F30-4B4D-905C-2834195C41DA}" dt="2025-05-14T13:43:17.514" v="40" actId="21"/>
           <ac:spMkLst>
@@ -671,6 +1223,22 @@
             <ac:spMk id="119" creationId="{50B578E0-62E1-B8F6-ECD2-2E7AA0CF70F9}"/>
           </ac:spMkLst>
         </pc:spChg>
+        <pc:spChg chg="add mod">
+          <ac:chgData name="Fatima Pillosu" userId="a6295d4dc9e22643" providerId="LiveId" clId="{1093EB27-9F30-4B4D-905C-2834195C41DA}" dt="2025-05-26T06:01:08.471" v="328" actId="207"/>
+          <ac:spMkLst>
+            <pc:docMk/>
+            <pc:sldMk cId="2416666445" sldId="256"/>
+            <ac:spMk id="119" creationId="{5ED4F7E3-EC48-9668-BA84-2D97CF23BD85}"/>
+          </ac:spMkLst>
+        </pc:spChg>
+        <pc:spChg chg="add mod">
+          <ac:chgData name="Fatima Pillosu" userId="a6295d4dc9e22643" providerId="LiveId" clId="{1093EB27-9F30-4B4D-905C-2834195C41DA}" dt="2025-05-26T06:01:08.471" v="328" actId="207"/>
+          <ac:spMkLst>
+            <pc:docMk/>
+            <pc:sldMk cId="2416666445" sldId="256"/>
+            <ac:spMk id="120" creationId="{0ECA7152-99C7-A2F4-E83D-4F855AAFA37C}"/>
+          </ac:spMkLst>
+        </pc:spChg>
         <pc:spChg chg="del mod">
           <ac:chgData name="Fatima Pillosu" userId="a6295d4dc9e22643" providerId="LiveId" clId="{1093EB27-9F30-4B4D-905C-2834195C41DA}" dt="2025-05-14T13:43:17.514" v="40" actId="21"/>
           <ac:spMkLst>
@@ -687,6 +1255,14 @@
             <ac:spMk id="121" creationId="{5ED4F7E3-EC48-9668-BA84-2D97CF23BD85}"/>
           </ac:spMkLst>
         </pc:spChg>
+        <pc:spChg chg="add mod">
+          <ac:chgData name="Fatima Pillosu" userId="a6295d4dc9e22643" providerId="LiveId" clId="{1093EB27-9F30-4B4D-905C-2834195C41DA}" dt="2025-05-26T06:01:08.471" v="328" actId="207"/>
+          <ac:spMkLst>
+            <pc:docMk/>
+            <pc:sldMk cId="2416666445" sldId="256"/>
+            <ac:spMk id="121" creationId="{9FA7FCAD-7DCD-492E-33EA-E8EA0A4B7A03}"/>
+          </ac:spMkLst>
+        </pc:spChg>
         <pc:spChg chg="del mod">
           <ac:chgData name="Fatima Pillosu" userId="a6295d4dc9e22643" providerId="LiveId" clId="{1093EB27-9F30-4B4D-905C-2834195C41DA}" dt="2025-05-14T13:43:17.514" v="40" actId="21"/>
           <ac:spMkLst>
@@ -695,6 +1271,14 @@
             <ac:spMk id="122" creationId="{0ECA7152-99C7-A2F4-E83D-4F855AAFA37C}"/>
           </ac:spMkLst>
         </pc:spChg>
+        <pc:spChg chg="add mod">
+          <ac:chgData name="Fatima Pillosu" userId="a6295d4dc9e22643" providerId="LiveId" clId="{1093EB27-9F30-4B4D-905C-2834195C41DA}" dt="2025-05-26T06:01:08.471" v="328" actId="207"/>
+          <ac:spMkLst>
+            <pc:docMk/>
+            <pc:sldMk cId="2416666445" sldId="256"/>
+            <ac:spMk id="122" creationId="{27112713-98E8-0868-E1E6-C5213A18CDB4}"/>
+          </ac:spMkLst>
+        </pc:spChg>
         <pc:spChg chg="del mod">
           <ac:chgData name="Fatima Pillosu" userId="a6295d4dc9e22643" providerId="LiveId" clId="{1093EB27-9F30-4B4D-905C-2834195C41DA}" dt="2025-05-14T13:43:17.514" v="40" actId="21"/>
           <ac:spMkLst>
@@ -703,6 +1287,14 @@
             <ac:spMk id="123" creationId="{9FA7FCAD-7DCD-492E-33EA-E8EA0A4B7A03}"/>
           </ac:spMkLst>
         </pc:spChg>
+        <pc:spChg chg="add mod">
+          <ac:chgData name="Fatima Pillosu" userId="a6295d4dc9e22643" providerId="LiveId" clId="{1093EB27-9F30-4B4D-905C-2834195C41DA}" dt="2025-05-26T06:01:08.471" v="328" actId="207"/>
+          <ac:spMkLst>
+            <pc:docMk/>
+            <pc:sldMk cId="2416666445" sldId="256"/>
+            <ac:spMk id="123" creationId="{A9DF4E4E-4BD6-4A43-6D8D-57FA7E5B4C8A}"/>
+          </ac:spMkLst>
+        </pc:spChg>
         <pc:spChg chg="del mod">
           <ac:chgData name="Fatima Pillosu" userId="a6295d4dc9e22643" providerId="LiveId" clId="{1093EB27-9F30-4B4D-905C-2834195C41DA}" dt="2025-05-14T13:43:17.514" v="40" actId="21"/>
           <ac:spMkLst>
@@ -711,6 +1303,14 @@
             <ac:spMk id="124" creationId="{27112713-98E8-0868-E1E6-C5213A18CDB4}"/>
           </ac:spMkLst>
         </pc:spChg>
+        <pc:spChg chg="add mod">
+          <ac:chgData name="Fatima Pillosu" userId="a6295d4dc9e22643" providerId="LiveId" clId="{1093EB27-9F30-4B4D-905C-2834195C41DA}" dt="2025-05-26T06:01:08.471" v="328" actId="207"/>
+          <ac:spMkLst>
+            <pc:docMk/>
+            <pc:sldMk cId="2416666445" sldId="256"/>
+            <ac:spMk id="124" creationId="{F880BE35-27AF-2DCD-5D81-D484CE796AE1}"/>
+          </ac:spMkLst>
+        </pc:spChg>
         <pc:spChg chg="del mod">
           <ac:chgData name="Fatima Pillosu" userId="a6295d4dc9e22643" providerId="LiveId" clId="{1093EB27-9F30-4B4D-905C-2834195C41DA}" dt="2025-05-14T13:43:17.514" v="40" actId="21"/>
           <ac:spMkLst>
@@ -719,6 +1319,22 @@
             <ac:spMk id="125" creationId="{A9DF4E4E-4BD6-4A43-6D8D-57FA7E5B4C8A}"/>
           </ac:spMkLst>
         </pc:spChg>
+        <pc:spChg chg="add mod">
+          <ac:chgData name="Fatima Pillosu" userId="a6295d4dc9e22643" providerId="LiveId" clId="{1093EB27-9F30-4B4D-905C-2834195C41DA}" dt="2025-05-26T06:01:08.471" v="328" actId="207"/>
+          <ac:spMkLst>
+            <pc:docMk/>
+            <pc:sldMk cId="2416666445" sldId="256"/>
+            <ac:spMk id="125" creationId="{EA8BFD8B-1858-9531-2319-F3352B9FCE3E}"/>
+          </ac:spMkLst>
+        </pc:spChg>
+        <pc:spChg chg="add mod">
+          <ac:chgData name="Fatima Pillosu" userId="a6295d4dc9e22643" providerId="LiveId" clId="{1093EB27-9F30-4B4D-905C-2834195C41DA}" dt="2025-05-26T06:01:08.471" v="328" actId="207"/>
+          <ac:spMkLst>
+            <pc:docMk/>
+            <pc:sldMk cId="2416666445" sldId="256"/>
+            <ac:spMk id="126" creationId="{804E7FEC-AF83-FD28-4A16-70D6430EB6E5}"/>
+          </ac:spMkLst>
+        </pc:spChg>
         <pc:spChg chg="del mod">
           <ac:chgData name="Fatima Pillosu" userId="a6295d4dc9e22643" providerId="LiveId" clId="{1093EB27-9F30-4B4D-905C-2834195C41DA}" dt="2025-05-14T13:43:17.514" v="40" actId="21"/>
           <ac:spMkLst>
@@ -735,6 +1351,22 @@
             <ac:spMk id="127" creationId="{EA8BFD8B-1858-9531-2319-F3352B9FCE3E}"/>
           </ac:spMkLst>
         </pc:spChg>
+        <pc:spChg chg="add mod">
+          <ac:chgData name="Fatima Pillosu" userId="a6295d4dc9e22643" providerId="LiveId" clId="{1093EB27-9F30-4B4D-905C-2834195C41DA}" dt="2025-05-26T06:01:08.471" v="328" actId="207"/>
+          <ac:spMkLst>
+            <pc:docMk/>
+            <pc:sldMk cId="2416666445" sldId="256"/>
+            <ac:spMk id="127" creationId="{F1AE0BC5-794B-D23C-A945-2D48666A380B}"/>
+          </ac:spMkLst>
+        </pc:spChg>
+        <pc:spChg chg="add mod">
+          <ac:chgData name="Fatima Pillosu" userId="a6295d4dc9e22643" providerId="LiveId" clId="{1093EB27-9F30-4B4D-905C-2834195C41DA}" dt="2025-05-26T06:01:08.471" v="328" actId="207"/>
+          <ac:spMkLst>
+            <pc:docMk/>
+            <pc:sldMk cId="2416666445" sldId="256"/>
+            <ac:spMk id="128" creationId="{3848180B-A357-5916-14AE-BEBA0E61C958}"/>
+          </ac:spMkLst>
+        </pc:spChg>
         <pc:spChg chg="del mod">
           <ac:chgData name="Fatima Pillosu" userId="a6295d4dc9e22643" providerId="LiveId" clId="{1093EB27-9F30-4B4D-905C-2834195C41DA}" dt="2025-05-14T13:43:17.514" v="40" actId="21"/>
           <ac:spMkLst>
@@ -751,6 +1383,14 @@
             <ac:spMk id="129" creationId="{F1AE0BC5-794B-D23C-A945-2D48666A380B}"/>
           </ac:spMkLst>
         </pc:spChg>
+        <pc:spChg chg="add mod">
+          <ac:chgData name="Fatima Pillosu" userId="a6295d4dc9e22643" providerId="LiveId" clId="{1093EB27-9F30-4B4D-905C-2834195C41DA}" dt="2025-05-26T06:01:08.471" v="328" actId="207"/>
+          <ac:spMkLst>
+            <pc:docMk/>
+            <pc:sldMk cId="2416666445" sldId="256"/>
+            <ac:spMk id="129" creationId="{F88C8933-F6FB-E197-23C5-6A6AC1467788}"/>
+          </ac:spMkLst>
+        </pc:spChg>
         <pc:spChg chg="del mod">
           <ac:chgData name="Fatima Pillosu" userId="a6295d4dc9e22643" providerId="LiveId" clId="{1093EB27-9F30-4B4D-905C-2834195C41DA}" dt="2025-05-14T13:43:17.514" v="40" actId="21"/>
           <ac:spMkLst>
@@ -759,6 +1399,22 @@
             <ac:spMk id="130" creationId="{3848180B-A357-5916-14AE-BEBA0E61C958}"/>
           </ac:spMkLst>
         </pc:spChg>
+        <pc:spChg chg="add mod">
+          <ac:chgData name="Fatima Pillosu" userId="a6295d4dc9e22643" providerId="LiveId" clId="{1093EB27-9F30-4B4D-905C-2834195C41DA}" dt="2025-05-26T06:01:08.471" v="328" actId="207"/>
+          <ac:spMkLst>
+            <pc:docMk/>
+            <pc:sldMk cId="2416666445" sldId="256"/>
+            <ac:spMk id="130" creationId="{708DFDE3-CB83-C412-EE9B-B89348B18975}"/>
+          </ac:spMkLst>
+        </pc:spChg>
+        <pc:spChg chg="add mod">
+          <ac:chgData name="Fatima Pillosu" userId="a6295d4dc9e22643" providerId="LiveId" clId="{1093EB27-9F30-4B4D-905C-2834195C41DA}" dt="2025-05-26T06:01:08.471" v="328" actId="207"/>
+          <ac:spMkLst>
+            <pc:docMk/>
+            <pc:sldMk cId="2416666445" sldId="256"/>
+            <ac:spMk id="131" creationId="{0A4512A2-4DC0-76EB-1C78-328A3FA136E0}"/>
+          </ac:spMkLst>
+        </pc:spChg>
         <pc:spChg chg="del mod">
           <ac:chgData name="Fatima Pillosu" userId="a6295d4dc9e22643" providerId="LiveId" clId="{1093EB27-9F30-4B4D-905C-2834195C41DA}" dt="2025-05-14T13:43:17.514" v="40" actId="21"/>
           <ac:spMkLst>
@@ -775,6 +1431,14 @@
             <ac:spMk id="132" creationId="{708DFDE3-CB83-C412-EE9B-B89348B18975}"/>
           </ac:spMkLst>
         </pc:spChg>
+        <pc:spChg chg="add mod">
+          <ac:chgData name="Fatima Pillosu" userId="a6295d4dc9e22643" providerId="LiveId" clId="{1093EB27-9F30-4B4D-905C-2834195C41DA}" dt="2025-05-26T06:01:08.471" v="328" actId="207"/>
+          <ac:spMkLst>
+            <pc:docMk/>
+            <pc:sldMk cId="2416666445" sldId="256"/>
+            <ac:spMk id="132" creationId="{AC1F07BA-7A38-7AE9-D91C-D217054E2654}"/>
+          </ac:spMkLst>
+        </pc:spChg>
         <pc:spChg chg="del mod">
           <ac:chgData name="Fatima Pillosu" userId="a6295d4dc9e22643" providerId="LiveId" clId="{1093EB27-9F30-4B4D-905C-2834195C41DA}" dt="2025-05-14T13:43:17.514" v="40" actId="21"/>
           <ac:spMkLst>
@@ -783,6 +1447,22 @@
             <ac:spMk id="133" creationId="{0A4512A2-4DC0-76EB-1C78-328A3FA136E0}"/>
           </ac:spMkLst>
         </pc:spChg>
+        <pc:spChg chg="add mod">
+          <ac:chgData name="Fatima Pillosu" userId="a6295d4dc9e22643" providerId="LiveId" clId="{1093EB27-9F30-4B4D-905C-2834195C41DA}" dt="2025-05-26T06:01:08.471" v="328" actId="207"/>
+          <ac:spMkLst>
+            <pc:docMk/>
+            <pc:sldMk cId="2416666445" sldId="256"/>
+            <ac:spMk id="133" creationId="{7DD94525-DBC6-1FC2-0B07-84FAFBA131A8}"/>
+          </ac:spMkLst>
+        </pc:spChg>
+        <pc:spChg chg="add mod">
+          <ac:chgData name="Fatima Pillosu" userId="a6295d4dc9e22643" providerId="LiveId" clId="{1093EB27-9F30-4B4D-905C-2834195C41DA}" dt="2025-05-26T06:01:08.471" v="328" actId="207"/>
+          <ac:spMkLst>
+            <pc:docMk/>
+            <pc:sldMk cId="2416666445" sldId="256"/>
+            <ac:spMk id="134" creationId="{50D9BC42-F1FE-87AB-F083-5C2242BD4E51}"/>
+          </ac:spMkLst>
+        </pc:spChg>
         <pc:spChg chg="del mod">
           <ac:chgData name="Fatima Pillosu" userId="a6295d4dc9e22643" providerId="LiveId" clId="{1093EB27-9F30-4B4D-905C-2834195C41DA}" dt="2025-05-14T13:43:17.514" v="40" actId="21"/>
           <ac:spMkLst>
@@ -799,6 +1479,22 @@
             <ac:spMk id="135" creationId="{7DD94525-DBC6-1FC2-0B07-84FAFBA131A8}"/>
           </ac:spMkLst>
         </pc:spChg>
+        <pc:spChg chg="add mod">
+          <ac:chgData name="Fatima Pillosu" userId="a6295d4dc9e22643" providerId="LiveId" clId="{1093EB27-9F30-4B4D-905C-2834195C41DA}" dt="2025-05-26T06:01:08.471" v="328" actId="207"/>
+          <ac:spMkLst>
+            <pc:docMk/>
+            <pc:sldMk cId="2416666445" sldId="256"/>
+            <ac:spMk id="135" creationId="{CA271F21-2E92-827F-B5C7-9933695D1A74}"/>
+          </ac:spMkLst>
+        </pc:spChg>
+        <pc:spChg chg="add mod">
+          <ac:chgData name="Fatima Pillosu" userId="a6295d4dc9e22643" providerId="LiveId" clId="{1093EB27-9F30-4B4D-905C-2834195C41DA}" dt="2025-05-26T06:01:08.471" v="328" actId="207"/>
+          <ac:spMkLst>
+            <pc:docMk/>
+            <pc:sldMk cId="2416666445" sldId="256"/>
+            <ac:spMk id="136" creationId="{19680ED7-98A4-DB3B-A978-A16B331182BF}"/>
+          </ac:spMkLst>
+        </pc:spChg>
         <pc:spChg chg="del mod">
           <ac:chgData name="Fatima Pillosu" userId="a6295d4dc9e22643" providerId="LiveId" clId="{1093EB27-9F30-4B4D-905C-2834195C41DA}" dt="2025-05-14T13:43:17.514" v="40" actId="21"/>
           <ac:spMkLst>
@@ -807,6 +1503,14 @@
             <ac:spMk id="136" creationId="{50D9BC42-F1FE-87AB-F083-5C2242BD4E51}"/>
           </ac:spMkLst>
         </pc:spChg>
+        <pc:spChg chg="add del mod">
+          <ac:chgData name="Fatima Pillosu" userId="a6295d4dc9e22643" providerId="LiveId" clId="{1093EB27-9F30-4B4D-905C-2834195C41DA}" dt="2025-05-26T05:48:17.735" v="324" actId="478"/>
+          <ac:spMkLst>
+            <pc:docMk/>
+            <pc:sldMk cId="2416666445" sldId="256"/>
+            <ac:spMk id="137" creationId="{AC41E776-097B-03B0-753D-C66F262E1F3F}"/>
+          </ac:spMkLst>
+        </pc:spChg>
         <pc:spChg chg="del mod">
           <ac:chgData name="Fatima Pillosu" userId="a6295d4dc9e22643" providerId="LiveId" clId="{1093EB27-9F30-4B4D-905C-2834195C41DA}" dt="2025-05-14T13:43:17.514" v="40" actId="21"/>
           <ac:spMkLst>
@@ -823,20 +1527,52 @@
             <ac:spMk id="138" creationId="{8C91D6B6-0521-29E6-9258-14B878EBB9B9}"/>
           </ac:spMkLst>
         </pc:spChg>
-        <pc:picChg chg="add mod">
-          <ac:chgData name="Fatima Pillosu" userId="a6295d4dc9e22643" providerId="LiveId" clId="{1093EB27-9F30-4B4D-905C-2834195C41DA}" dt="2025-05-14T13:43:38.718" v="41"/>
+        <pc:picChg chg="add del mod">
+          <ac:chgData name="Fatima Pillosu" userId="a6295d4dc9e22643" providerId="LiveId" clId="{1093EB27-9F30-4B4D-905C-2834195C41DA}" dt="2025-05-26T05:48:03.628" v="322" actId="21"/>
+          <ac:picMkLst>
+            <pc:docMk/>
+            <pc:sldMk cId="2416666445" sldId="256"/>
+            <ac:picMk id="2" creationId="{5576DFB5-07C9-9C7F-52D6-98F487E9338C}"/>
+          </ac:picMkLst>
+        </pc:picChg>
+        <pc:picChg chg="add del mod">
+          <ac:chgData name="Fatima Pillosu" userId="a6295d4dc9e22643" providerId="LiveId" clId="{1093EB27-9F30-4B4D-905C-2834195C41DA}" dt="2025-05-26T05:42:15.667" v="42" actId="21"/>
           <ac:picMkLst>
             <pc:docMk/>
             <pc:sldMk cId="2416666445" sldId="256"/>
             <ac:picMk id="3" creationId="{5576DFB5-07C9-9C7F-52D6-98F487E9338C}"/>
           </ac:picMkLst>
         </pc:picChg>
+        <pc:picChg chg="add del mod">
+          <ac:chgData name="Fatima Pillosu" userId="a6295d4dc9e22643" providerId="LiveId" clId="{1093EB27-9F30-4B4D-905C-2834195C41DA}" dt="2025-05-26T05:42:15.667" v="42" actId="21"/>
+          <ac:picMkLst>
+            <pc:docMk/>
+            <pc:sldMk cId="2416666445" sldId="256"/>
+            <ac:picMk id="4" creationId="{C0EA9BA7-9BA3-87E1-85A9-F8ACC1C32D13}"/>
+          </ac:picMkLst>
+        </pc:picChg>
+        <pc:picChg chg="add del mod">
+          <ac:chgData name="Fatima Pillosu" userId="a6295d4dc9e22643" providerId="LiveId" clId="{1093EB27-9F30-4B4D-905C-2834195C41DA}" dt="2025-05-26T05:48:03.628" v="322" actId="21"/>
+          <ac:picMkLst>
+            <pc:docMk/>
+            <pc:sldMk cId="2416666445" sldId="256"/>
+            <ac:picMk id="47" creationId="{C0EA9BA7-9BA3-87E1-85A9-F8ACC1C32D13}"/>
+          </ac:picMkLst>
+        </pc:picChg>
         <pc:picChg chg="add mod">
-          <ac:chgData name="Fatima Pillosu" userId="a6295d4dc9e22643" providerId="LiveId" clId="{1093EB27-9F30-4B4D-905C-2834195C41DA}" dt="2025-05-14T13:43:38.718" v="41"/>
+          <ac:chgData name="Fatima Pillosu" userId="a6295d4dc9e22643" providerId="LiveId" clId="{1093EB27-9F30-4B4D-905C-2834195C41DA}" dt="2025-05-26T05:48:22.544" v="326" actId="1036"/>
           <ac:picMkLst>
             <pc:docMk/>
             <pc:sldMk cId="2416666445" sldId="256"/>
-            <ac:picMk id="4" creationId="{C0EA9BA7-9BA3-87E1-85A9-F8ACC1C32D13}"/>
+            <ac:picMk id="92" creationId="{5576DFB5-07C9-9C7F-52D6-98F487E9338C}"/>
+          </ac:picMkLst>
+        </pc:picChg>
+        <pc:picChg chg="add mod">
+          <ac:chgData name="Fatima Pillosu" userId="a6295d4dc9e22643" providerId="LiveId" clId="{1093EB27-9F30-4B4D-905C-2834195C41DA}" dt="2025-05-26T05:48:22.544" v="326" actId="1036"/>
+          <ac:picMkLst>
+            <pc:docMk/>
+            <pc:sldMk cId="2416666445" sldId="256"/>
+            <ac:picMk id="93" creationId="{C0EA9BA7-9BA3-87E1-85A9-F8ACC1C32D13}"/>
           </ac:picMkLst>
         </pc:picChg>
         <pc:picChg chg="del mod">
@@ -2626,15 +3362,15 @@
         </p:nvSpPr>
         <p:spPr>
           <a:xfrm>
-            <a:off x="818952" y="553907"/>
-            <a:ext cx="4913710" cy="1178325"/>
+            <a:off x="818952" y="630290"/>
+            <a:ext cx="4913710" cy="1340814"/>
           </a:xfrm>
         </p:spPr>
         <p:txBody>
           <a:bodyPr anchor="b"/>
           <a:lstStyle>
             <a:lvl1pPr algn="ctr">
-              <a:defRPr sz="2961"/>
+              <a:defRPr sz="3224"/>
             </a:lvl1pPr>
           </a:lstStyle>
           <a:p>
@@ -2658,8 +3394,8 @@
         </p:nvSpPr>
         <p:spPr>
           <a:xfrm>
-            <a:off x="818952" y="1777673"/>
-            <a:ext cx="4913710" cy="817149"/>
+            <a:off x="818952" y="2022811"/>
+            <a:ext cx="4913710" cy="929833"/>
           </a:xfrm>
         </p:spPr>
         <p:txBody>
@@ -2667,39 +3403,39 @@
           <a:lstStyle>
             <a:lvl1pPr marL="0" indent="0" algn="ctr">
               <a:buNone/>
-              <a:defRPr sz="1184"/>
+              <a:defRPr sz="1290"/>
             </a:lvl1pPr>
-            <a:lvl2pPr marL="225628" indent="0" algn="ctr">
+            <a:lvl2pPr marL="245699" indent="0" algn="ctr">
               <a:buNone/>
-              <a:defRPr sz="987"/>
+              <a:defRPr sz="1075"/>
             </a:lvl2pPr>
-            <a:lvl3pPr marL="451256" indent="0" algn="ctr">
+            <a:lvl3pPr marL="491399" indent="0" algn="ctr">
               <a:buNone/>
-              <a:defRPr sz="888"/>
+              <a:defRPr sz="967"/>
             </a:lvl3pPr>
-            <a:lvl4pPr marL="676885" indent="0" algn="ctr">
+            <a:lvl4pPr marL="737098" indent="0" algn="ctr">
               <a:buNone/>
-              <a:defRPr sz="790"/>
+              <a:defRPr sz="860"/>
             </a:lvl4pPr>
-            <a:lvl5pPr marL="902513" indent="0" algn="ctr">
+            <a:lvl5pPr marL="982797" indent="0" algn="ctr">
               <a:buNone/>
-              <a:defRPr sz="790"/>
+              <a:defRPr sz="860"/>
             </a:lvl5pPr>
-            <a:lvl6pPr marL="1128141" indent="0" algn="ctr">
+            <a:lvl6pPr marL="1228496" indent="0" algn="ctr">
               <a:buNone/>
-              <a:defRPr sz="790"/>
+              <a:defRPr sz="860"/>
             </a:lvl6pPr>
-            <a:lvl7pPr marL="1353769" indent="0" algn="ctr">
+            <a:lvl7pPr marL="1474196" indent="0" algn="ctr">
               <a:buNone/>
-              <a:defRPr sz="790"/>
+              <a:defRPr sz="860"/>
             </a:lvl7pPr>
-            <a:lvl8pPr marL="1579397" indent="0" algn="ctr">
+            <a:lvl8pPr marL="1719895" indent="0" algn="ctr">
               <a:buNone/>
-              <a:defRPr sz="790"/>
+              <a:defRPr sz="860"/>
             </a:lvl8pPr>
-            <a:lvl9pPr marL="1805026" indent="0" algn="ctr">
+            <a:lvl9pPr marL="1965594" indent="0" algn="ctr">
               <a:buNone/>
-              <a:defRPr sz="790"/>
+              <a:defRPr sz="860"/>
             </a:lvl9pPr>
           </a:lstStyle>
           <a:p>
@@ -2728,7 +3464,7 @@
           <a:p>
             <a:fld id="{2302334F-977D-4A43-BDB9-11086BF63D6E}" type="datetimeFigureOut">
               <a:rPr lang="en-GB" smtClean="0"/>
-              <a:t>14/05/2025</a:t>
+              <a:t>26/05/2025</a:t>
             </a:fld>
             <a:endParaRPr lang="en-GB"/>
           </a:p>
@@ -2779,7 +3515,7 @@
     </p:spTree>
     <p:extLst>
       <p:ext uri="{BB962C8B-B14F-4D97-AF65-F5344CB8AC3E}">
-        <p14:creationId xmlns:p14="http://schemas.microsoft.com/office/powerpoint/2010/main" val="3436130310"/>
+        <p14:creationId xmlns:p14="http://schemas.microsoft.com/office/powerpoint/2010/main" val="4054109708"/>
       </p:ext>
     </p:extLst>
   </p:cSld>
@@ -2898,7 +3634,7 @@
           <a:p>
             <a:fld id="{2302334F-977D-4A43-BDB9-11086BF63D6E}" type="datetimeFigureOut">
               <a:rPr lang="en-GB" smtClean="0"/>
-              <a:t>14/05/2025</a:t>
+              <a:t>26/05/2025</a:t>
             </a:fld>
             <a:endParaRPr lang="en-GB"/>
           </a:p>
@@ -2949,7 +3685,7 @@
     </p:spTree>
     <p:extLst>
       <p:ext uri="{BB962C8B-B14F-4D97-AF65-F5344CB8AC3E}">
-        <p14:creationId xmlns:p14="http://schemas.microsoft.com/office/powerpoint/2010/main" val="1168384228"/>
+        <p14:creationId xmlns:p14="http://schemas.microsoft.com/office/powerpoint/2010/main" val="3346240896"/>
       </p:ext>
     </p:extLst>
   </p:cSld>
@@ -2988,8 +3724,8 @@
         </p:nvSpPr>
         <p:spPr>
           <a:xfrm>
-            <a:off x="4688498" y="180196"/>
-            <a:ext cx="1412692" cy="2868250"/>
+            <a:off x="4688498" y="205045"/>
+            <a:ext cx="1412692" cy="3263778"/>
           </a:xfrm>
         </p:spPr>
         <p:txBody>
@@ -3016,8 +3752,8 @@
         </p:nvSpPr>
         <p:spPr>
           <a:xfrm>
-            <a:off x="450424" y="180196"/>
-            <a:ext cx="4156179" cy="2868250"/>
+            <a:off x="450424" y="205045"/>
+            <a:ext cx="4156179" cy="3263778"/>
           </a:xfrm>
         </p:spPr>
         <p:txBody>
@@ -3078,7 +3814,7 @@
           <a:p>
             <a:fld id="{2302334F-977D-4A43-BDB9-11086BF63D6E}" type="datetimeFigureOut">
               <a:rPr lang="en-GB" smtClean="0"/>
-              <a:t>14/05/2025</a:t>
+              <a:t>26/05/2025</a:t>
             </a:fld>
             <a:endParaRPr lang="en-GB"/>
           </a:p>
@@ -3129,7 +3865,7 @@
     </p:spTree>
     <p:extLst>
       <p:ext uri="{BB962C8B-B14F-4D97-AF65-F5344CB8AC3E}">
-        <p14:creationId xmlns:p14="http://schemas.microsoft.com/office/powerpoint/2010/main" val="143830807"/>
+        <p14:creationId xmlns:p14="http://schemas.microsoft.com/office/powerpoint/2010/main" val="3227508100"/>
       </p:ext>
     </p:extLst>
   </p:cSld>
@@ -3248,7 +3984,7 @@
           <a:p>
             <a:fld id="{2302334F-977D-4A43-BDB9-11086BF63D6E}" type="datetimeFigureOut">
               <a:rPr lang="en-GB" smtClean="0"/>
-              <a:t>14/05/2025</a:t>
+              <a:t>26/05/2025</a:t>
             </a:fld>
             <a:endParaRPr lang="en-GB"/>
           </a:p>
@@ -3299,7 +4035,7 @@
     </p:spTree>
     <p:extLst>
       <p:ext uri="{BB962C8B-B14F-4D97-AF65-F5344CB8AC3E}">
-        <p14:creationId xmlns:p14="http://schemas.microsoft.com/office/powerpoint/2010/main" val="780061365"/>
+        <p14:creationId xmlns:p14="http://schemas.microsoft.com/office/powerpoint/2010/main" val="502818237"/>
       </p:ext>
     </p:extLst>
   </p:cSld>
@@ -3338,15 +4074,15 @@
         </p:nvSpPr>
         <p:spPr>
           <a:xfrm>
-            <a:off x="447011" y="843787"/>
-            <a:ext cx="5650766" cy="1407879"/>
+            <a:off x="447011" y="960145"/>
+            <a:ext cx="5650766" cy="1602023"/>
           </a:xfrm>
         </p:spPr>
         <p:txBody>
           <a:bodyPr anchor="b"/>
           <a:lstStyle>
             <a:lvl1pPr>
-              <a:defRPr sz="2961"/>
+              <a:defRPr sz="3224"/>
             </a:lvl1pPr>
           </a:lstStyle>
           <a:p>
@@ -3370,8 +4106,8 @@
         </p:nvSpPr>
         <p:spPr>
           <a:xfrm>
-            <a:off x="447011" y="2264985"/>
-            <a:ext cx="5650766" cy="740370"/>
+            <a:off x="447011" y="2577324"/>
+            <a:ext cx="5650766" cy="842466"/>
           </a:xfrm>
         </p:spPr>
         <p:txBody>
@@ -3379,7 +4115,7 @@
           <a:lstStyle>
             <a:lvl1pPr marL="0" indent="0">
               <a:buNone/>
-              <a:defRPr sz="1184">
+              <a:defRPr sz="1290">
                 <a:solidFill>
                   <a:schemeClr val="tx1">
                     <a:tint val="82000"/>
@@ -3387,9 +4123,9 @@
                 </a:solidFill>
               </a:defRPr>
             </a:lvl1pPr>
-            <a:lvl2pPr marL="225628" indent="0">
+            <a:lvl2pPr marL="245699" indent="0">
               <a:buNone/>
-              <a:defRPr sz="987">
+              <a:defRPr sz="1075">
                 <a:solidFill>
                   <a:schemeClr val="tx1">
                     <a:tint val="82000"/>
@@ -3397,9 +4133,9 @@
                 </a:solidFill>
               </a:defRPr>
             </a:lvl2pPr>
-            <a:lvl3pPr marL="451256" indent="0">
+            <a:lvl3pPr marL="491399" indent="0">
               <a:buNone/>
-              <a:defRPr sz="888">
+              <a:defRPr sz="967">
                 <a:solidFill>
                   <a:schemeClr val="tx1">
                     <a:tint val="82000"/>
@@ -3407,9 +4143,9 @@
                 </a:solidFill>
               </a:defRPr>
             </a:lvl3pPr>
-            <a:lvl4pPr marL="676885" indent="0">
+            <a:lvl4pPr marL="737098" indent="0">
               <a:buNone/>
-              <a:defRPr sz="790">
+              <a:defRPr sz="860">
                 <a:solidFill>
                   <a:schemeClr val="tx1">
                     <a:tint val="82000"/>
@@ -3417,9 +4153,9 @@
                 </a:solidFill>
               </a:defRPr>
             </a:lvl4pPr>
-            <a:lvl5pPr marL="902513" indent="0">
+            <a:lvl5pPr marL="982797" indent="0">
               <a:buNone/>
-              <a:defRPr sz="790">
+              <a:defRPr sz="860">
                 <a:solidFill>
                   <a:schemeClr val="tx1">
                     <a:tint val="82000"/>
@@ -3427,9 +4163,9 @@
                 </a:solidFill>
               </a:defRPr>
             </a:lvl5pPr>
-            <a:lvl6pPr marL="1128141" indent="0">
+            <a:lvl6pPr marL="1228496" indent="0">
               <a:buNone/>
-              <a:defRPr sz="790">
+              <a:defRPr sz="860">
                 <a:solidFill>
                   <a:schemeClr val="tx1">
                     <a:tint val="82000"/>
@@ -3437,9 +4173,9 @@
                 </a:solidFill>
               </a:defRPr>
             </a:lvl6pPr>
-            <a:lvl7pPr marL="1353769" indent="0">
+            <a:lvl7pPr marL="1474196" indent="0">
               <a:buNone/>
-              <a:defRPr sz="790">
+              <a:defRPr sz="860">
                 <a:solidFill>
                   <a:schemeClr val="tx1">
                     <a:tint val="82000"/>
@@ -3447,9 +4183,9 @@
                 </a:solidFill>
               </a:defRPr>
             </a:lvl7pPr>
-            <a:lvl8pPr marL="1579397" indent="0">
+            <a:lvl8pPr marL="1719895" indent="0">
               <a:buNone/>
-              <a:defRPr sz="790">
+              <a:defRPr sz="860">
                 <a:solidFill>
                   <a:schemeClr val="tx1">
                     <a:tint val="82000"/>
@@ -3457,9 +4193,9 @@
                 </a:solidFill>
               </a:defRPr>
             </a:lvl8pPr>
-            <a:lvl9pPr marL="1805026" indent="0">
+            <a:lvl9pPr marL="1965594" indent="0">
               <a:buNone/>
-              <a:defRPr sz="790">
+              <a:defRPr sz="860">
                 <a:solidFill>
                   <a:schemeClr val="tx1">
                     <a:tint val="82000"/>
@@ -3494,7 +4230,7 @@
           <a:p>
             <a:fld id="{2302334F-977D-4A43-BDB9-11086BF63D6E}" type="datetimeFigureOut">
               <a:rPr lang="en-GB" smtClean="0"/>
-              <a:t>14/05/2025</a:t>
+              <a:t>26/05/2025</a:t>
             </a:fld>
             <a:endParaRPr lang="en-GB"/>
           </a:p>
@@ -3545,7 +4281,7 @@
     </p:spTree>
     <p:extLst>
       <p:ext uri="{BB962C8B-B14F-4D97-AF65-F5344CB8AC3E}">
-        <p14:creationId xmlns:p14="http://schemas.microsoft.com/office/powerpoint/2010/main" val="2393260698"/>
+        <p14:creationId xmlns:p14="http://schemas.microsoft.com/office/powerpoint/2010/main" val="1738181906"/>
       </p:ext>
     </p:extLst>
   </p:cSld>
@@ -3607,8 +4343,8 @@
         </p:nvSpPr>
         <p:spPr>
           <a:xfrm>
-            <a:off x="450423" y="900980"/>
-            <a:ext cx="2784436" cy="2147466"/>
+            <a:off x="450423" y="1025223"/>
+            <a:ext cx="2784436" cy="2443599"/>
           </a:xfrm>
         </p:spPr>
         <p:txBody>
@@ -3664,8 +4400,8 @@
         </p:nvSpPr>
         <p:spPr>
           <a:xfrm>
-            <a:off x="3316754" y="900980"/>
-            <a:ext cx="2784436" cy="2147466"/>
+            <a:off x="3316754" y="1025223"/>
+            <a:ext cx="2784436" cy="2443599"/>
           </a:xfrm>
         </p:spPr>
         <p:txBody>
@@ -3726,7 +4462,7 @@
           <a:p>
             <a:fld id="{2302334F-977D-4A43-BDB9-11086BF63D6E}" type="datetimeFigureOut">
               <a:rPr lang="en-GB" smtClean="0"/>
-              <a:t>14/05/2025</a:t>
+              <a:t>26/05/2025</a:t>
             </a:fld>
             <a:endParaRPr lang="en-GB"/>
           </a:p>
@@ -3777,7 +4513,7 @@
     </p:spTree>
     <p:extLst>
       <p:ext uri="{BB962C8B-B14F-4D97-AF65-F5344CB8AC3E}">
-        <p14:creationId xmlns:p14="http://schemas.microsoft.com/office/powerpoint/2010/main" val="2559180232"/>
+        <p14:creationId xmlns:p14="http://schemas.microsoft.com/office/powerpoint/2010/main" val="967732931"/>
       </p:ext>
     </p:extLst>
   </p:cSld>
@@ -3816,8 +4552,8 @@
         </p:nvSpPr>
         <p:spPr>
           <a:xfrm>
-            <a:off x="451277" y="180196"/>
-            <a:ext cx="5650766" cy="654190"/>
+            <a:off x="451277" y="205045"/>
+            <a:ext cx="5650766" cy="744402"/>
           </a:xfrm>
         </p:spPr>
         <p:txBody>
@@ -3844,8 +4580,8 @@
         </p:nvSpPr>
         <p:spPr>
           <a:xfrm>
-            <a:off x="451277" y="829685"/>
-            <a:ext cx="2771639" cy="406616"/>
+            <a:off x="451277" y="944097"/>
+            <a:ext cx="2771639" cy="462688"/>
           </a:xfrm>
         </p:spPr>
         <p:txBody>
@@ -3853,39 +4589,39 @@
           <a:lstStyle>
             <a:lvl1pPr marL="0" indent="0">
               <a:buNone/>
-              <a:defRPr sz="1184" b="1"/>
+              <a:defRPr sz="1290" b="1"/>
             </a:lvl1pPr>
-            <a:lvl2pPr marL="225628" indent="0">
+            <a:lvl2pPr marL="245699" indent="0">
               <a:buNone/>
-              <a:defRPr sz="987" b="1"/>
+              <a:defRPr sz="1075" b="1"/>
             </a:lvl2pPr>
-            <a:lvl3pPr marL="451256" indent="0">
+            <a:lvl3pPr marL="491399" indent="0">
               <a:buNone/>
-              <a:defRPr sz="888" b="1"/>
+              <a:defRPr sz="967" b="1"/>
             </a:lvl3pPr>
-            <a:lvl4pPr marL="676885" indent="0">
+            <a:lvl4pPr marL="737098" indent="0">
               <a:buNone/>
-              <a:defRPr sz="790" b="1"/>
+              <a:defRPr sz="860" b="1"/>
             </a:lvl4pPr>
-            <a:lvl5pPr marL="902513" indent="0">
+            <a:lvl5pPr marL="982797" indent="0">
               <a:buNone/>
-              <a:defRPr sz="790" b="1"/>
+              <a:defRPr sz="860" b="1"/>
             </a:lvl5pPr>
-            <a:lvl6pPr marL="1128141" indent="0">
+            <a:lvl6pPr marL="1228496" indent="0">
               <a:buNone/>
-              <a:defRPr sz="790" b="1"/>
+              <a:defRPr sz="860" b="1"/>
             </a:lvl6pPr>
-            <a:lvl7pPr marL="1353769" indent="0">
+            <a:lvl7pPr marL="1474196" indent="0">
               <a:buNone/>
-              <a:defRPr sz="790" b="1"/>
+              <a:defRPr sz="860" b="1"/>
             </a:lvl7pPr>
-            <a:lvl8pPr marL="1579397" indent="0">
+            <a:lvl8pPr marL="1719895" indent="0">
               <a:buNone/>
-              <a:defRPr sz="790" b="1"/>
+              <a:defRPr sz="860" b="1"/>
             </a:lvl8pPr>
-            <a:lvl9pPr marL="1805026" indent="0">
+            <a:lvl9pPr marL="1965594" indent="0">
               <a:buNone/>
-              <a:defRPr sz="790" b="1"/>
+              <a:defRPr sz="860" b="1"/>
             </a:lvl9pPr>
           </a:lstStyle>
           <a:p>
@@ -3909,8 +4645,8 @@
         </p:nvSpPr>
         <p:spPr>
           <a:xfrm>
-            <a:off x="451277" y="1236301"/>
-            <a:ext cx="2771639" cy="1818412"/>
+            <a:off x="451277" y="1406785"/>
+            <a:ext cx="2771639" cy="2069169"/>
           </a:xfrm>
         </p:spPr>
         <p:txBody>
@@ -3966,8 +4702,8 @@
         </p:nvSpPr>
         <p:spPr>
           <a:xfrm>
-            <a:off x="3316754" y="829685"/>
-            <a:ext cx="2785289" cy="406616"/>
+            <a:off x="3316754" y="944097"/>
+            <a:ext cx="2785289" cy="462688"/>
           </a:xfrm>
         </p:spPr>
         <p:txBody>
@@ -3975,39 +4711,39 @@
           <a:lstStyle>
             <a:lvl1pPr marL="0" indent="0">
               <a:buNone/>
-              <a:defRPr sz="1184" b="1"/>
+              <a:defRPr sz="1290" b="1"/>
             </a:lvl1pPr>
-            <a:lvl2pPr marL="225628" indent="0">
+            <a:lvl2pPr marL="245699" indent="0">
               <a:buNone/>
-              <a:defRPr sz="987" b="1"/>
+              <a:defRPr sz="1075" b="1"/>
             </a:lvl2pPr>
-            <a:lvl3pPr marL="451256" indent="0">
+            <a:lvl3pPr marL="491399" indent="0">
               <a:buNone/>
-              <a:defRPr sz="888" b="1"/>
+              <a:defRPr sz="967" b="1"/>
             </a:lvl3pPr>
-            <a:lvl4pPr marL="676885" indent="0">
+            <a:lvl4pPr marL="737098" indent="0">
               <a:buNone/>
-              <a:defRPr sz="790" b="1"/>
+              <a:defRPr sz="860" b="1"/>
             </a:lvl4pPr>
-            <a:lvl5pPr marL="902513" indent="0">
+            <a:lvl5pPr marL="982797" indent="0">
               <a:buNone/>
-              <a:defRPr sz="790" b="1"/>
+              <a:defRPr sz="860" b="1"/>
             </a:lvl5pPr>
-            <a:lvl6pPr marL="1128141" indent="0">
+            <a:lvl6pPr marL="1228496" indent="0">
               <a:buNone/>
-              <a:defRPr sz="790" b="1"/>
+              <a:defRPr sz="860" b="1"/>
             </a:lvl6pPr>
-            <a:lvl7pPr marL="1353769" indent="0">
+            <a:lvl7pPr marL="1474196" indent="0">
               <a:buNone/>
-              <a:defRPr sz="790" b="1"/>
+              <a:defRPr sz="860" b="1"/>
             </a:lvl7pPr>
-            <a:lvl8pPr marL="1579397" indent="0">
+            <a:lvl8pPr marL="1719895" indent="0">
               <a:buNone/>
-              <a:defRPr sz="790" b="1"/>
+              <a:defRPr sz="860" b="1"/>
             </a:lvl8pPr>
-            <a:lvl9pPr marL="1805026" indent="0">
+            <a:lvl9pPr marL="1965594" indent="0">
               <a:buNone/>
-              <a:defRPr sz="790" b="1"/>
+              <a:defRPr sz="860" b="1"/>
             </a:lvl9pPr>
           </a:lstStyle>
           <a:p>
@@ -4031,8 +4767,8 @@
         </p:nvSpPr>
         <p:spPr>
           <a:xfrm>
-            <a:off x="3316754" y="1236301"/>
-            <a:ext cx="2785289" cy="1818412"/>
+            <a:off x="3316754" y="1406785"/>
+            <a:ext cx="2785289" cy="2069169"/>
           </a:xfrm>
         </p:spPr>
         <p:txBody>
@@ -4093,7 +4829,7 @@
           <a:p>
             <a:fld id="{2302334F-977D-4A43-BDB9-11086BF63D6E}" type="datetimeFigureOut">
               <a:rPr lang="en-GB" smtClean="0"/>
-              <a:t>14/05/2025</a:t>
+              <a:t>26/05/2025</a:t>
             </a:fld>
             <a:endParaRPr lang="en-GB"/>
           </a:p>
@@ -4144,7 +4880,7 @@
     </p:spTree>
     <p:extLst>
       <p:ext uri="{BB962C8B-B14F-4D97-AF65-F5344CB8AC3E}">
-        <p14:creationId xmlns:p14="http://schemas.microsoft.com/office/powerpoint/2010/main" val="1410235470"/>
+        <p14:creationId xmlns:p14="http://schemas.microsoft.com/office/powerpoint/2010/main" val="1064965089"/>
       </p:ext>
     </p:extLst>
   </p:cSld>
@@ -4211,7 +4947,7 @@
           <a:p>
             <a:fld id="{2302334F-977D-4A43-BDB9-11086BF63D6E}" type="datetimeFigureOut">
               <a:rPr lang="en-GB" smtClean="0"/>
-              <a:t>14/05/2025</a:t>
+              <a:t>26/05/2025</a:t>
             </a:fld>
             <a:endParaRPr lang="en-GB"/>
           </a:p>
@@ -4262,7 +4998,7 @@
     </p:spTree>
     <p:extLst>
       <p:ext uri="{BB962C8B-B14F-4D97-AF65-F5344CB8AC3E}">
-        <p14:creationId xmlns:p14="http://schemas.microsoft.com/office/powerpoint/2010/main" val="1419532192"/>
+        <p14:creationId xmlns:p14="http://schemas.microsoft.com/office/powerpoint/2010/main" val="2216595830"/>
       </p:ext>
     </p:extLst>
   </p:cSld>
@@ -4306,7 +5042,7 @@
           <a:p>
             <a:fld id="{2302334F-977D-4A43-BDB9-11086BF63D6E}" type="datetimeFigureOut">
               <a:rPr lang="en-GB" smtClean="0"/>
-              <a:t>14/05/2025</a:t>
+              <a:t>26/05/2025</a:t>
             </a:fld>
             <a:endParaRPr lang="en-GB"/>
           </a:p>
@@ -4357,7 +5093,7 @@
     </p:spTree>
     <p:extLst>
       <p:ext uri="{BB962C8B-B14F-4D97-AF65-F5344CB8AC3E}">
-        <p14:creationId xmlns:p14="http://schemas.microsoft.com/office/powerpoint/2010/main" val="149362478"/>
+        <p14:creationId xmlns:p14="http://schemas.microsoft.com/office/powerpoint/2010/main" val="3806360622"/>
       </p:ext>
     </p:extLst>
   </p:cSld>
@@ -4396,15 +5132,15 @@
         </p:nvSpPr>
         <p:spPr>
           <a:xfrm>
-            <a:off x="451277" y="225637"/>
-            <a:ext cx="2113066" cy="789728"/>
+            <a:off x="451277" y="256752"/>
+            <a:ext cx="2113066" cy="898631"/>
           </a:xfrm>
         </p:spPr>
         <p:txBody>
           <a:bodyPr anchor="b"/>
           <a:lstStyle>
             <a:lvl1pPr>
-              <a:defRPr sz="1579"/>
+              <a:defRPr sz="1720"/>
             </a:lvl1pPr>
           </a:lstStyle>
           <a:p>
@@ -4428,39 +5164,39 @@
         </p:nvSpPr>
         <p:spPr>
           <a:xfrm>
-            <a:off x="2785289" y="487313"/>
-            <a:ext cx="3316754" cy="2405224"/>
+            <a:off x="2785289" y="554513"/>
+            <a:ext cx="3316754" cy="2736901"/>
           </a:xfrm>
         </p:spPr>
         <p:txBody>
           <a:bodyPr/>
           <a:lstStyle>
             <a:lvl1pPr>
-              <a:defRPr sz="1579"/>
+              <a:defRPr sz="1720"/>
             </a:lvl1pPr>
             <a:lvl2pPr>
-              <a:defRPr sz="1382"/>
+              <a:defRPr sz="1505"/>
             </a:lvl2pPr>
             <a:lvl3pPr>
-              <a:defRPr sz="1184"/>
+              <a:defRPr sz="1290"/>
             </a:lvl3pPr>
             <a:lvl4pPr>
-              <a:defRPr sz="987"/>
+              <a:defRPr sz="1075"/>
             </a:lvl4pPr>
             <a:lvl5pPr>
-              <a:defRPr sz="987"/>
+              <a:defRPr sz="1075"/>
             </a:lvl5pPr>
             <a:lvl6pPr>
-              <a:defRPr sz="987"/>
+              <a:defRPr sz="1075"/>
             </a:lvl6pPr>
             <a:lvl7pPr>
-              <a:defRPr sz="987"/>
+              <a:defRPr sz="1075"/>
             </a:lvl7pPr>
             <a:lvl8pPr>
-              <a:defRPr sz="987"/>
+              <a:defRPr sz="1075"/>
             </a:lvl8pPr>
             <a:lvl9pPr>
-              <a:defRPr sz="987"/>
+              <a:defRPr sz="1075"/>
             </a:lvl9pPr>
           </a:lstStyle>
           <a:p>
@@ -4513,8 +5249,8 @@
         </p:nvSpPr>
         <p:spPr>
           <a:xfrm>
-            <a:off x="451277" y="1015365"/>
-            <a:ext cx="2113066" cy="1881089"/>
+            <a:off x="451277" y="1155383"/>
+            <a:ext cx="2113066" cy="2140489"/>
           </a:xfrm>
         </p:spPr>
         <p:txBody>
@@ -4522,39 +5258,39 @@
           <a:lstStyle>
             <a:lvl1pPr marL="0" indent="0">
               <a:buNone/>
-              <a:defRPr sz="790"/>
+              <a:defRPr sz="860"/>
             </a:lvl1pPr>
-            <a:lvl2pPr marL="225628" indent="0">
+            <a:lvl2pPr marL="245699" indent="0">
               <a:buNone/>
-              <a:defRPr sz="691"/>
+              <a:defRPr sz="752"/>
             </a:lvl2pPr>
-            <a:lvl3pPr marL="451256" indent="0">
+            <a:lvl3pPr marL="491399" indent="0">
               <a:buNone/>
-              <a:defRPr sz="592"/>
+              <a:defRPr sz="645"/>
             </a:lvl3pPr>
-            <a:lvl4pPr marL="676885" indent="0">
+            <a:lvl4pPr marL="737098" indent="0">
               <a:buNone/>
-              <a:defRPr sz="493"/>
+              <a:defRPr sz="537"/>
             </a:lvl4pPr>
-            <a:lvl5pPr marL="902513" indent="0">
+            <a:lvl5pPr marL="982797" indent="0">
               <a:buNone/>
-              <a:defRPr sz="493"/>
+              <a:defRPr sz="537"/>
             </a:lvl5pPr>
-            <a:lvl6pPr marL="1128141" indent="0">
+            <a:lvl6pPr marL="1228496" indent="0">
               <a:buNone/>
-              <a:defRPr sz="493"/>
+              <a:defRPr sz="537"/>
             </a:lvl6pPr>
-            <a:lvl7pPr marL="1353769" indent="0">
+            <a:lvl7pPr marL="1474196" indent="0">
               <a:buNone/>
-              <a:defRPr sz="493"/>
+              <a:defRPr sz="537"/>
             </a:lvl7pPr>
-            <a:lvl8pPr marL="1579397" indent="0">
+            <a:lvl8pPr marL="1719895" indent="0">
               <a:buNone/>
-              <a:defRPr sz="493"/>
+              <a:defRPr sz="537"/>
             </a:lvl8pPr>
-            <a:lvl9pPr marL="1805026" indent="0">
+            <a:lvl9pPr marL="1965594" indent="0">
               <a:buNone/>
-              <a:defRPr sz="493"/>
+              <a:defRPr sz="537"/>
             </a:lvl9pPr>
           </a:lstStyle>
           <a:p>
@@ -4583,7 +5319,7 @@
           <a:p>
             <a:fld id="{2302334F-977D-4A43-BDB9-11086BF63D6E}" type="datetimeFigureOut">
               <a:rPr lang="en-GB" smtClean="0"/>
-              <a:t>14/05/2025</a:t>
+              <a:t>26/05/2025</a:t>
             </a:fld>
             <a:endParaRPr lang="en-GB"/>
           </a:p>
@@ -4634,7 +5370,7 @@
     </p:spTree>
     <p:extLst>
       <p:ext uri="{BB962C8B-B14F-4D97-AF65-F5344CB8AC3E}">
-        <p14:creationId xmlns:p14="http://schemas.microsoft.com/office/powerpoint/2010/main" val="248789096"/>
+        <p14:creationId xmlns:p14="http://schemas.microsoft.com/office/powerpoint/2010/main" val="2831885515"/>
       </p:ext>
     </p:extLst>
   </p:cSld>
@@ -4673,15 +5409,15 @@
         </p:nvSpPr>
         <p:spPr>
           <a:xfrm>
-            <a:off x="451277" y="225637"/>
-            <a:ext cx="2113066" cy="789728"/>
+            <a:off x="451277" y="256752"/>
+            <a:ext cx="2113066" cy="898631"/>
           </a:xfrm>
         </p:spPr>
         <p:txBody>
           <a:bodyPr anchor="b"/>
           <a:lstStyle>
             <a:lvl1pPr>
-              <a:defRPr sz="1579"/>
+              <a:defRPr sz="1720"/>
             </a:lvl1pPr>
           </a:lstStyle>
           <a:p>
@@ -4705,8 +5441,8 @@
         </p:nvSpPr>
         <p:spPr>
           <a:xfrm>
-            <a:off x="2785289" y="487313"/>
-            <a:ext cx="3316754" cy="2405224"/>
+            <a:off x="2785289" y="554513"/>
+            <a:ext cx="3316754" cy="2736901"/>
           </a:xfrm>
         </p:spPr>
         <p:txBody>
@@ -4714,39 +5450,39 @@
           <a:lstStyle>
             <a:lvl1pPr marL="0" indent="0">
               <a:buNone/>
-              <a:defRPr sz="1579"/>
+              <a:defRPr sz="1720"/>
             </a:lvl1pPr>
-            <a:lvl2pPr marL="225628" indent="0">
+            <a:lvl2pPr marL="245699" indent="0">
               <a:buNone/>
-              <a:defRPr sz="1382"/>
+              <a:defRPr sz="1505"/>
             </a:lvl2pPr>
-            <a:lvl3pPr marL="451256" indent="0">
+            <a:lvl3pPr marL="491399" indent="0">
               <a:buNone/>
-              <a:defRPr sz="1184"/>
+              <a:defRPr sz="1290"/>
             </a:lvl3pPr>
-            <a:lvl4pPr marL="676885" indent="0">
+            <a:lvl4pPr marL="737098" indent="0">
               <a:buNone/>
-              <a:defRPr sz="987"/>
+              <a:defRPr sz="1075"/>
             </a:lvl4pPr>
-            <a:lvl5pPr marL="902513" indent="0">
+            <a:lvl5pPr marL="982797" indent="0">
               <a:buNone/>
-              <a:defRPr sz="987"/>
+              <a:defRPr sz="1075"/>
             </a:lvl5pPr>
-            <a:lvl6pPr marL="1128141" indent="0">
+            <a:lvl6pPr marL="1228496" indent="0">
               <a:buNone/>
-              <a:defRPr sz="987"/>
+              <a:defRPr sz="1075"/>
             </a:lvl6pPr>
-            <a:lvl7pPr marL="1353769" indent="0">
+            <a:lvl7pPr marL="1474196" indent="0">
               <a:buNone/>
-              <a:defRPr sz="987"/>
+              <a:defRPr sz="1075"/>
             </a:lvl7pPr>
-            <a:lvl8pPr marL="1579397" indent="0">
+            <a:lvl8pPr marL="1719895" indent="0">
               <a:buNone/>
-              <a:defRPr sz="987"/>
+              <a:defRPr sz="1075"/>
             </a:lvl8pPr>
-            <a:lvl9pPr marL="1805026" indent="0">
+            <a:lvl9pPr marL="1965594" indent="0">
               <a:buNone/>
-              <a:defRPr sz="987"/>
+              <a:defRPr sz="1075"/>
             </a:lvl9pPr>
           </a:lstStyle>
           <a:p>
@@ -4770,8 +5506,8 @@
         </p:nvSpPr>
         <p:spPr>
           <a:xfrm>
-            <a:off x="451277" y="1015365"/>
-            <a:ext cx="2113066" cy="1881089"/>
+            <a:off x="451277" y="1155383"/>
+            <a:ext cx="2113066" cy="2140489"/>
           </a:xfrm>
         </p:spPr>
         <p:txBody>
@@ -4779,39 +5515,39 @@
           <a:lstStyle>
             <a:lvl1pPr marL="0" indent="0">
               <a:buNone/>
-              <a:defRPr sz="790"/>
+              <a:defRPr sz="860"/>
             </a:lvl1pPr>
-            <a:lvl2pPr marL="225628" indent="0">
+            <a:lvl2pPr marL="245699" indent="0">
               <a:buNone/>
-              <a:defRPr sz="691"/>
+              <a:defRPr sz="752"/>
             </a:lvl2pPr>
-            <a:lvl3pPr marL="451256" indent="0">
+            <a:lvl3pPr marL="491399" indent="0">
               <a:buNone/>
-              <a:defRPr sz="592"/>
+              <a:defRPr sz="645"/>
             </a:lvl3pPr>
-            <a:lvl4pPr marL="676885" indent="0">
+            <a:lvl4pPr marL="737098" indent="0">
               <a:buNone/>
-              <a:defRPr sz="493"/>
+              <a:defRPr sz="537"/>
             </a:lvl4pPr>
-            <a:lvl5pPr marL="902513" indent="0">
+            <a:lvl5pPr marL="982797" indent="0">
               <a:buNone/>
-              <a:defRPr sz="493"/>
+              <a:defRPr sz="537"/>
             </a:lvl5pPr>
-            <a:lvl6pPr marL="1128141" indent="0">
+            <a:lvl6pPr marL="1228496" indent="0">
               <a:buNone/>
-              <a:defRPr sz="493"/>
+              <a:defRPr sz="537"/>
             </a:lvl6pPr>
-            <a:lvl7pPr marL="1353769" indent="0">
+            <a:lvl7pPr marL="1474196" indent="0">
               <a:buNone/>
-              <a:defRPr sz="493"/>
+              <a:defRPr sz="537"/>
             </a:lvl7pPr>
-            <a:lvl8pPr marL="1579397" indent="0">
+            <a:lvl8pPr marL="1719895" indent="0">
               <a:buNone/>
-              <a:defRPr sz="493"/>
+              <a:defRPr sz="537"/>
             </a:lvl8pPr>
-            <a:lvl9pPr marL="1805026" indent="0">
+            <a:lvl9pPr marL="1965594" indent="0">
               <a:buNone/>
-              <a:defRPr sz="493"/>
+              <a:defRPr sz="537"/>
             </a:lvl9pPr>
           </a:lstStyle>
           <a:p>
@@ -4840,7 +5576,7 @@
           <a:p>
             <a:fld id="{2302334F-977D-4A43-BDB9-11086BF63D6E}" type="datetimeFigureOut">
               <a:rPr lang="en-GB" smtClean="0"/>
-              <a:t>14/05/2025</a:t>
+              <a:t>26/05/2025</a:t>
             </a:fld>
             <a:endParaRPr lang="en-GB"/>
           </a:p>
@@ -4891,7 +5627,7 @@
     </p:spTree>
     <p:extLst>
       <p:ext uri="{BB962C8B-B14F-4D97-AF65-F5344CB8AC3E}">
-        <p14:creationId xmlns:p14="http://schemas.microsoft.com/office/powerpoint/2010/main" val="2765660743"/>
+        <p14:creationId xmlns:p14="http://schemas.microsoft.com/office/powerpoint/2010/main" val="1727520680"/>
       </p:ext>
     </p:extLst>
   </p:cSld>
@@ -4935,8 +5671,8 @@
         </p:nvSpPr>
         <p:spPr>
           <a:xfrm>
-            <a:off x="450424" y="180196"/>
-            <a:ext cx="5650766" cy="654190"/>
+            <a:off x="450424" y="205045"/>
+            <a:ext cx="5650766" cy="744402"/>
           </a:xfrm>
           <a:prstGeom prst="rect">
             <a:avLst/>
@@ -4968,8 +5704,8 @@
         </p:nvSpPr>
         <p:spPr>
           <a:xfrm>
-            <a:off x="450424" y="900980"/>
-            <a:ext cx="5650766" cy="2147466"/>
+            <a:off x="450424" y="1025223"/>
+            <a:ext cx="5650766" cy="2443599"/>
           </a:xfrm>
           <a:prstGeom prst="rect">
             <a:avLst/>
@@ -5030,8 +5766,8 @@
         </p:nvSpPr>
         <p:spPr>
           <a:xfrm>
-            <a:off x="450423" y="3136977"/>
-            <a:ext cx="1474113" cy="180196"/>
+            <a:off x="450423" y="3569562"/>
+            <a:ext cx="1474113" cy="205045"/>
           </a:xfrm>
           <a:prstGeom prst="rect">
             <a:avLst/>
@@ -5041,7 +5777,7 @@
           <a:bodyPr vert="horz" lIns="91440" tIns="45720" rIns="91440" bIns="45720" rtlCol="0" anchor="ctr"/>
           <a:lstStyle>
             <a:lvl1pPr algn="l">
-              <a:defRPr sz="592">
+              <a:defRPr sz="645">
                 <a:solidFill>
                   <a:schemeClr val="tx1">
                     <a:tint val="82000"/>
@@ -5053,7 +5789,7 @@
           <a:p>
             <a:fld id="{2302334F-977D-4A43-BDB9-11086BF63D6E}" type="datetimeFigureOut">
               <a:rPr lang="en-GB" smtClean="0"/>
-              <a:t>14/05/2025</a:t>
+              <a:t>26/05/2025</a:t>
             </a:fld>
             <a:endParaRPr lang="en-GB"/>
           </a:p>
@@ -5071,8 +5807,8 @@
         </p:nvSpPr>
         <p:spPr>
           <a:xfrm>
-            <a:off x="2170222" y="3136977"/>
-            <a:ext cx="2211169" cy="180196"/>
+            <a:off x="2170222" y="3569562"/>
+            <a:ext cx="2211169" cy="205045"/>
           </a:xfrm>
           <a:prstGeom prst="rect">
             <a:avLst/>
@@ -5082,7 +5818,7 @@
           <a:bodyPr vert="horz" lIns="91440" tIns="45720" rIns="91440" bIns="45720" rtlCol="0" anchor="ctr"/>
           <a:lstStyle>
             <a:lvl1pPr algn="ctr">
-              <a:defRPr sz="592">
+              <a:defRPr sz="645">
                 <a:solidFill>
                   <a:schemeClr val="tx1">
                     <a:tint val="82000"/>
@@ -5108,8 +5844,8 @@
         </p:nvSpPr>
         <p:spPr>
           <a:xfrm>
-            <a:off x="4627077" y="3136977"/>
-            <a:ext cx="1474113" cy="180196"/>
+            <a:off x="4627077" y="3569562"/>
+            <a:ext cx="1474113" cy="205045"/>
           </a:xfrm>
           <a:prstGeom prst="rect">
             <a:avLst/>
@@ -5119,7 +5855,7 @@
           <a:bodyPr vert="horz" lIns="91440" tIns="45720" rIns="91440" bIns="45720" rtlCol="0" anchor="ctr"/>
           <a:lstStyle>
             <a:lvl1pPr algn="r">
-              <a:defRPr sz="592">
+              <a:defRPr sz="645">
                 <a:solidFill>
                   <a:schemeClr val="tx1">
                     <a:tint val="82000"/>
@@ -5140,27 +5876,27 @@
     </p:spTree>
     <p:extLst>
       <p:ext uri="{BB962C8B-B14F-4D97-AF65-F5344CB8AC3E}">
-        <p14:creationId xmlns:p14="http://schemas.microsoft.com/office/powerpoint/2010/main" val="1367211417"/>
+        <p14:creationId xmlns:p14="http://schemas.microsoft.com/office/powerpoint/2010/main" val="2984237846"/>
       </p:ext>
     </p:extLst>
   </p:cSld>
   <p:clrMap bg1="lt1" tx1="dk1" bg2="lt2" tx2="dk2" accent1="accent1" accent2="accent2" accent3="accent3" accent4="accent4" accent5="accent5" accent6="accent6" hlink="hlink" folHlink="folHlink"/>
   <p:sldLayoutIdLst>
-    <p:sldLayoutId id="2147483721" r:id="rId1"/>
-    <p:sldLayoutId id="2147483722" r:id="rId2"/>
-    <p:sldLayoutId id="2147483723" r:id="rId3"/>
-    <p:sldLayoutId id="2147483724" r:id="rId4"/>
-    <p:sldLayoutId id="2147483725" r:id="rId5"/>
-    <p:sldLayoutId id="2147483726" r:id="rId6"/>
-    <p:sldLayoutId id="2147483727" r:id="rId7"/>
-    <p:sldLayoutId id="2147483728" r:id="rId8"/>
-    <p:sldLayoutId id="2147483729" r:id="rId9"/>
-    <p:sldLayoutId id="2147483730" r:id="rId10"/>
-    <p:sldLayoutId id="2147483731" r:id="rId11"/>
+    <p:sldLayoutId id="2147483745" r:id="rId1"/>
+    <p:sldLayoutId id="2147483746" r:id="rId2"/>
+    <p:sldLayoutId id="2147483747" r:id="rId3"/>
+    <p:sldLayoutId id="2147483748" r:id="rId4"/>
+    <p:sldLayoutId id="2147483749" r:id="rId5"/>
+    <p:sldLayoutId id="2147483750" r:id="rId6"/>
+    <p:sldLayoutId id="2147483751" r:id="rId7"/>
+    <p:sldLayoutId id="2147483752" r:id="rId8"/>
+    <p:sldLayoutId id="2147483753" r:id="rId9"/>
+    <p:sldLayoutId id="2147483754" r:id="rId10"/>
+    <p:sldLayoutId id="2147483755" r:id="rId11"/>
   </p:sldLayoutIdLst>
   <p:txStyles>
     <p:titleStyle>
-      <a:lvl1pPr algn="l" defTabSz="451256" rtl="0" eaLnBrk="1" latinLnBrk="0" hangingPunct="1">
+      <a:lvl1pPr algn="l" defTabSz="491399" rtl="0" eaLnBrk="1" latinLnBrk="0" hangingPunct="1">
         <a:lnSpc>
           <a:spcPct val="90000"/>
         </a:lnSpc>
@@ -5168,7 +5904,7 @@
           <a:spcPct val="0"/>
         </a:spcBef>
         <a:buNone/>
-        <a:defRPr sz="2171" kern="1200">
+        <a:defRPr sz="2365" kern="1200">
           <a:solidFill>
             <a:schemeClr val="tx1"/>
           </a:solidFill>
@@ -5179,16 +5915,16 @@
       </a:lvl1pPr>
     </p:titleStyle>
     <p:bodyStyle>
-      <a:lvl1pPr marL="112814" indent="-112814" algn="l" defTabSz="451256" rtl="0" eaLnBrk="1" latinLnBrk="0" hangingPunct="1">
+      <a:lvl1pPr marL="122850" indent="-122850" algn="l" defTabSz="491399" rtl="0" eaLnBrk="1" latinLnBrk="0" hangingPunct="1">
         <a:lnSpc>
           <a:spcPct val="90000"/>
         </a:lnSpc>
         <a:spcBef>
-          <a:spcPts val="493"/>
+          <a:spcPts val="537"/>
         </a:spcBef>
         <a:buFont typeface="Arial" panose="020B0604020202020204" pitchFamily="34" charset="0"/>
         <a:buChar char="•"/>
-        <a:defRPr sz="1382" kern="1200">
+        <a:defRPr sz="1505" kern="1200">
           <a:solidFill>
             <a:schemeClr val="tx1"/>
           </a:solidFill>
@@ -5197,16 +5933,16 @@
           <a:cs typeface="+mn-cs"/>
         </a:defRPr>
       </a:lvl1pPr>
-      <a:lvl2pPr marL="338442" indent="-112814" algn="l" defTabSz="451256" rtl="0" eaLnBrk="1" latinLnBrk="0" hangingPunct="1">
+      <a:lvl2pPr marL="368549" indent="-122850" algn="l" defTabSz="491399" rtl="0" eaLnBrk="1" latinLnBrk="0" hangingPunct="1">
         <a:lnSpc>
           <a:spcPct val="90000"/>
         </a:lnSpc>
         <a:spcBef>
-          <a:spcPts val="247"/>
+          <a:spcPts val="269"/>
         </a:spcBef>
         <a:buFont typeface="Arial" panose="020B0604020202020204" pitchFamily="34" charset="0"/>
         <a:buChar char="•"/>
-        <a:defRPr sz="1184" kern="1200">
+        <a:defRPr sz="1290" kern="1200">
           <a:solidFill>
             <a:schemeClr val="tx1"/>
           </a:solidFill>
@@ -5215,16 +5951,16 @@
           <a:cs typeface="+mn-cs"/>
         </a:defRPr>
       </a:lvl2pPr>
-      <a:lvl3pPr marL="564071" indent="-112814" algn="l" defTabSz="451256" rtl="0" eaLnBrk="1" latinLnBrk="0" hangingPunct="1">
+      <a:lvl3pPr marL="614248" indent="-122850" algn="l" defTabSz="491399" rtl="0" eaLnBrk="1" latinLnBrk="0" hangingPunct="1">
         <a:lnSpc>
           <a:spcPct val="90000"/>
         </a:lnSpc>
         <a:spcBef>
-          <a:spcPts val="247"/>
+          <a:spcPts val="269"/>
         </a:spcBef>
         <a:buFont typeface="Arial" panose="020B0604020202020204" pitchFamily="34" charset="0"/>
         <a:buChar char="•"/>
-        <a:defRPr sz="987" kern="1200">
+        <a:defRPr sz="1075" kern="1200">
           <a:solidFill>
             <a:schemeClr val="tx1"/>
           </a:solidFill>
@@ -5233,16 +5969,16 @@
           <a:cs typeface="+mn-cs"/>
         </a:defRPr>
       </a:lvl3pPr>
-      <a:lvl4pPr marL="789699" indent="-112814" algn="l" defTabSz="451256" rtl="0" eaLnBrk="1" latinLnBrk="0" hangingPunct="1">
+      <a:lvl4pPr marL="859947" indent="-122850" algn="l" defTabSz="491399" rtl="0" eaLnBrk="1" latinLnBrk="0" hangingPunct="1">
         <a:lnSpc>
           <a:spcPct val="90000"/>
         </a:lnSpc>
         <a:spcBef>
-          <a:spcPts val="247"/>
+          <a:spcPts val="269"/>
         </a:spcBef>
         <a:buFont typeface="Arial" panose="020B0604020202020204" pitchFamily="34" charset="0"/>
         <a:buChar char="•"/>
-        <a:defRPr sz="888" kern="1200">
+        <a:defRPr sz="967" kern="1200">
           <a:solidFill>
             <a:schemeClr val="tx1"/>
           </a:solidFill>
@@ -5251,16 +5987,16 @@
           <a:cs typeface="+mn-cs"/>
         </a:defRPr>
       </a:lvl4pPr>
-      <a:lvl5pPr marL="1015327" indent="-112814" algn="l" defTabSz="451256" rtl="0" eaLnBrk="1" latinLnBrk="0" hangingPunct="1">
+      <a:lvl5pPr marL="1105647" indent="-122850" algn="l" defTabSz="491399" rtl="0" eaLnBrk="1" latinLnBrk="0" hangingPunct="1">
         <a:lnSpc>
           <a:spcPct val="90000"/>
         </a:lnSpc>
         <a:spcBef>
-          <a:spcPts val="247"/>
+          <a:spcPts val="269"/>
         </a:spcBef>
         <a:buFont typeface="Arial" panose="020B0604020202020204" pitchFamily="34" charset="0"/>
         <a:buChar char="•"/>
-        <a:defRPr sz="888" kern="1200">
+        <a:defRPr sz="967" kern="1200">
           <a:solidFill>
             <a:schemeClr val="tx1"/>
           </a:solidFill>
@@ -5269,16 +6005,16 @@
           <a:cs typeface="+mn-cs"/>
         </a:defRPr>
       </a:lvl5pPr>
-      <a:lvl6pPr marL="1240955" indent="-112814" algn="l" defTabSz="451256" rtl="0" eaLnBrk="1" latinLnBrk="0" hangingPunct="1">
+      <a:lvl6pPr marL="1351346" indent="-122850" algn="l" defTabSz="491399" rtl="0" eaLnBrk="1" latinLnBrk="0" hangingPunct="1">
         <a:lnSpc>
           <a:spcPct val="90000"/>
         </a:lnSpc>
         <a:spcBef>
-          <a:spcPts val="247"/>
+          <a:spcPts val="269"/>
         </a:spcBef>
         <a:buFont typeface="Arial" panose="020B0604020202020204" pitchFamily="34" charset="0"/>
         <a:buChar char="•"/>
-        <a:defRPr sz="888" kern="1200">
+        <a:defRPr sz="967" kern="1200">
           <a:solidFill>
             <a:schemeClr val="tx1"/>
           </a:solidFill>
@@ -5287,16 +6023,16 @@
           <a:cs typeface="+mn-cs"/>
         </a:defRPr>
       </a:lvl6pPr>
-      <a:lvl7pPr marL="1466583" indent="-112814" algn="l" defTabSz="451256" rtl="0" eaLnBrk="1" latinLnBrk="0" hangingPunct="1">
+      <a:lvl7pPr marL="1597045" indent="-122850" algn="l" defTabSz="491399" rtl="0" eaLnBrk="1" latinLnBrk="0" hangingPunct="1">
         <a:lnSpc>
           <a:spcPct val="90000"/>
         </a:lnSpc>
         <a:spcBef>
-          <a:spcPts val="247"/>
+          <a:spcPts val="269"/>
         </a:spcBef>
         <a:buFont typeface="Arial" panose="020B0604020202020204" pitchFamily="34" charset="0"/>
         <a:buChar char="•"/>
-        <a:defRPr sz="888" kern="1200">
+        <a:defRPr sz="967" kern="1200">
           <a:solidFill>
             <a:schemeClr val="tx1"/>
           </a:solidFill>
@@ -5305,16 +6041,16 @@
           <a:cs typeface="+mn-cs"/>
         </a:defRPr>
       </a:lvl7pPr>
-      <a:lvl8pPr marL="1692212" indent="-112814" algn="l" defTabSz="451256" rtl="0" eaLnBrk="1" latinLnBrk="0" hangingPunct="1">
+      <a:lvl8pPr marL="1842745" indent="-122850" algn="l" defTabSz="491399" rtl="0" eaLnBrk="1" latinLnBrk="0" hangingPunct="1">
         <a:lnSpc>
           <a:spcPct val="90000"/>
         </a:lnSpc>
         <a:spcBef>
-          <a:spcPts val="247"/>
+          <a:spcPts val="269"/>
         </a:spcBef>
         <a:buFont typeface="Arial" panose="020B0604020202020204" pitchFamily="34" charset="0"/>
         <a:buChar char="•"/>
-        <a:defRPr sz="888" kern="1200">
+        <a:defRPr sz="967" kern="1200">
           <a:solidFill>
             <a:schemeClr val="tx1"/>
           </a:solidFill>
@@ -5323,16 +6059,16 @@
           <a:cs typeface="+mn-cs"/>
         </a:defRPr>
       </a:lvl8pPr>
-      <a:lvl9pPr marL="1917840" indent="-112814" algn="l" defTabSz="451256" rtl="0" eaLnBrk="1" latinLnBrk="0" hangingPunct="1">
+      <a:lvl9pPr marL="2088444" indent="-122850" algn="l" defTabSz="491399" rtl="0" eaLnBrk="1" latinLnBrk="0" hangingPunct="1">
         <a:lnSpc>
           <a:spcPct val="90000"/>
         </a:lnSpc>
         <a:spcBef>
-          <a:spcPts val="247"/>
+          <a:spcPts val="269"/>
         </a:spcBef>
         <a:buFont typeface="Arial" panose="020B0604020202020204" pitchFamily="34" charset="0"/>
         <a:buChar char="•"/>
-        <a:defRPr sz="888" kern="1200">
+        <a:defRPr sz="967" kern="1200">
           <a:solidFill>
             <a:schemeClr val="tx1"/>
           </a:solidFill>
@@ -5346,8 +6082,8 @@
       <a:defPPr>
         <a:defRPr lang="en-US"/>
       </a:defPPr>
-      <a:lvl1pPr marL="0" algn="l" defTabSz="451256" rtl="0" eaLnBrk="1" latinLnBrk="0" hangingPunct="1">
-        <a:defRPr sz="888" kern="1200">
+      <a:lvl1pPr marL="0" algn="l" defTabSz="491399" rtl="0" eaLnBrk="1" latinLnBrk="0" hangingPunct="1">
+        <a:defRPr sz="967" kern="1200">
           <a:solidFill>
             <a:schemeClr val="tx1"/>
           </a:solidFill>
@@ -5356,8 +6092,8 @@
           <a:cs typeface="+mn-cs"/>
         </a:defRPr>
       </a:lvl1pPr>
-      <a:lvl2pPr marL="225628" algn="l" defTabSz="451256" rtl="0" eaLnBrk="1" latinLnBrk="0" hangingPunct="1">
-        <a:defRPr sz="888" kern="1200">
+      <a:lvl2pPr marL="245699" algn="l" defTabSz="491399" rtl="0" eaLnBrk="1" latinLnBrk="0" hangingPunct="1">
+        <a:defRPr sz="967" kern="1200">
           <a:solidFill>
             <a:schemeClr val="tx1"/>
           </a:solidFill>
@@ -5366,8 +6102,8 @@
           <a:cs typeface="+mn-cs"/>
         </a:defRPr>
       </a:lvl2pPr>
-      <a:lvl3pPr marL="451256" algn="l" defTabSz="451256" rtl="0" eaLnBrk="1" latinLnBrk="0" hangingPunct="1">
-        <a:defRPr sz="888" kern="1200">
+      <a:lvl3pPr marL="491399" algn="l" defTabSz="491399" rtl="0" eaLnBrk="1" latinLnBrk="0" hangingPunct="1">
+        <a:defRPr sz="967" kern="1200">
           <a:solidFill>
             <a:schemeClr val="tx1"/>
           </a:solidFill>
@@ -5376,8 +6112,8 @@
           <a:cs typeface="+mn-cs"/>
         </a:defRPr>
       </a:lvl3pPr>
-      <a:lvl4pPr marL="676885" algn="l" defTabSz="451256" rtl="0" eaLnBrk="1" latinLnBrk="0" hangingPunct="1">
-        <a:defRPr sz="888" kern="1200">
+      <a:lvl4pPr marL="737098" algn="l" defTabSz="491399" rtl="0" eaLnBrk="1" latinLnBrk="0" hangingPunct="1">
+        <a:defRPr sz="967" kern="1200">
           <a:solidFill>
             <a:schemeClr val="tx1"/>
           </a:solidFill>
@@ -5386,8 +6122,8 @@
           <a:cs typeface="+mn-cs"/>
         </a:defRPr>
       </a:lvl4pPr>
-      <a:lvl5pPr marL="902513" algn="l" defTabSz="451256" rtl="0" eaLnBrk="1" latinLnBrk="0" hangingPunct="1">
-        <a:defRPr sz="888" kern="1200">
+      <a:lvl5pPr marL="982797" algn="l" defTabSz="491399" rtl="0" eaLnBrk="1" latinLnBrk="0" hangingPunct="1">
+        <a:defRPr sz="967" kern="1200">
           <a:solidFill>
             <a:schemeClr val="tx1"/>
           </a:solidFill>
@@ -5396,8 +6132,8 @@
           <a:cs typeface="+mn-cs"/>
         </a:defRPr>
       </a:lvl5pPr>
-      <a:lvl6pPr marL="1128141" algn="l" defTabSz="451256" rtl="0" eaLnBrk="1" latinLnBrk="0" hangingPunct="1">
-        <a:defRPr sz="888" kern="1200">
+      <a:lvl6pPr marL="1228496" algn="l" defTabSz="491399" rtl="0" eaLnBrk="1" latinLnBrk="0" hangingPunct="1">
+        <a:defRPr sz="967" kern="1200">
           <a:solidFill>
             <a:schemeClr val="tx1"/>
           </a:solidFill>
@@ -5406,8 +6142,8 @@
           <a:cs typeface="+mn-cs"/>
         </a:defRPr>
       </a:lvl6pPr>
-      <a:lvl7pPr marL="1353769" algn="l" defTabSz="451256" rtl="0" eaLnBrk="1" latinLnBrk="0" hangingPunct="1">
-        <a:defRPr sz="888" kern="1200">
+      <a:lvl7pPr marL="1474196" algn="l" defTabSz="491399" rtl="0" eaLnBrk="1" latinLnBrk="0" hangingPunct="1">
+        <a:defRPr sz="967" kern="1200">
           <a:solidFill>
             <a:schemeClr val="tx1"/>
           </a:solidFill>
@@ -5416,8 +6152,8 @@
           <a:cs typeface="+mn-cs"/>
         </a:defRPr>
       </a:lvl7pPr>
-      <a:lvl8pPr marL="1579397" algn="l" defTabSz="451256" rtl="0" eaLnBrk="1" latinLnBrk="0" hangingPunct="1">
-        <a:defRPr sz="888" kern="1200">
+      <a:lvl8pPr marL="1719895" algn="l" defTabSz="491399" rtl="0" eaLnBrk="1" latinLnBrk="0" hangingPunct="1">
+        <a:defRPr sz="967" kern="1200">
           <a:solidFill>
             <a:schemeClr val="tx1"/>
           </a:solidFill>
@@ -5426,8 +6162,8 @@
           <a:cs typeface="+mn-cs"/>
         </a:defRPr>
       </a:lvl8pPr>
-      <a:lvl9pPr marL="1805026" algn="l" defTabSz="451256" rtl="0" eaLnBrk="1" latinLnBrk="0" hangingPunct="1">
-        <a:defRPr sz="888" kern="1200">
+      <a:lvl9pPr marL="1965594" algn="l" defTabSz="491399" rtl="0" eaLnBrk="1" latinLnBrk="0" hangingPunct="1">
+        <a:defRPr sz="967" kern="1200">
           <a:solidFill>
             <a:schemeClr val="tx1"/>
           </a:solidFill>
@@ -5460,7 +6196,7 @@
       </p:grpSpPr>
       <p:pic>
         <p:nvPicPr>
-          <p:cNvPr id="3" name="Picture 2" descr="A map of the united states&#10;&#10;Description automatically generated">
+          <p:cNvPr id="92" name="Picture 91" descr="A map of the united states&#10;&#10;Description automatically generated">
             <a:extLst>
               <a:ext uri="{FF2B5EF4-FFF2-40B4-BE49-F238E27FC236}">
                 <a16:creationId xmlns:a16="http://schemas.microsoft.com/office/drawing/2014/main" id="{5576DFB5-07C9-9C7F-52D6-98F487E9338C}"/>
@@ -5485,7 +6221,7 @@
         </p:blipFill>
         <p:spPr>
           <a:xfrm>
-            <a:off x="292905" y="33868"/>
+            <a:off x="292905" y="511478"/>
             <a:ext cx="5810250" cy="3169920"/>
           </a:xfrm>
           <a:prstGeom prst="rect">
@@ -5502,7 +6238,7 @@
       </p:pic>
       <p:pic>
         <p:nvPicPr>
-          <p:cNvPr id="4" name="Picture 3" descr="A map of the united states&#10;&#10;Description automatically generated">
+          <p:cNvPr id="93" name="Picture 92" descr="A map of the united states&#10;&#10;Description automatically generated">
             <a:extLst>
               <a:ext uri="{FF2B5EF4-FFF2-40B4-BE49-F238E27FC236}">
                 <a16:creationId xmlns:a16="http://schemas.microsoft.com/office/drawing/2014/main" id="{C0EA9BA7-9BA3-87E1-85A9-F8ACC1C32D13}"/>
@@ -5527,7 +6263,7 @@
         </p:blipFill>
         <p:spPr>
           <a:xfrm rot="16200000">
-            <a:off x="4806071" y="1735789"/>
+            <a:off x="4806071" y="2213399"/>
             <a:ext cx="2824625" cy="86400"/>
           </a:xfrm>
           <a:prstGeom prst="rect">
@@ -5537,7 +6273,7 @@
       </p:pic>
       <p:sp>
         <p:nvSpPr>
-          <p:cNvPr id="5" name="TextBox 4">
+          <p:cNvPr id="94" name="TextBox 93">
             <a:extLst>
               <a:ext uri="{FF2B5EF4-FFF2-40B4-BE49-F238E27FC236}">
                 <a16:creationId xmlns:a16="http://schemas.microsoft.com/office/drawing/2014/main" id="{384D6C06-DC18-FF34-E84C-3BC146A8D3F9}"/>
@@ -5549,7 +6285,7 @@
         </p:nvSpPr>
         <p:spPr>
           <a:xfrm>
-            <a:off x="-195580" y="168747"/>
+            <a:off x="-195580" y="646357"/>
             <a:ext cx="536815" cy="215444"/>
           </a:xfrm>
           <a:prstGeom prst="rect">
@@ -5567,30 +6303,30 @@
             <a:r>
               <a:rPr lang="en-GB" sz="800" dirty="0">
                 <a:solidFill>
-                  <a:schemeClr val="bg2">
-                    <a:lumMod val="50000"/>
-                  </a:schemeClr>
+                  <a:srgbClr val="333333"/>
                 </a:solidFill>
+                <a:latin typeface="Calibri Light" panose="020F0302020204030204" pitchFamily="34" charset="0"/>
+                <a:cs typeface="Calibri Light" panose="020F0302020204030204" pitchFamily="34" charset="0"/>
               </a:rPr>
               <a:t>50 </a:t>
             </a:r>
             <a:r>
               <a:rPr lang="it-IT" sz="800" dirty="0">
                 <a:solidFill>
-                  <a:schemeClr val="bg2">
-                    <a:lumMod val="50000"/>
-                  </a:schemeClr>
+                  <a:srgbClr val="333333"/>
                 </a:solidFill>
+                <a:latin typeface="Calibri Light" panose="020F0302020204030204" pitchFamily="34" charset="0"/>
+                <a:cs typeface="Calibri Light" panose="020F0302020204030204" pitchFamily="34" charset="0"/>
               </a:rPr>
               <a:t>°</a:t>
             </a:r>
             <a:r>
               <a:rPr lang="en-GB" sz="800" dirty="0">
                 <a:solidFill>
-                  <a:schemeClr val="bg2">
-                    <a:lumMod val="50000"/>
-                  </a:schemeClr>
+                  <a:srgbClr val="333333"/>
                 </a:solidFill>
+                <a:latin typeface="Calibri Light" panose="020F0302020204030204" pitchFamily="34" charset="0"/>
+                <a:cs typeface="Calibri Light" panose="020F0302020204030204" pitchFamily="34" charset="0"/>
               </a:rPr>
               <a:t>N</a:t>
             </a:r>
@@ -5599,7 +6335,7 @@
       </p:sp>
       <p:sp>
         <p:nvSpPr>
-          <p:cNvPr id="6" name="TextBox 5">
+          <p:cNvPr id="95" name="TextBox 94">
             <a:extLst>
               <a:ext uri="{FF2B5EF4-FFF2-40B4-BE49-F238E27FC236}">
                 <a16:creationId xmlns:a16="http://schemas.microsoft.com/office/drawing/2014/main" id="{083AEDDC-E5EB-E07A-CF91-E947C367E6C5}"/>
@@ -5611,7 +6347,7 @@
         </p:nvSpPr>
         <p:spPr>
           <a:xfrm>
-            <a:off x="-195580" y="1343821"/>
+            <a:off x="-195580" y="1821431"/>
             <a:ext cx="536815" cy="215444"/>
           </a:xfrm>
           <a:prstGeom prst="rect">
@@ -5629,30 +6365,30 @@
             <a:r>
               <a:rPr lang="en-GB" sz="800" dirty="0">
                 <a:solidFill>
-                  <a:schemeClr val="bg2">
-                    <a:lumMod val="50000"/>
-                  </a:schemeClr>
+                  <a:srgbClr val="333333"/>
                 </a:solidFill>
+                <a:latin typeface="Calibri Light" panose="020F0302020204030204" pitchFamily="34" charset="0"/>
+                <a:cs typeface="Calibri Light" panose="020F0302020204030204" pitchFamily="34" charset="0"/>
               </a:rPr>
               <a:t>40 </a:t>
             </a:r>
             <a:r>
               <a:rPr lang="it-IT" sz="800" dirty="0">
                 <a:solidFill>
-                  <a:schemeClr val="bg2">
-                    <a:lumMod val="50000"/>
-                  </a:schemeClr>
+                  <a:srgbClr val="333333"/>
                 </a:solidFill>
+                <a:latin typeface="Calibri Light" panose="020F0302020204030204" pitchFamily="34" charset="0"/>
+                <a:cs typeface="Calibri Light" panose="020F0302020204030204" pitchFamily="34" charset="0"/>
               </a:rPr>
               <a:t>°</a:t>
             </a:r>
             <a:r>
               <a:rPr lang="en-GB" sz="800" dirty="0">
                 <a:solidFill>
-                  <a:schemeClr val="bg2">
-                    <a:lumMod val="50000"/>
-                  </a:schemeClr>
+                  <a:srgbClr val="333333"/>
                 </a:solidFill>
+                <a:latin typeface="Calibri Light" panose="020F0302020204030204" pitchFamily="34" charset="0"/>
+                <a:cs typeface="Calibri Light" panose="020F0302020204030204" pitchFamily="34" charset="0"/>
               </a:rPr>
               <a:t>N</a:t>
             </a:r>
@@ -5661,7 +6397,7 @@
       </p:sp>
       <p:sp>
         <p:nvSpPr>
-          <p:cNvPr id="7" name="TextBox 6">
+          <p:cNvPr id="96" name="TextBox 95">
             <a:extLst>
               <a:ext uri="{FF2B5EF4-FFF2-40B4-BE49-F238E27FC236}">
                 <a16:creationId xmlns:a16="http://schemas.microsoft.com/office/drawing/2014/main" id="{7EAFBB19-EFE8-1704-7506-55700BFD22E4}"/>
@@ -5673,7 +6409,7 @@
         </p:nvSpPr>
         <p:spPr>
           <a:xfrm>
-            <a:off x="-195580" y="2365379"/>
+            <a:off x="-195580" y="2842989"/>
             <a:ext cx="536815" cy="215444"/>
           </a:xfrm>
           <a:prstGeom prst="rect">
@@ -5691,30 +6427,30 @@
             <a:r>
               <a:rPr lang="en-GB" sz="800" dirty="0">
                 <a:solidFill>
-                  <a:schemeClr val="bg2">
-                    <a:lumMod val="50000"/>
-                  </a:schemeClr>
+                  <a:srgbClr val="333333"/>
                 </a:solidFill>
+                <a:latin typeface="Calibri Light" panose="020F0302020204030204" pitchFamily="34" charset="0"/>
+                <a:cs typeface="Calibri Light" panose="020F0302020204030204" pitchFamily="34" charset="0"/>
               </a:rPr>
               <a:t>30 </a:t>
             </a:r>
             <a:r>
               <a:rPr lang="it-IT" sz="800" dirty="0">
                 <a:solidFill>
-                  <a:schemeClr val="bg2">
-                    <a:lumMod val="50000"/>
-                  </a:schemeClr>
+                  <a:srgbClr val="333333"/>
                 </a:solidFill>
+                <a:latin typeface="Calibri Light" panose="020F0302020204030204" pitchFamily="34" charset="0"/>
+                <a:cs typeface="Calibri Light" panose="020F0302020204030204" pitchFamily="34" charset="0"/>
               </a:rPr>
               <a:t>°</a:t>
             </a:r>
             <a:r>
               <a:rPr lang="en-GB" sz="800" dirty="0">
                 <a:solidFill>
-                  <a:schemeClr val="bg2">
-                    <a:lumMod val="50000"/>
-                  </a:schemeClr>
+                  <a:srgbClr val="333333"/>
                 </a:solidFill>
+                <a:latin typeface="Calibri Light" panose="020F0302020204030204" pitchFamily="34" charset="0"/>
+                <a:cs typeface="Calibri Light" panose="020F0302020204030204" pitchFamily="34" charset="0"/>
               </a:rPr>
               <a:t>N</a:t>
             </a:r>
@@ -5723,7 +6459,7 @@
       </p:sp>
       <p:sp>
         <p:nvSpPr>
-          <p:cNvPr id="8" name="TextBox 7">
+          <p:cNvPr id="97" name="TextBox 96">
             <a:extLst>
               <a:ext uri="{FF2B5EF4-FFF2-40B4-BE49-F238E27FC236}">
                 <a16:creationId xmlns:a16="http://schemas.microsoft.com/office/drawing/2014/main" id="{08E525C9-8B8B-856F-6464-CD2A9FEC19DD}"/>
@@ -5735,7 +6471,7 @@
         </p:nvSpPr>
         <p:spPr>
           <a:xfrm>
-            <a:off x="855980" y="3186627"/>
+            <a:off x="855980" y="3664237"/>
             <a:ext cx="536815" cy="215444"/>
           </a:xfrm>
           <a:prstGeom prst="rect">
@@ -5753,30 +6489,30 @@
             <a:r>
               <a:rPr lang="en-GB" sz="800" dirty="0">
                 <a:solidFill>
-                  <a:schemeClr val="bg2">
-                    <a:lumMod val="50000"/>
-                  </a:schemeClr>
+                  <a:srgbClr val="333333"/>
                 </a:solidFill>
+                <a:latin typeface="Calibri Light" panose="020F0302020204030204" pitchFamily="34" charset="0"/>
+                <a:cs typeface="Calibri Light" panose="020F0302020204030204" pitchFamily="34" charset="0"/>
               </a:rPr>
               <a:t>120 </a:t>
             </a:r>
             <a:r>
               <a:rPr lang="it-IT" sz="800" dirty="0">
                 <a:solidFill>
-                  <a:schemeClr val="bg2">
-                    <a:lumMod val="50000"/>
-                  </a:schemeClr>
+                  <a:srgbClr val="333333"/>
                 </a:solidFill>
+                <a:latin typeface="Calibri Light" panose="020F0302020204030204" pitchFamily="34" charset="0"/>
+                <a:cs typeface="Calibri Light" panose="020F0302020204030204" pitchFamily="34" charset="0"/>
               </a:rPr>
               <a:t>°</a:t>
             </a:r>
             <a:r>
               <a:rPr lang="en-GB" sz="800" dirty="0">
                 <a:solidFill>
-                  <a:schemeClr val="bg2">
-                    <a:lumMod val="50000"/>
-                  </a:schemeClr>
+                  <a:srgbClr val="333333"/>
                 </a:solidFill>
+                <a:latin typeface="Calibri Light" panose="020F0302020204030204" pitchFamily="34" charset="0"/>
+                <a:cs typeface="Calibri Light" panose="020F0302020204030204" pitchFamily="34" charset="0"/>
               </a:rPr>
               <a:t>W</a:t>
             </a:r>
@@ -5785,7 +6521,7 @@
       </p:sp>
       <p:sp>
         <p:nvSpPr>
-          <p:cNvPr id="9" name="TextBox 8">
+          <p:cNvPr id="98" name="TextBox 97">
             <a:extLst>
               <a:ext uri="{FF2B5EF4-FFF2-40B4-BE49-F238E27FC236}">
                 <a16:creationId xmlns:a16="http://schemas.microsoft.com/office/drawing/2014/main" id="{823987BF-6FA7-EC5E-C5ED-325313D2AE59}"/>
@@ -5797,7 +6533,7 @@
         </p:nvSpPr>
         <p:spPr>
           <a:xfrm>
-            <a:off x="2549214" y="3186627"/>
+            <a:off x="2549214" y="3664237"/>
             <a:ext cx="536815" cy="215444"/>
           </a:xfrm>
           <a:prstGeom prst="rect">
@@ -5815,30 +6551,30 @@
             <a:r>
               <a:rPr lang="en-GB" sz="800" dirty="0">
                 <a:solidFill>
-                  <a:schemeClr val="bg2">
-                    <a:lumMod val="50000"/>
-                  </a:schemeClr>
+                  <a:srgbClr val="333333"/>
                 </a:solidFill>
+                <a:latin typeface="Calibri Light" panose="020F0302020204030204" pitchFamily="34" charset="0"/>
+                <a:cs typeface="Calibri Light" panose="020F0302020204030204" pitchFamily="34" charset="0"/>
               </a:rPr>
               <a:t>100 </a:t>
             </a:r>
             <a:r>
               <a:rPr lang="it-IT" sz="800" dirty="0">
                 <a:solidFill>
-                  <a:schemeClr val="bg2">
-                    <a:lumMod val="50000"/>
-                  </a:schemeClr>
+                  <a:srgbClr val="333333"/>
                 </a:solidFill>
+                <a:latin typeface="Calibri Light" panose="020F0302020204030204" pitchFamily="34" charset="0"/>
+                <a:cs typeface="Calibri Light" panose="020F0302020204030204" pitchFamily="34" charset="0"/>
               </a:rPr>
               <a:t>°</a:t>
             </a:r>
             <a:r>
               <a:rPr lang="en-GB" sz="800" dirty="0">
                 <a:solidFill>
-                  <a:schemeClr val="bg2">
-                    <a:lumMod val="50000"/>
-                  </a:schemeClr>
+                  <a:srgbClr val="333333"/>
                 </a:solidFill>
+                <a:latin typeface="Calibri Light" panose="020F0302020204030204" pitchFamily="34" charset="0"/>
+                <a:cs typeface="Calibri Light" panose="020F0302020204030204" pitchFamily="34" charset="0"/>
               </a:rPr>
               <a:t>W</a:t>
             </a:r>
@@ -5847,7 +6583,7 @@
       </p:sp>
       <p:sp>
         <p:nvSpPr>
-          <p:cNvPr id="10" name="TextBox 9">
+          <p:cNvPr id="99" name="TextBox 98">
             <a:extLst>
               <a:ext uri="{FF2B5EF4-FFF2-40B4-BE49-F238E27FC236}">
                 <a16:creationId xmlns:a16="http://schemas.microsoft.com/office/drawing/2014/main" id="{26903909-39B6-BA49-59C4-AF4507DF29BF}"/>
@@ -5859,7 +6595,7 @@
         </p:nvSpPr>
         <p:spPr>
           <a:xfrm>
-            <a:off x="4183082" y="3186627"/>
+            <a:off x="4183082" y="3664237"/>
             <a:ext cx="536815" cy="215444"/>
           </a:xfrm>
           <a:prstGeom prst="rect">
@@ -5877,30 +6613,30 @@
             <a:r>
               <a:rPr lang="en-GB" sz="800" dirty="0">
                 <a:solidFill>
-                  <a:schemeClr val="bg2">
-                    <a:lumMod val="50000"/>
-                  </a:schemeClr>
+                  <a:srgbClr val="333333"/>
                 </a:solidFill>
+                <a:latin typeface="Calibri Light" panose="020F0302020204030204" pitchFamily="34" charset="0"/>
+                <a:cs typeface="Calibri Light" panose="020F0302020204030204" pitchFamily="34" charset="0"/>
               </a:rPr>
               <a:t>80 </a:t>
             </a:r>
             <a:r>
               <a:rPr lang="it-IT" sz="800" dirty="0">
                 <a:solidFill>
-                  <a:schemeClr val="bg2">
-                    <a:lumMod val="50000"/>
-                  </a:schemeClr>
+                  <a:srgbClr val="333333"/>
                 </a:solidFill>
+                <a:latin typeface="Calibri Light" panose="020F0302020204030204" pitchFamily="34" charset="0"/>
+                <a:cs typeface="Calibri Light" panose="020F0302020204030204" pitchFamily="34" charset="0"/>
               </a:rPr>
               <a:t>°</a:t>
             </a:r>
             <a:r>
               <a:rPr lang="en-GB" sz="800" dirty="0">
                 <a:solidFill>
-                  <a:schemeClr val="bg2">
-                    <a:lumMod val="50000"/>
-                  </a:schemeClr>
+                  <a:srgbClr val="333333"/>
                 </a:solidFill>
+                <a:latin typeface="Calibri Light" panose="020F0302020204030204" pitchFamily="34" charset="0"/>
+                <a:cs typeface="Calibri Light" panose="020F0302020204030204" pitchFamily="34" charset="0"/>
               </a:rPr>
               <a:t>W</a:t>
             </a:r>
@@ -5909,7 +6645,7 @@
       </p:sp>
       <p:sp>
         <p:nvSpPr>
-          <p:cNvPr id="11" name="TextBox 10">
+          <p:cNvPr id="100" name="TextBox 99">
             <a:extLst>
               <a:ext uri="{FF2B5EF4-FFF2-40B4-BE49-F238E27FC236}">
                 <a16:creationId xmlns:a16="http://schemas.microsoft.com/office/drawing/2014/main" id="{0C834787-FEEB-B977-952A-288699762B58}"/>
@@ -5921,7 +6657,7 @@
         </p:nvSpPr>
         <p:spPr>
           <a:xfrm>
-            <a:off x="5688653" y="126377"/>
+            <a:off x="5688653" y="603987"/>
             <a:ext cx="1371884" cy="215444"/>
           </a:xfrm>
           <a:prstGeom prst="rect">
@@ -5939,10 +6675,10 @@
             <a:r>
               <a:rPr lang="en-GB" sz="800" dirty="0">
                 <a:solidFill>
-                  <a:schemeClr val="bg2">
-                    <a:lumMod val="50000"/>
-                  </a:schemeClr>
+                  <a:srgbClr val="333333"/>
                 </a:solidFill>
+                <a:latin typeface="Calibri Light" panose="020F0302020204030204" pitchFamily="34" charset="0"/>
+                <a:cs typeface="Calibri Light" panose="020F0302020204030204" pitchFamily="34" charset="0"/>
               </a:rPr>
               <a:t>m.a.s.l.</a:t>
             </a:r>
@@ -5951,7 +6687,7 @@
       </p:sp>
       <p:sp>
         <p:nvSpPr>
-          <p:cNvPr id="12" name="TextBox 11">
+          <p:cNvPr id="101" name="TextBox 100">
             <a:extLst>
               <a:ext uri="{FF2B5EF4-FFF2-40B4-BE49-F238E27FC236}">
                 <a16:creationId xmlns:a16="http://schemas.microsoft.com/office/drawing/2014/main" id="{61400BA6-3D3A-1190-AD65-CF1147A3BCBC}"/>
@@ -5963,7 +6699,7 @@
         </p:nvSpPr>
         <p:spPr>
           <a:xfrm>
-            <a:off x="6209426" y="3060873"/>
+            <a:off x="6209426" y="3538483"/>
             <a:ext cx="536815" cy="215444"/>
           </a:xfrm>
           <a:prstGeom prst="rect">
@@ -5980,10 +6716,10 @@
             <a:r>
               <a:rPr lang="en-GB" sz="800" dirty="0">
                 <a:solidFill>
-                  <a:schemeClr val="bg2">
-                    <a:lumMod val="50000"/>
-                  </a:schemeClr>
+                  <a:srgbClr val="333333"/>
                 </a:solidFill>
+                <a:latin typeface="Calibri Light" panose="020F0302020204030204" pitchFamily="34" charset="0"/>
+                <a:cs typeface="Calibri Light" panose="020F0302020204030204" pitchFamily="34" charset="0"/>
               </a:rPr>
               <a:t>0</a:t>
             </a:r>
@@ -5992,7 +6728,7 @@
       </p:sp>
       <p:sp>
         <p:nvSpPr>
-          <p:cNvPr id="13" name="TextBox 12">
+          <p:cNvPr id="102" name="TextBox 101">
             <a:extLst>
               <a:ext uri="{FF2B5EF4-FFF2-40B4-BE49-F238E27FC236}">
                 <a16:creationId xmlns:a16="http://schemas.microsoft.com/office/drawing/2014/main" id="{F77F9084-F223-ED65-669A-F6F51F897BA2}"/>
@@ -6004,7 +6740,7 @@
         </p:nvSpPr>
         <p:spPr>
           <a:xfrm>
-            <a:off x="6209426" y="598890"/>
+            <a:off x="6209426" y="1076500"/>
             <a:ext cx="536815" cy="215444"/>
           </a:xfrm>
           <a:prstGeom prst="rect">
@@ -6021,10 +6757,10 @@
             <a:r>
               <a:rPr lang="en-GB" sz="800" dirty="0">
                 <a:solidFill>
-                  <a:schemeClr val="bg2">
-                    <a:lumMod val="50000"/>
-                  </a:schemeClr>
+                  <a:srgbClr val="333333"/>
                 </a:solidFill>
+                <a:latin typeface="Calibri Light" panose="020F0302020204030204" pitchFamily="34" charset="0"/>
+                <a:cs typeface="Calibri Light" panose="020F0302020204030204" pitchFamily="34" charset="0"/>
               </a:rPr>
               <a:t>2500</a:t>
             </a:r>
@@ -6033,7 +6769,7 @@
       </p:sp>
       <p:sp>
         <p:nvSpPr>
-          <p:cNvPr id="14" name="TextBox 13">
+          <p:cNvPr id="103" name="TextBox 102">
             <a:extLst>
               <a:ext uri="{FF2B5EF4-FFF2-40B4-BE49-F238E27FC236}">
                 <a16:creationId xmlns:a16="http://schemas.microsoft.com/office/drawing/2014/main" id="{E58B7622-486E-AF0A-77FA-6A257F911DE9}"/>
@@ -6045,7 +6781,7 @@
         </p:nvSpPr>
         <p:spPr>
           <a:xfrm>
-            <a:off x="6209426" y="906638"/>
+            <a:off x="6209426" y="1384248"/>
             <a:ext cx="536815" cy="215444"/>
           </a:xfrm>
           <a:prstGeom prst="rect">
@@ -6062,10 +6798,10 @@
             <a:r>
               <a:rPr lang="en-GB" sz="800" dirty="0">
                 <a:solidFill>
-                  <a:schemeClr val="bg2">
-                    <a:lumMod val="50000"/>
-                  </a:schemeClr>
+                  <a:srgbClr val="333333"/>
                 </a:solidFill>
+                <a:latin typeface="Calibri Light" panose="020F0302020204030204" pitchFamily="34" charset="0"/>
+                <a:cs typeface="Calibri Light" panose="020F0302020204030204" pitchFamily="34" charset="0"/>
               </a:rPr>
               <a:t>2000</a:t>
             </a:r>
@@ -6074,7 +6810,7 @@
       </p:sp>
       <p:sp>
         <p:nvSpPr>
-          <p:cNvPr id="15" name="TextBox 14">
+          <p:cNvPr id="104" name="TextBox 103">
             <a:extLst>
               <a:ext uri="{FF2B5EF4-FFF2-40B4-BE49-F238E27FC236}">
                 <a16:creationId xmlns:a16="http://schemas.microsoft.com/office/drawing/2014/main" id="{53D672B0-A6EA-4276-A5B9-C5164A9A326F}"/>
@@ -6086,7 +6822,7 @@
         </p:nvSpPr>
         <p:spPr>
           <a:xfrm>
-            <a:off x="6209426" y="1214386"/>
+            <a:off x="6209426" y="1691996"/>
             <a:ext cx="536815" cy="215444"/>
           </a:xfrm>
           <a:prstGeom prst="rect">
@@ -6103,10 +6839,10 @@
             <a:r>
               <a:rPr lang="en-GB" sz="800" dirty="0">
                 <a:solidFill>
-                  <a:schemeClr val="bg2">
-                    <a:lumMod val="50000"/>
-                  </a:schemeClr>
+                  <a:srgbClr val="333333"/>
                 </a:solidFill>
+                <a:latin typeface="Calibri Light" panose="020F0302020204030204" pitchFamily="34" charset="0"/>
+                <a:cs typeface="Calibri Light" panose="020F0302020204030204" pitchFamily="34" charset="0"/>
               </a:rPr>
               <a:t>1500</a:t>
             </a:r>
@@ -6115,7 +6851,7 @@
       </p:sp>
       <p:sp>
         <p:nvSpPr>
-          <p:cNvPr id="16" name="TextBox 15">
+          <p:cNvPr id="105" name="TextBox 104">
             <a:extLst>
               <a:ext uri="{FF2B5EF4-FFF2-40B4-BE49-F238E27FC236}">
                 <a16:creationId xmlns:a16="http://schemas.microsoft.com/office/drawing/2014/main" id="{FC073318-9596-D679-740B-BA408BA68B78}"/>
@@ -6127,7 +6863,7 @@
         </p:nvSpPr>
         <p:spPr>
           <a:xfrm>
-            <a:off x="6209426" y="1522134"/>
+            <a:off x="6209426" y="1999744"/>
             <a:ext cx="536815" cy="215444"/>
           </a:xfrm>
           <a:prstGeom prst="rect">
@@ -6144,10 +6880,10 @@
             <a:r>
               <a:rPr lang="en-GB" sz="800" dirty="0">
                 <a:solidFill>
-                  <a:schemeClr val="bg2">
-                    <a:lumMod val="50000"/>
-                  </a:schemeClr>
+                  <a:srgbClr val="333333"/>
                 </a:solidFill>
+                <a:latin typeface="Calibri Light" panose="020F0302020204030204" pitchFamily="34" charset="0"/>
+                <a:cs typeface="Calibri Light" panose="020F0302020204030204" pitchFamily="34" charset="0"/>
               </a:rPr>
               <a:t>1200</a:t>
             </a:r>
@@ -6156,7 +6892,7 @@
       </p:sp>
       <p:sp>
         <p:nvSpPr>
-          <p:cNvPr id="17" name="TextBox 16">
+          <p:cNvPr id="106" name="TextBox 105">
             <a:extLst>
               <a:ext uri="{FF2B5EF4-FFF2-40B4-BE49-F238E27FC236}">
                 <a16:creationId xmlns:a16="http://schemas.microsoft.com/office/drawing/2014/main" id="{95D8CFCC-5F17-C4D6-6F70-8501F37736D8}"/>
@@ -6168,7 +6904,7 @@
         </p:nvSpPr>
         <p:spPr>
           <a:xfrm>
-            <a:off x="6209426" y="1829882"/>
+            <a:off x="6209426" y="2307492"/>
             <a:ext cx="536815" cy="215444"/>
           </a:xfrm>
           <a:prstGeom prst="rect">
@@ -6185,10 +6921,10 @@
             <a:r>
               <a:rPr lang="en-GB" sz="800" dirty="0">
                 <a:solidFill>
-                  <a:schemeClr val="bg2">
-                    <a:lumMod val="50000"/>
-                  </a:schemeClr>
+                  <a:srgbClr val="333333"/>
                 </a:solidFill>
+                <a:latin typeface="Calibri Light" panose="020F0302020204030204" pitchFamily="34" charset="0"/>
+                <a:cs typeface="Calibri Light" panose="020F0302020204030204" pitchFamily="34" charset="0"/>
               </a:rPr>
               <a:t>750</a:t>
             </a:r>
@@ -6197,7 +6933,7 @@
       </p:sp>
       <p:sp>
         <p:nvSpPr>
-          <p:cNvPr id="18" name="TextBox 17">
+          <p:cNvPr id="107" name="TextBox 106">
             <a:extLst>
               <a:ext uri="{FF2B5EF4-FFF2-40B4-BE49-F238E27FC236}">
                 <a16:creationId xmlns:a16="http://schemas.microsoft.com/office/drawing/2014/main" id="{E06CF797-8451-574D-21F0-384E8A3452B7}"/>
@@ -6209,7 +6945,7 @@
         </p:nvSpPr>
         <p:spPr>
           <a:xfrm>
-            <a:off x="6209426" y="2137630"/>
+            <a:off x="6209426" y="2615240"/>
             <a:ext cx="536815" cy="215444"/>
           </a:xfrm>
           <a:prstGeom prst="rect">
@@ -6226,10 +6962,10 @@
             <a:r>
               <a:rPr lang="en-GB" sz="800" dirty="0">
                 <a:solidFill>
-                  <a:schemeClr val="bg2">
-                    <a:lumMod val="50000"/>
-                  </a:schemeClr>
+                  <a:srgbClr val="333333"/>
                 </a:solidFill>
+                <a:latin typeface="Calibri Light" panose="020F0302020204030204" pitchFamily="34" charset="0"/>
+                <a:cs typeface="Calibri Light" panose="020F0302020204030204" pitchFamily="34" charset="0"/>
               </a:rPr>
               <a:t>500</a:t>
             </a:r>
@@ -6238,7 +6974,7 @@
       </p:sp>
       <p:sp>
         <p:nvSpPr>
-          <p:cNvPr id="19" name="TextBox 18">
+          <p:cNvPr id="108" name="TextBox 107">
             <a:extLst>
               <a:ext uri="{FF2B5EF4-FFF2-40B4-BE49-F238E27FC236}">
                 <a16:creationId xmlns:a16="http://schemas.microsoft.com/office/drawing/2014/main" id="{CFB3D8FA-6A39-82FF-7103-9C3B87E3F64B}"/>
@@ -6250,7 +6986,7 @@
         </p:nvSpPr>
         <p:spPr>
           <a:xfrm>
-            <a:off x="6209426" y="2445378"/>
+            <a:off x="6209426" y="2922988"/>
             <a:ext cx="536815" cy="215444"/>
           </a:xfrm>
           <a:prstGeom prst="rect">
@@ -6267,10 +7003,10 @@
             <a:r>
               <a:rPr lang="en-GB" sz="800" dirty="0">
                 <a:solidFill>
-                  <a:schemeClr val="bg2">
-                    <a:lumMod val="50000"/>
-                  </a:schemeClr>
+                  <a:srgbClr val="333333"/>
                 </a:solidFill>
+                <a:latin typeface="Calibri Light" panose="020F0302020204030204" pitchFamily="34" charset="0"/>
+                <a:cs typeface="Calibri Light" panose="020F0302020204030204" pitchFamily="34" charset="0"/>
               </a:rPr>
               <a:t>250</a:t>
             </a:r>
@@ -6279,7 +7015,7 @@
       </p:sp>
       <p:sp>
         <p:nvSpPr>
-          <p:cNvPr id="20" name="TextBox 19">
+          <p:cNvPr id="109" name="TextBox 108">
             <a:extLst>
               <a:ext uri="{FF2B5EF4-FFF2-40B4-BE49-F238E27FC236}">
                 <a16:creationId xmlns:a16="http://schemas.microsoft.com/office/drawing/2014/main" id="{5B2D0398-5206-B218-FB65-5E89CE52B185}"/>
@@ -6291,7 +7027,7 @@
         </p:nvSpPr>
         <p:spPr>
           <a:xfrm>
-            <a:off x="6209426" y="2753126"/>
+            <a:off x="6209426" y="3230736"/>
             <a:ext cx="536815" cy="215444"/>
           </a:xfrm>
           <a:prstGeom prst="rect">
@@ -6308,10 +7044,10 @@
             <a:r>
               <a:rPr lang="en-GB" sz="800" dirty="0">
                 <a:solidFill>
-                  <a:schemeClr val="bg2">
-                    <a:lumMod val="50000"/>
-                  </a:schemeClr>
+                  <a:srgbClr val="333333"/>
                 </a:solidFill>
+                <a:latin typeface="Calibri Light" panose="020F0302020204030204" pitchFamily="34" charset="0"/>
+                <a:cs typeface="Calibri Light" panose="020F0302020204030204" pitchFamily="34" charset="0"/>
               </a:rPr>
               <a:t>50</a:t>
             </a:r>
@@ -6320,7 +7056,7 @@
       </p:sp>
       <p:sp>
         <p:nvSpPr>
-          <p:cNvPr id="21" name="TextBox 20">
+          <p:cNvPr id="110" name="TextBox 109">
             <a:extLst>
               <a:ext uri="{FF2B5EF4-FFF2-40B4-BE49-F238E27FC236}">
                 <a16:creationId xmlns:a16="http://schemas.microsoft.com/office/drawing/2014/main" id="{E8F93690-0FC3-3203-F616-27D0636BD86D}"/>
@@ -6332,7 +7068,7 @@
         </p:nvSpPr>
         <p:spPr>
           <a:xfrm>
-            <a:off x="6209426" y="291142"/>
+            <a:off x="6209426" y="768752"/>
             <a:ext cx="536815" cy="215444"/>
           </a:xfrm>
           <a:prstGeom prst="rect">
@@ -6349,10 +7085,10 @@
             <a:r>
               <a:rPr lang="en-GB" sz="800" dirty="0">
                 <a:solidFill>
-                  <a:schemeClr val="bg2">
-                    <a:lumMod val="50000"/>
-                  </a:schemeClr>
+                  <a:srgbClr val="333333"/>
                 </a:solidFill>
+                <a:latin typeface="Calibri Light" panose="020F0302020204030204" pitchFamily="34" charset="0"/>
+                <a:cs typeface="Calibri Light" panose="020F0302020204030204" pitchFamily="34" charset="0"/>
               </a:rPr>
               <a:t>5000</a:t>
             </a:r>
@@ -6361,7 +7097,7 @@
       </p:sp>
       <p:sp>
         <p:nvSpPr>
-          <p:cNvPr id="22" name="TextBox 21">
+          <p:cNvPr id="111" name="TextBox 110">
             <a:extLst>
               <a:ext uri="{FF2B5EF4-FFF2-40B4-BE49-F238E27FC236}">
                 <a16:creationId xmlns:a16="http://schemas.microsoft.com/office/drawing/2014/main" id="{98EE0CB6-A0DD-61DA-6B6B-D4EC8957FF3D}"/>
@@ -6373,7 +7109,7 @@
         </p:nvSpPr>
         <p:spPr>
           <a:xfrm>
-            <a:off x="4950991" y="1282326"/>
+            <a:off x="4950991" y="1759936"/>
             <a:ext cx="1010524" cy="215444"/>
           </a:xfrm>
           <a:prstGeom prst="rect">
@@ -6388,7 +7124,13 @@
           <a:lstStyle/>
           <a:p>
             <a:r>
-              <a:rPr lang="en-GB" sz="800" b="1" dirty="0"/>
+              <a:rPr lang="en-GB" sz="800" b="1" dirty="0">
+                <a:solidFill>
+                  <a:srgbClr val="333333"/>
+                </a:solidFill>
+                <a:latin typeface="Calibri" panose="020F0502020204030204" pitchFamily="34" charset="0"/>
+                <a:cs typeface="Calibri" panose="020F0502020204030204" pitchFamily="34" charset="0"/>
+              </a:rPr>
               <a:t>NEW YORK</a:t>
             </a:r>
           </a:p>
@@ -6396,7 +7138,7 @@
       </p:sp>
       <p:sp>
         <p:nvSpPr>
-          <p:cNvPr id="23" name="TextBox 22">
+          <p:cNvPr id="112" name="TextBox 111">
             <a:extLst>
               <a:ext uri="{FF2B5EF4-FFF2-40B4-BE49-F238E27FC236}">
                 <a16:creationId xmlns:a16="http://schemas.microsoft.com/office/drawing/2014/main" id="{5C604597-7B68-19A8-35F6-C8E80447309D}"/>
@@ -6408,7 +7150,7 @@
         </p:nvSpPr>
         <p:spPr>
           <a:xfrm>
-            <a:off x="2816152" y="1162126"/>
+            <a:off x="2816152" y="1639736"/>
             <a:ext cx="1010524" cy="215444"/>
           </a:xfrm>
           <a:prstGeom prst="rect">
@@ -6424,7 +7166,13 @@
           <a:p>
             <a:pPr algn="r"/>
             <a:r>
-              <a:rPr lang="en-GB" sz="800" b="1" dirty="0"/>
+              <a:rPr lang="en-GB" sz="800" b="1" dirty="0">
+                <a:solidFill>
+                  <a:srgbClr val="333333"/>
+                </a:solidFill>
+                <a:latin typeface="Calibri" panose="020F0502020204030204" pitchFamily="34" charset="0"/>
+                <a:cs typeface="Calibri" panose="020F0502020204030204" pitchFamily="34" charset="0"/>
+              </a:rPr>
               <a:t>CHICAGO</a:t>
             </a:r>
           </a:p>
@@ -6432,7 +7180,7 @@
       </p:sp>
       <p:sp>
         <p:nvSpPr>
-          <p:cNvPr id="24" name="TextBox 23">
+          <p:cNvPr id="113" name="TextBox 112">
             <a:extLst>
               <a:ext uri="{FF2B5EF4-FFF2-40B4-BE49-F238E27FC236}">
                 <a16:creationId xmlns:a16="http://schemas.microsoft.com/office/drawing/2014/main" id="{37EBCA7E-9713-7AE3-638B-C84D5A1C2253}"/>
@@ -6444,7 +7192,7 @@
         </p:nvSpPr>
         <p:spPr>
           <a:xfrm>
-            <a:off x="1259208" y="1930769"/>
+            <a:off x="1259208" y="2408379"/>
             <a:ext cx="1010524" cy="215444"/>
           </a:xfrm>
           <a:prstGeom prst="rect">
@@ -6460,7 +7208,13 @@
           <a:p>
             <a:pPr algn="ctr"/>
             <a:r>
-              <a:rPr lang="en-GB" sz="800" b="1" dirty="0"/>
+              <a:rPr lang="en-GB" sz="800" b="1" dirty="0">
+                <a:solidFill>
+                  <a:srgbClr val="333333"/>
+                </a:solidFill>
+                <a:latin typeface="Calibri" panose="020F0502020204030204" pitchFamily="34" charset="0"/>
+                <a:cs typeface="Calibri" panose="020F0502020204030204" pitchFamily="34" charset="0"/>
+              </a:rPr>
               <a:t>PHOENIX</a:t>
             </a:r>
           </a:p>
@@ -6468,7 +7222,7 @@
       </p:sp>
       <p:sp>
         <p:nvSpPr>
-          <p:cNvPr id="25" name="TextBox 24">
+          <p:cNvPr id="114" name="TextBox 113">
             <a:extLst>
               <a:ext uri="{FF2B5EF4-FFF2-40B4-BE49-F238E27FC236}">
                 <a16:creationId xmlns:a16="http://schemas.microsoft.com/office/drawing/2014/main" id="{65B70626-067E-1AE7-11BD-EC7DA8DABC28}"/>
@@ -6480,7 +7234,7 @@
         </p:nvSpPr>
         <p:spPr>
           <a:xfrm>
-            <a:off x="2959000" y="2466081"/>
+            <a:off x="2959000" y="2943691"/>
             <a:ext cx="1010524" cy="215444"/>
           </a:xfrm>
           <a:prstGeom prst="rect">
@@ -6496,7 +7250,13 @@
           <a:p>
             <a:pPr algn="ctr"/>
             <a:r>
-              <a:rPr lang="en-GB" sz="800" b="1" dirty="0"/>
+              <a:rPr lang="en-GB" sz="800" b="1" dirty="0">
+                <a:solidFill>
+                  <a:srgbClr val="333333"/>
+                </a:solidFill>
+                <a:latin typeface="Calibri" panose="020F0502020204030204" pitchFamily="34" charset="0"/>
+                <a:cs typeface="Calibri" panose="020F0502020204030204" pitchFamily="34" charset="0"/>
+              </a:rPr>
               <a:t>HOUSTON</a:t>
             </a:r>
           </a:p>
@@ -6504,7 +7264,7 @@
       </p:sp>
       <p:sp>
         <p:nvSpPr>
-          <p:cNvPr id="26" name="TextBox 25">
+          <p:cNvPr id="115" name="TextBox 114">
             <a:extLst>
               <a:ext uri="{FF2B5EF4-FFF2-40B4-BE49-F238E27FC236}">
                 <a16:creationId xmlns:a16="http://schemas.microsoft.com/office/drawing/2014/main" id="{C7BCE81D-7A63-8764-295C-1A6242CC4274}"/>
@@ -6516,7 +7276,7 @@
         </p:nvSpPr>
         <p:spPr>
           <a:xfrm>
-            <a:off x="300910" y="2044166"/>
+            <a:off x="300910" y="2521776"/>
             <a:ext cx="1010524" cy="215444"/>
           </a:xfrm>
           <a:prstGeom prst="rect">
@@ -6532,7 +7292,13 @@
           <a:p>
             <a:pPr algn="r"/>
             <a:r>
-              <a:rPr lang="en-GB" sz="800" b="1" dirty="0"/>
+              <a:rPr lang="en-GB" sz="800" b="1" dirty="0">
+                <a:solidFill>
+                  <a:srgbClr val="333333"/>
+                </a:solidFill>
+                <a:latin typeface="Calibri" panose="020F0502020204030204" pitchFamily="34" charset="0"/>
+                <a:cs typeface="Calibri" panose="020F0502020204030204" pitchFamily="34" charset="0"/>
+              </a:rPr>
               <a:t>LOS ANGELES</a:t>
             </a:r>
           </a:p>
@@ -6540,7 +7306,7 @@
       </p:sp>
       <p:sp>
         <p:nvSpPr>
-          <p:cNvPr id="27" name="TextBox 26">
+          <p:cNvPr id="116" name="TextBox 115">
             <a:extLst>
               <a:ext uri="{FF2B5EF4-FFF2-40B4-BE49-F238E27FC236}">
                 <a16:creationId xmlns:a16="http://schemas.microsoft.com/office/drawing/2014/main" id="{A6515F5F-2E20-7D13-537C-F772A00535F4}"/>
@@ -6552,7 +7318,7 @@
         </p:nvSpPr>
         <p:spPr>
           <a:xfrm>
-            <a:off x="429636" y="2210987"/>
+            <a:off x="429636" y="2688597"/>
             <a:ext cx="1010524" cy="215444"/>
           </a:xfrm>
           <a:prstGeom prst="rect">
@@ -6568,7 +7334,13 @@
           <a:p>
             <a:pPr algn="r"/>
             <a:r>
-              <a:rPr lang="en-GB" sz="800" b="1" dirty="0"/>
+              <a:rPr lang="en-GB" sz="800" b="1" dirty="0">
+                <a:solidFill>
+                  <a:srgbClr val="333333"/>
+                </a:solidFill>
+                <a:latin typeface="Calibri" panose="020F0502020204030204" pitchFamily="34" charset="0"/>
+                <a:cs typeface="Calibri" panose="020F0502020204030204" pitchFamily="34" charset="0"/>
+              </a:rPr>
               <a:t>SAN DIEGO</a:t>
             </a:r>
           </a:p>
@@ -6576,7 +7348,7 @@
       </p:sp>
       <p:sp>
         <p:nvSpPr>
-          <p:cNvPr id="28" name="TextBox 27">
+          <p:cNvPr id="117" name="TextBox 116">
             <a:extLst>
               <a:ext uri="{FF2B5EF4-FFF2-40B4-BE49-F238E27FC236}">
                 <a16:creationId xmlns:a16="http://schemas.microsoft.com/office/drawing/2014/main" id="{50B578E0-62E1-B8F6-ECD2-2E7AA0CF70F9}"/>
@@ -6588,7 +7360,7 @@
         </p:nvSpPr>
         <p:spPr>
           <a:xfrm>
-            <a:off x="-326371" y="1632346"/>
+            <a:off x="-326371" y="2109956"/>
             <a:ext cx="1284844" cy="215444"/>
           </a:xfrm>
           <a:prstGeom prst="rect">
@@ -6604,7 +7376,13 @@
           <a:p>
             <a:pPr algn="r"/>
             <a:r>
-              <a:rPr lang="en-GB" sz="800" b="1" dirty="0"/>
+              <a:rPr lang="en-GB" sz="800" b="1" dirty="0">
+                <a:solidFill>
+                  <a:srgbClr val="333333"/>
+                </a:solidFill>
+                <a:latin typeface="Calibri" panose="020F0502020204030204" pitchFamily="34" charset="0"/>
+                <a:cs typeface="Calibri" panose="020F0502020204030204" pitchFamily="34" charset="0"/>
+              </a:rPr>
               <a:t>SAN FRANCISCO</a:t>
             </a:r>
           </a:p>
@@ -6612,7 +7390,7 @@
       </p:sp>
       <p:sp>
         <p:nvSpPr>
-          <p:cNvPr id="29" name="TextBox 28">
+          <p:cNvPr id="118" name="TextBox 117">
             <a:extLst>
               <a:ext uri="{FF2B5EF4-FFF2-40B4-BE49-F238E27FC236}">
                 <a16:creationId xmlns:a16="http://schemas.microsoft.com/office/drawing/2014/main" id="{F4D19594-8958-5678-A91A-D009CFEE0A3F}"/>
@@ -6624,7 +7402,7 @@
         </p:nvSpPr>
         <p:spPr>
           <a:xfrm>
-            <a:off x="-209334" y="1747762"/>
+            <a:off x="-209334" y="2225372"/>
             <a:ext cx="1284844" cy="215444"/>
           </a:xfrm>
           <a:prstGeom prst="rect">
@@ -6640,7 +7418,13 @@
           <a:p>
             <a:pPr algn="r"/>
             <a:r>
-              <a:rPr lang="en-GB" sz="800" b="1" dirty="0"/>
+              <a:rPr lang="en-GB" sz="800" b="1" dirty="0">
+                <a:solidFill>
+                  <a:srgbClr val="333333"/>
+                </a:solidFill>
+                <a:latin typeface="Calibri" panose="020F0502020204030204" pitchFamily="34" charset="0"/>
+                <a:cs typeface="Calibri" panose="020F0502020204030204" pitchFamily="34" charset="0"/>
+              </a:rPr>
               <a:t>SAN JOSE</a:t>
             </a:r>
           </a:p>
@@ -6648,7 +7432,7 @@
       </p:sp>
       <p:sp>
         <p:nvSpPr>
-          <p:cNvPr id="30" name="TextBox 29">
+          <p:cNvPr id="119" name="TextBox 118">
             <a:extLst>
               <a:ext uri="{FF2B5EF4-FFF2-40B4-BE49-F238E27FC236}">
                 <a16:creationId xmlns:a16="http://schemas.microsoft.com/office/drawing/2014/main" id="{5ED4F7E3-EC48-9668-BA84-2D97CF23BD85}"/>
@@ -6660,7 +7444,7 @@
         </p:nvSpPr>
         <p:spPr>
           <a:xfrm>
-            <a:off x="2356701" y="1385697"/>
+            <a:off x="2356701" y="1863307"/>
             <a:ext cx="1010524" cy="215444"/>
           </a:xfrm>
           <a:prstGeom prst="rect">
@@ -6675,7 +7459,13 @@
           <a:lstStyle/>
           <a:p>
             <a:r>
-              <a:rPr lang="en-GB" sz="800" b="1" dirty="0"/>
+              <a:rPr lang="en-GB" sz="800" b="1" dirty="0">
+                <a:solidFill>
+                  <a:srgbClr val="333333"/>
+                </a:solidFill>
+                <a:latin typeface="Calibri" panose="020F0502020204030204" pitchFamily="34" charset="0"/>
+                <a:cs typeface="Calibri" panose="020F0502020204030204" pitchFamily="34" charset="0"/>
+              </a:rPr>
               <a:t>DENVER</a:t>
             </a:r>
           </a:p>
@@ -6683,7 +7473,7 @@
       </p:sp>
       <p:sp>
         <p:nvSpPr>
-          <p:cNvPr id="31" name="TextBox 30">
+          <p:cNvPr id="120" name="TextBox 119">
             <a:extLst>
               <a:ext uri="{FF2B5EF4-FFF2-40B4-BE49-F238E27FC236}">
                 <a16:creationId xmlns:a16="http://schemas.microsoft.com/office/drawing/2014/main" id="{0ECA7152-99C7-A2F4-E83D-4F855AAFA37C}"/>
@@ -6695,7 +7485,7 @@
         </p:nvSpPr>
         <p:spPr>
           <a:xfrm>
-            <a:off x="3025486" y="2107055"/>
+            <a:off x="3025486" y="2584665"/>
             <a:ext cx="1010524" cy="215444"/>
           </a:xfrm>
           <a:prstGeom prst="rect">
@@ -6710,7 +7500,13 @@
           <a:lstStyle/>
           <a:p>
             <a:r>
-              <a:rPr lang="en-GB" sz="800" b="1" dirty="0"/>
+              <a:rPr lang="en-GB" sz="800" b="1" dirty="0">
+                <a:solidFill>
+                  <a:srgbClr val="333333"/>
+                </a:solidFill>
+                <a:latin typeface="Calibri" panose="020F0502020204030204" pitchFamily="34" charset="0"/>
+                <a:cs typeface="Calibri" panose="020F0502020204030204" pitchFamily="34" charset="0"/>
+              </a:rPr>
               <a:t>DALLAS</a:t>
             </a:r>
           </a:p>
@@ -6718,7 +7514,7 @@
       </p:sp>
       <p:sp>
         <p:nvSpPr>
-          <p:cNvPr id="32" name="TextBox 31">
+          <p:cNvPr id="121" name="TextBox 120">
             <a:extLst>
               <a:ext uri="{FF2B5EF4-FFF2-40B4-BE49-F238E27FC236}">
                 <a16:creationId xmlns:a16="http://schemas.microsoft.com/office/drawing/2014/main" id="{9FA7FCAD-7DCD-492E-33EA-E8EA0A4B7A03}"/>
@@ -6730,7 +7526,7 @@
         </p:nvSpPr>
         <p:spPr>
           <a:xfrm>
-            <a:off x="2073420" y="2022733"/>
+            <a:off x="2073420" y="2500343"/>
             <a:ext cx="1010524" cy="215444"/>
           </a:xfrm>
           <a:prstGeom prst="rect">
@@ -6746,7 +7542,13 @@
           <a:p>
             <a:pPr algn="r"/>
             <a:r>
-              <a:rPr lang="en-GB" sz="800" b="1" dirty="0"/>
+              <a:rPr lang="en-GB" sz="800" b="1" dirty="0">
+                <a:solidFill>
+                  <a:srgbClr val="333333"/>
+                </a:solidFill>
+                <a:latin typeface="Calibri" panose="020F0502020204030204" pitchFamily="34" charset="0"/>
+                <a:cs typeface="Calibri" panose="020F0502020204030204" pitchFamily="34" charset="0"/>
+              </a:rPr>
               <a:t>FORTH WORTH</a:t>
             </a:r>
           </a:p>
@@ -6754,7 +7556,7 @@
       </p:sp>
       <p:sp>
         <p:nvSpPr>
-          <p:cNvPr id="33" name="TextBox 32">
+          <p:cNvPr id="122" name="TextBox 121">
             <a:extLst>
               <a:ext uri="{FF2B5EF4-FFF2-40B4-BE49-F238E27FC236}">
                 <a16:creationId xmlns:a16="http://schemas.microsoft.com/office/drawing/2014/main" id="{27112713-98E8-0868-E1E6-C5213A18CDB4}"/>
@@ -6766,7 +7568,7 @@
         </p:nvSpPr>
         <p:spPr>
           <a:xfrm>
-            <a:off x="2235370" y="2271880"/>
+            <a:off x="2235370" y="2749490"/>
             <a:ext cx="1010524" cy="215444"/>
           </a:xfrm>
           <a:prstGeom prst="rect">
@@ -6782,7 +7584,13 @@
           <a:p>
             <a:pPr algn="ctr"/>
             <a:r>
-              <a:rPr lang="en-GB" sz="800" b="1" dirty="0"/>
+              <a:rPr lang="en-GB" sz="800" b="1" dirty="0">
+                <a:solidFill>
+                  <a:srgbClr val="333333"/>
+                </a:solidFill>
+                <a:latin typeface="Calibri" panose="020F0502020204030204" pitchFamily="34" charset="0"/>
+                <a:cs typeface="Calibri" panose="020F0502020204030204" pitchFamily="34" charset="0"/>
+              </a:rPr>
               <a:t>AUSTIN</a:t>
             </a:r>
           </a:p>
@@ -6790,7 +7598,7 @@
       </p:sp>
       <p:sp>
         <p:nvSpPr>
-          <p:cNvPr id="34" name="TextBox 33">
+          <p:cNvPr id="123" name="TextBox 122">
             <a:extLst>
               <a:ext uri="{FF2B5EF4-FFF2-40B4-BE49-F238E27FC236}">
                 <a16:creationId xmlns:a16="http://schemas.microsoft.com/office/drawing/2014/main" id="{A9DF4E4E-4BD6-4A43-6D8D-57FA7E5B4C8A}"/>
@@ -6802,7 +7610,7 @@
         </p:nvSpPr>
         <p:spPr>
           <a:xfrm>
-            <a:off x="2096606" y="2537253"/>
+            <a:off x="2096606" y="3014863"/>
             <a:ext cx="1010524" cy="215444"/>
           </a:xfrm>
           <a:prstGeom prst="rect">
@@ -6818,7 +7626,13 @@
           <a:p>
             <a:pPr algn="r"/>
             <a:r>
-              <a:rPr lang="en-GB" sz="800" b="1" dirty="0"/>
+              <a:rPr lang="en-GB" sz="800" b="1" dirty="0">
+                <a:solidFill>
+                  <a:srgbClr val="333333"/>
+                </a:solidFill>
+                <a:latin typeface="Calibri" panose="020F0502020204030204" pitchFamily="34" charset="0"/>
+                <a:cs typeface="Calibri" panose="020F0502020204030204" pitchFamily="34" charset="0"/>
+              </a:rPr>
               <a:t>SAN ANTONIO</a:t>
             </a:r>
           </a:p>
@@ -6826,7 +7640,7 @@
       </p:sp>
       <p:sp>
         <p:nvSpPr>
-          <p:cNvPr id="35" name="TextBox 34">
+          <p:cNvPr id="124" name="TextBox 123">
             <a:extLst>
               <a:ext uri="{FF2B5EF4-FFF2-40B4-BE49-F238E27FC236}">
                 <a16:creationId xmlns:a16="http://schemas.microsoft.com/office/drawing/2014/main" id="{F880BE35-27AF-2DCD-5D81-D484CE796AE1}"/>
@@ -6838,7 +7652,7 @@
         </p:nvSpPr>
         <p:spPr>
           <a:xfrm>
-            <a:off x="4301509" y="2348059"/>
+            <a:off x="4301509" y="2825669"/>
             <a:ext cx="1010524" cy="215444"/>
           </a:xfrm>
           <a:prstGeom prst="rect">
@@ -6853,7 +7667,13 @@
           <a:lstStyle/>
           <a:p>
             <a:r>
-              <a:rPr lang="en-GB" sz="800" b="1" dirty="0"/>
+              <a:rPr lang="en-GB" sz="800" b="1" dirty="0">
+                <a:solidFill>
+                  <a:srgbClr val="333333"/>
+                </a:solidFill>
+                <a:latin typeface="Calibri" panose="020F0502020204030204" pitchFamily="34" charset="0"/>
+                <a:cs typeface="Calibri" panose="020F0502020204030204" pitchFamily="34" charset="0"/>
+              </a:rPr>
               <a:t>JACKSONVILLE</a:t>
             </a:r>
           </a:p>
@@ -6861,7 +7681,7 @@
       </p:sp>
       <p:sp>
         <p:nvSpPr>
-          <p:cNvPr id="36" name="TextBox 35">
+          <p:cNvPr id="125" name="TextBox 124">
             <a:extLst>
               <a:ext uri="{FF2B5EF4-FFF2-40B4-BE49-F238E27FC236}">
                 <a16:creationId xmlns:a16="http://schemas.microsoft.com/office/drawing/2014/main" id="{EA8BFD8B-1858-9531-2319-F3352B9FCE3E}"/>
@@ -6873,7 +7693,7 @@
         </p:nvSpPr>
         <p:spPr>
           <a:xfrm>
-            <a:off x="4368264" y="1856090"/>
+            <a:off x="4368264" y="2333700"/>
             <a:ext cx="1010524" cy="215444"/>
           </a:xfrm>
           <a:prstGeom prst="rect">
@@ -6888,7 +7708,13 @@
           <a:lstStyle/>
           <a:p>
             <a:r>
-              <a:rPr lang="en-GB" sz="800" b="1" dirty="0"/>
+              <a:rPr lang="en-GB" sz="800" b="1" dirty="0">
+                <a:solidFill>
+                  <a:srgbClr val="333333"/>
+                </a:solidFill>
+                <a:latin typeface="Calibri" panose="020F0502020204030204" pitchFamily="34" charset="0"/>
+                <a:cs typeface="Calibri" panose="020F0502020204030204" pitchFamily="34" charset="0"/>
+              </a:rPr>
               <a:t>CHARLOTTE</a:t>
             </a:r>
           </a:p>
@@ -6896,7 +7722,7 @@
       </p:sp>
       <p:sp>
         <p:nvSpPr>
-          <p:cNvPr id="37" name="TextBox 36">
+          <p:cNvPr id="126" name="TextBox 125">
             <a:extLst>
               <a:ext uri="{FF2B5EF4-FFF2-40B4-BE49-F238E27FC236}">
                 <a16:creationId xmlns:a16="http://schemas.microsoft.com/office/drawing/2014/main" id="{804E7FEC-AF83-FD28-4A16-70D6430EB6E5}"/>
@@ -6908,7 +7734,7 @@
         </p:nvSpPr>
         <p:spPr>
           <a:xfrm>
-            <a:off x="4669611" y="1551968"/>
+            <a:off x="4669611" y="2029578"/>
             <a:ext cx="1284843" cy="215444"/>
           </a:xfrm>
           <a:prstGeom prst="rect">
@@ -6923,7 +7749,13 @@
           <a:lstStyle/>
           <a:p>
             <a:r>
-              <a:rPr lang="en-GB" sz="800" b="1" dirty="0"/>
+              <a:rPr lang="en-GB" sz="800" b="1" dirty="0">
+                <a:solidFill>
+                  <a:srgbClr val="333333"/>
+                </a:solidFill>
+                <a:latin typeface="Calibri" panose="020F0502020204030204" pitchFamily="34" charset="0"/>
+                <a:cs typeface="Calibri" panose="020F0502020204030204" pitchFamily="34" charset="0"/>
+              </a:rPr>
               <a:t>WASHINGTON D.C.</a:t>
             </a:r>
           </a:p>
@@ -6931,7 +7763,7 @@
       </p:sp>
       <p:sp>
         <p:nvSpPr>
-          <p:cNvPr id="38" name="TextBox 37">
+          <p:cNvPr id="127" name="TextBox 126">
             <a:extLst>
               <a:ext uri="{FF2B5EF4-FFF2-40B4-BE49-F238E27FC236}">
                 <a16:creationId xmlns:a16="http://schemas.microsoft.com/office/drawing/2014/main" id="{F1AE0BC5-794B-D23C-A945-2D48666A380B}"/>
@@ -6943,7 +7775,7 @@
         </p:nvSpPr>
         <p:spPr>
           <a:xfrm>
-            <a:off x="3918446" y="1258057"/>
+            <a:off x="3918446" y="1735667"/>
             <a:ext cx="1010524" cy="215444"/>
           </a:xfrm>
           <a:prstGeom prst="rect">
@@ -6959,7 +7791,13 @@
           <a:p>
             <a:pPr algn="ctr"/>
             <a:r>
-              <a:rPr lang="en-GB" sz="800" b="1" dirty="0"/>
+              <a:rPr lang="en-GB" sz="800" b="1" dirty="0">
+                <a:solidFill>
+                  <a:srgbClr val="333333"/>
+                </a:solidFill>
+                <a:latin typeface="Calibri" panose="020F0502020204030204" pitchFamily="34" charset="0"/>
+                <a:cs typeface="Calibri" panose="020F0502020204030204" pitchFamily="34" charset="0"/>
+              </a:rPr>
               <a:t>COLUMBUS</a:t>
             </a:r>
           </a:p>
@@ -6967,7 +7805,7 @@
       </p:sp>
       <p:sp>
         <p:nvSpPr>
-          <p:cNvPr id="39" name="TextBox 38">
+          <p:cNvPr id="128" name="TextBox 127">
             <a:extLst>
               <a:ext uri="{FF2B5EF4-FFF2-40B4-BE49-F238E27FC236}">
                 <a16:creationId xmlns:a16="http://schemas.microsoft.com/office/drawing/2014/main" id="{3848180B-A357-5916-14AE-BEBA0E61C958}"/>
@@ -6979,7 +7817,7 @@
         </p:nvSpPr>
         <p:spPr>
           <a:xfrm>
-            <a:off x="3083944" y="1484783"/>
+            <a:off x="3083944" y="1962393"/>
             <a:ext cx="1010524" cy="215444"/>
           </a:xfrm>
           <a:prstGeom prst="rect">
@@ -6995,7 +7833,13 @@
           <a:p>
             <a:pPr algn="r"/>
             <a:r>
-              <a:rPr lang="en-GB" sz="800" b="1" dirty="0"/>
+              <a:rPr lang="en-GB" sz="800" b="1" dirty="0">
+                <a:solidFill>
+                  <a:srgbClr val="333333"/>
+                </a:solidFill>
+                <a:latin typeface="Calibri" panose="020F0502020204030204" pitchFamily="34" charset="0"/>
+                <a:cs typeface="Calibri" panose="020F0502020204030204" pitchFamily="34" charset="0"/>
+              </a:rPr>
               <a:t>INDIANAPOLIS</a:t>
             </a:r>
           </a:p>
@@ -7003,7 +7847,7 @@
       </p:sp>
       <p:sp>
         <p:nvSpPr>
-          <p:cNvPr id="40" name="TextBox 39">
+          <p:cNvPr id="129" name="TextBox 128">
             <a:extLst>
               <a:ext uri="{FF2B5EF4-FFF2-40B4-BE49-F238E27FC236}">
                 <a16:creationId xmlns:a16="http://schemas.microsoft.com/office/drawing/2014/main" id="{F88C8933-F6FB-E197-23C5-6A6AC1467788}"/>
@@ -7015,7 +7859,7 @@
         </p:nvSpPr>
         <p:spPr>
           <a:xfrm>
-            <a:off x="-72174" y="467539"/>
+            <a:off x="-72174" y="945149"/>
             <a:ext cx="1010524" cy="215444"/>
           </a:xfrm>
           <a:prstGeom prst="rect">
@@ -7031,7 +7875,13 @@
           <a:p>
             <a:pPr algn="r"/>
             <a:r>
-              <a:rPr lang="en-GB" sz="800" b="1" dirty="0"/>
+              <a:rPr lang="en-GB" sz="800" b="1" dirty="0">
+                <a:solidFill>
+                  <a:srgbClr val="333333"/>
+                </a:solidFill>
+                <a:latin typeface="Calibri" panose="020F0502020204030204" pitchFamily="34" charset="0"/>
+                <a:cs typeface="Calibri" panose="020F0502020204030204" pitchFamily="34" charset="0"/>
+              </a:rPr>
               <a:t>SEATTLE</a:t>
             </a:r>
           </a:p>
@@ -7039,7 +7889,7 @@
       </p:sp>
       <p:sp>
         <p:nvSpPr>
-          <p:cNvPr id="41" name="TextBox 40">
+          <p:cNvPr id="130" name="TextBox 129">
             <a:extLst>
               <a:ext uri="{FF2B5EF4-FFF2-40B4-BE49-F238E27FC236}">
                 <a16:creationId xmlns:a16="http://schemas.microsoft.com/office/drawing/2014/main" id="{708DFDE3-CB83-C412-EE9B-B89348B18975}"/>
@@ -7051,7 +7901,7 @@
         </p:nvSpPr>
         <p:spPr>
           <a:xfrm>
-            <a:off x="4850274" y="1407209"/>
+            <a:off x="4850274" y="1884819"/>
             <a:ext cx="1284843" cy="215444"/>
           </a:xfrm>
           <a:prstGeom prst="rect">
@@ -7066,7 +7916,13 @@
           <a:lstStyle/>
           <a:p>
             <a:r>
-              <a:rPr lang="en-GB" sz="800" b="1" dirty="0"/>
+              <a:rPr lang="en-GB" sz="800" b="1" dirty="0">
+                <a:solidFill>
+                  <a:srgbClr val="333333"/>
+                </a:solidFill>
+                <a:latin typeface="Calibri" panose="020F0502020204030204" pitchFamily="34" charset="0"/>
+                <a:cs typeface="Calibri" panose="020F0502020204030204" pitchFamily="34" charset="0"/>
+              </a:rPr>
               <a:t>PHILADELPHIA</a:t>
             </a:r>
           </a:p>
@@ -7074,7 +7930,7 @@
       </p:sp>
       <p:sp>
         <p:nvSpPr>
-          <p:cNvPr id="42" name="TextBox 41">
+          <p:cNvPr id="131" name="TextBox 130">
             <a:extLst>
               <a:ext uri="{FF2B5EF4-FFF2-40B4-BE49-F238E27FC236}">
                 <a16:creationId xmlns:a16="http://schemas.microsoft.com/office/drawing/2014/main" id="{0A4512A2-4DC0-76EB-1C78-328A3FA136E0}"/>
@@ -7086,7 +7942,7 @@
         </p:nvSpPr>
         <p:spPr>
           <a:xfrm>
-            <a:off x="1025259" y="1646513"/>
+            <a:off x="1025259" y="2124123"/>
             <a:ext cx="1010524" cy="215444"/>
           </a:xfrm>
           <a:prstGeom prst="rect">
@@ -7102,7 +7958,13 @@
           <a:p>
             <a:pPr algn="ctr"/>
             <a:r>
-              <a:rPr lang="en-GB" sz="800" b="1" dirty="0"/>
+              <a:rPr lang="en-GB" sz="800" b="1" dirty="0">
+                <a:solidFill>
+                  <a:srgbClr val="333333"/>
+                </a:solidFill>
+                <a:latin typeface="Calibri" panose="020F0502020204030204" pitchFamily="34" charset="0"/>
+                <a:cs typeface="Calibri" panose="020F0502020204030204" pitchFamily="34" charset="0"/>
+              </a:rPr>
               <a:t>LAS VEGAS</a:t>
             </a:r>
           </a:p>
@@ -7110,7 +7972,7 @@
       </p:sp>
       <p:sp>
         <p:nvSpPr>
-          <p:cNvPr id="43" name="TextBox 42">
+          <p:cNvPr id="132" name="TextBox 131">
             <a:extLst>
               <a:ext uri="{FF2B5EF4-FFF2-40B4-BE49-F238E27FC236}">
                 <a16:creationId xmlns:a16="http://schemas.microsoft.com/office/drawing/2014/main" id="{AC1F07BA-7A38-7AE9-D91C-D217054E2654}"/>
@@ -7122,7 +7984,7 @@
         </p:nvSpPr>
         <p:spPr>
           <a:xfrm>
-            <a:off x="3504763" y="1881875"/>
+            <a:off x="3504763" y="2359485"/>
             <a:ext cx="1010524" cy="215444"/>
           </a:xfrm>
           <a:prstGeom prst="rect">
@@ -7137,7 +7999,13 @@
           <a:lstStyle/>
           <a:p>
             <a:r>
-              <a:rPr lang="en-GB" sz="800" b="1" dirty="0"/>
+              <a:rPr lang="en-GB" sz="800" b="1" dirty="0">
+                <a:solidFill>
+                  <a:srgbClr val="333333"/>
+                </a:solidFill>
+                <a:latin typeface="Calibri" panose="020F0502020204030204" pitchFamily="34" charset="0"/>
+                <a:cs typeface="Calibri" panose="020F0502020204030204" pitchFamily="34" charset="0"/>
+              </a:rPr>
               <a:t>NASHVILLE</a:t>
             </a:r>
           </a:p>
@@ -7145,7 +8013,7 @@
       </p:sp>
       <p:sp>
         <p:nvSpPr>
-          <p:cNvPr id="44" name="TextBox 43">
+          <p:cNvPr id="133" name="TextBox 132">
             <a:extLst>
               <a:ext uri="{FF2B5EF4-FFF2-40B4-BE49-F238E27FC236}">
                 <a16:creationId xmlns:a16="http://schemas.microsoft.com/office/drawing/2014/main" id="{7DD94525-DBC6-1FC2-0B07-84FAFBA131A8}"/>
@@ -7157,7 +8025,7 @@
         </p:nvSpPr>
         <p:spPr>
           <a:xfrm>
-            <a:off x="5207193" y="1104446"/>
+            <a:off x="5207193" y="1582056"/>
             <a:ext cx="1010524" cy="215444"/>
           </a:xfrm>
           <a:prstGeom prst="rect">
@@ -7172,7 +8040,13 @@
           <a:lstStyle/>
           <a:p>
             <a:r>
-              <a:rPr lang="en-GB" sz="800" b="1" dirty="0"/>
+              <a:rPr lang="en-GB" sz="800" b="1" dirty="0">
+                <a:solidFill>
+                  <a:srgbClr val="333333"/>
+                </a:solidFill>
+                <a:latin typeface="Calibri" panose="020F0502020204030204" pitchFamily="34" charset="0"/>
+                <a:cs typeface="Calibri" panose="020F0502020204030204" pitchFamily="34" charset="0"/>
+              </a:rPr>
               <a:t>BOSTON</a:t>
             </a:r>
           </a:p>
@@ -7180,7 +8054,7 @@
       </p:sp>
       <p:sp>
         <p:nvSpPr>
-          <p:cNvPr id="45" name="TextBox 44">
+          <p:cNvPr id="134" name="TextBox 133">
             <a:extLst>
               <a:ext uri="{FF2B5EF4-FFF2-40B4-BE49-F238E27FC236}">
                 <a16:creationId xmlns:a16="http://schemas.microsoft.com/office/drawing/2014/main" id="{50D9BC42-F1FE-87AB-F083-5C2242BD4E51}"/>
@@ -7192,7 +8066,7 @@
         </p:nvSpPr>
         <p:spPr>
           <a:xfrm>
-            <a:off x="2435570" y="1719761"/>
+            <a:off x="2435570" y="2197371"/>
             <a:ext cx="1110817" cy="215444"/>
           </a:xfrm>
           <a:prstGeom prst="rect">
@@ -7207,7 +8081,13 @@
           <a:lstStyle/>
           <a:p>
             <a:r>
-              <a:rPr lang="en-GB" sz="800" b="1" dirty="0"/>
+              <a:rPr lang="en-GB" sz="800" b="1" dirty="0">
+                <a:solidFill>
+                  <a:srgbClr val="333333"/>
+                </a:solidFill>
+                <a:latin typeface="Calibri" panose="020F0502020204030204" pitchFamily="34" charset="0"/>
+                <a:cs typeface="Calibri" panose="020F0502020204030204" pitchFamily="34" charset="0"/>
+              </a:rPr>
               <a:t>OKLAHOMA CITY</a:t>
             </a:r>
           </a:p>
@@ -7215,7 +8095,7 @@
       </p:sp>
       <p:sp>
         <p:nvSpPr>
-          <p:cNvPr id="46" name="TextBox 45">
+          <p:cNvPr id="135" name="TextBox 134">
             <a:extLst>
               <a:ext uri="{FF2B5EF4-FFF2-40B4-BE49-F238E27FC236}">
                 <a16:creationId xmlns:a16="http://schemas.microsoft.com/office/drawing/2014/main" id="{CA271F21-2E92-827F-B5C7-9933695D1A74}"/>
@@ -7227,7 +8107,7 @@
         </p:nvSpPr>
         <p:spPr>
           <a:xfrm>
-            <a:off x="1351214" y="2300275"/>
+            <a:off x="1351214" y="2777885"/>
             <a:ext cx="1010524" cy="215444"/>
           </a:xfrm>
           <a:prstGeom prst="rect">
@@ -7243,9 +8123,75 @@
           <a:p>
             <a:pPr algn="r"/>
             <a:r>
-              <a:rPr lang="en-GB" sz="800" b="1" dirty="0"/>
+              <a:rPr lang="en-GB" sz="800" b="1" dirty="0">
+                <a:solidFill>
+                  <a:srgbClr val="333333"/>
+                </a:solidFill>
+                <a:latin typeface="Calibri" panose="020F0502020204030204" pitchFamily="34" charset="0"/>
+                <a:cs typeface="Calibri" panose="020F0502020204030204" pitchFamily="34" charset="0"/>
+              </a:rPr>
               <a:t>EL PASO</a:t>
             </a:r>
+          </a:p>
+        </p:txBody>
+      </p:sp>
+      <p:sp>
+        <p:nvSpPr>
+          <p:cNvPr id="136" name="TextBox 135">
+            <a:extLst>
+              <a:ext uri="{FF2B5EF4-FFF2-40B4-BE49-F238E27FC236}">
+                <a16:creationId xmlns:a16="http://schemas.microsoft.com/office/drawing/2014/main" id="{19680ED7-98A4-DB3B-A978-A16B331182BF}"/>
+              </a:ext>
+            </a:extLst>
+          </p:cNvPr>
+          <p:cNvSpPr txBox="1"/>
+          <p:nvPr/>
+        </p:nvSpPr>
+        <p:spPr>
+          <a:xfrm>
+            <a:off x="-83151" y="-39988"/>
+            <a:ext cx="6634764" cy="443811"/>
+          </a:xfrm>
+          <a:prstGeom prst="rect">
+            <a:avLst/>
+          </a:prstGeom>
+          <a:noFill/>
+        </p:spPr>
+        <p:txBody>
+          <a:bodyPr wrap="square" rtlCol="0">
+            <a:spAutoFit/>
+          </a:bodyPr>
+          <a:lstStyle/>
+          <a:p>
+            <a:r>
+              <a:rPr lang="en-US" sz="1200" b="1" dirty="0">
+                <a:solidFill>
+                  <a:srgbClr val="333333"/>
+                </a:solidFill>
+                <a:latin typeface="Calibri" panose="020F0502020204030204" pitchFamily="34" charset="0"/>
+                <a:cs typeface="Calibri" panose="020F0502020204030204" pitchFamily="34" charset="0"/>
+              </a:rPr>
+              <a:t>CONUS domain</a:t>
+            </a:r>
+          </a:p>
+          <a:p>
+            <a:r>
+              <a:rPr lang="en-US" sz="1000" dirty="0">
+                <a:solidFill>
+                  <a:srgbClr val="333333"/>
+                </a:solidFill>
+                <a:latin typeface="Calibri Light" panose="020F0302020204030204" pitchFamily="34" charset="0"/>
+                <a:cs typeface="Calibri Light" panose="020F0302020204030204" pitchFamily="34" charset="0"/>
+              </a:rPr>
+              <a:t>Orography at 1km and location of the 25 most populated cities</a:t>
+            </a:r>
+            <a:endParaRPr lang="en-GB" sz="1000" u="sng" dirty="0">
+              <a:solidFill>
+                <a:srgbClr val="333333"/>
+              </a:solidFill>
+              <a:latin typeface="Calibri Light" panose="020F0302020204030204" pitchFamily="34" charset="0"/>
+              <a:cs typeface="Calibri Light" panose="020F0302020204030204" pitchFamily="34" charset="0"/>
+            </a:endParaRPr>
           </a:p>
         </p:txBody>
       </p:sp>

</xml_diff>